<commit_message>
added code snippets, small changes
</commit_message>
<xml_diff>
--- a/05. ASP.NET Web API/Entwicklung einer Schnittstelle mit ASP.NET Web API.pptx
+++ b/05. ASP.NET Web API/Entwicklung einer Schnittstelle mit ASP.NET Web API.pptx
@@ -5,25 +5,24 @@
     <p:sldMasterId id="2147484690" r:id="rId1"/>
   </p:sldMasterIdLst>
   <p:notesMasterIdLst>
-    <p:notesMasterId r:id="rId15"/>
+    <p:notesMasterId r:id="rId14"/>
   </p:notesMasterIdLst>
   <p:handoutMasterIdLst>
-    <p:handoutMasterId r:id="rId16"/>
+    <p:handoutMasterId r:id="rId15"/>
   </p:handoutMasterIdLst>
   <p:sldIdLst>
     <p:sldId id="332" r:id="rId2"/>
     <p:sldId id="299" r:id="rId3"/>
     <p:sldId id="399" r:id="rId4"/>
-    <p:sldId id="361" r:id="rId5"/>
-    <p:sldId id="362" r:id="rId6"/>
-    <p:sldId id="394" r:id="rId7"/>
-    <p:sldId id="396" r:id="rId8"/>
-    <p:sldId id="398" r:id="rId9"/>
-    <p:sldId id="395" r:id="rId10"/>
-    <p:sldId id="401" r:id="rId11"/>
-    <p:sldId id="393" r:id="rId12"/>
-    <p:sldId id="400" r:id="rId13"/>
-    <p:sldId id="290" r:id="rId14"/>
+    <p:sldId id="362" r:id="rId5"/>
+    <p:sldId id="394" r:id="rId6"/>
+    <p:sldId id="396" r:id="rId7"/>
+    <p:sldId id="398" r:id="rId8"/>
+    <p:sldId id="395" r:id="rId9"/>
+    <p:sldId id="401" r:id="rId10"/>
+    <p:sldId id="393" r:id="rId11"/>
+    <p:sldId id="400" r:id="rId12"/>
+    <p:sldId id="290" r:id="rId13"/>
   </p:sldIdLst>
   <p:sldSz cx="12190413" cy="6859588"/>
   <p:notesSz cx="7099300" cy="10234613"/>
@@ -308,7 +307,7 @@
               <a:pPr>
                 <a:defRPr/>
               </a:pPr>
-              <a:t>13.09.2017</a:t>
+              <a:t>22.09.2017</a:t>
             </a:fld>
             <a:endParaRPr lang="de-DE" dirty="0"/>
           </a:p>
@@ -507,7 +506,7 @@
               <a:pPr>
                 <a:defRPr/>
               </a:pPr>
-              <a:t>2017-09-13</a:t>
+              <a:t>2017-09-22</a:t>
             </a:fld>
             <a:endParaRPr lang="sv-SE"/>
           </a:p>
@@ -1143,7 +1142,7 @@
             <a:fld id="{0E250944-C459-49FA-BBE9-2A0996DD63D5}" type="slidenum">
               <a:rPr lang="en-US" smtClean="0"/>
               <a:pPr/>
-              <a:t>6</a:t>
+              <a:t>5</a:t>
             </a:fld>
             <a:endParaRPr lang="en-US"/>
           </a:p>
@@ -1356,7 +1355,7 @@
             <a:fld id="{0E250944-C459-49FA-BBE9-2A0996DD63D5}" type="slidenum">
               <a:rPr lang="en-US" smtClean="0"/>
               <a:pPr/>
-              <a:t>7</a:t>
+              <a:t>6</a:t>
             </a:fld>
             <a:endParaRPr lang="en-US"/>
           </a:p>
@@ -1579,7 +1578,7 @@
             <a:fld id="{0E250944-C459-49FA-BBE9-2A0996DD63D5}" type="slidenum">
               <a:rPr lang="en-US" smtClean="0"/>
               <a:pPr/>
-              <a:t>9</a:t>
+              <a:t>8</a:t>
             </a:fld>
             <a:endParaRPr lang="en-US"/>
           </a:p>
@@ -1802,7 +1801,7 @@
             <a:fld id="{0E250944-C459-49FA-BBE9-2A0996DD63D5}" type="slidenum">
               <a:rPr lang="en-US" smtClean="0"/>
               <a:pPr/>
-              <a:t>10</a:t>
+              <a:t>9</a:t>
             </a:fld>
             <a:endParaRPr lang="en-US"/>
           </a:p>
@@ -2006,7 +2005,7 @@
               <a:pPr>
                 <a:defRPr/>
               </a:pPr>
-              <a:t>12</a:t>
+              <a:t>11</a:t>
             </a:fld>
             <a:endParaRPr lang="sv-SE"/>
           </a:p>
@@ -2116,7 +2115,7 @@
               <a:pPr>
                 <a:defRPr/>
               </a:pPr>
-              <a:t>13</a:t>
+              <a:t>12</a:t>
             </a:fld>
             <a:endParaRPr lang="sv-SE"/>
           </a:p>
@@ -5794,7 +5793,7 @@
       </p:grpSpPr>
       <p:sp>
         <p:nvSpPr>
-          <p:cNvPr id="2" name="Title 1"/>
+          <p:cNvPr id="6" name="Titel 5"/>
           <p:cNvSpPr>
             <a:spLocks noGrp="1"/>
           </p:cNvSpPr>
@@ -5808,900 +5807,67 @@
           <a:lstStyle/>
           <a:p>
             <a:r>
-              <a:rPr lang="en-US" dirty="0" smtClean="0"/>
-              <a:t>2.1 ASP.NET Web </a:t>
-            </a:r>
-            <a:r>
-              <a:rPr lang="en-US" dirty="0" err="1" smtClean="0"/>
-              <a:t>Api</a:t>
-            </a:r>
-            <a:r>
-              <a:rPr lang="en-US" dirty="0" smtClean="0"/>
-              <a:t>: Controller und Routing</a:t>
-            </a:r>
-            <a:endParaRPr lang="en-US" dirty="0"/>
+              <a:rPr lang="de-DE" dirty="0" smtClean="0"/>
+              <a:t>HANDS-ON</a:t>
+            </a:r>
+            <a:endParaRPr lang="de-DE" dirty="0"/>
           </a:p>
         </p:txBody>
       </p:sp>
       <p:sp>
         <p:nvSpPr>
-          <p:cNvPr id="3" name="Content Placeholder 2"/>
+          <p:cNvPr id="7" name="Untertitel 6"/>
           <p:cNvSpPr>
             <a:spLocks noGrp="1"/>
           </p:cNvSpPr>
           <p:nvPr>
-            <p:ph sz="quarter" idx="10"/>
+            <p:ph type="subTitle" idx="1"/>
           </p:nvPr>
         </p:nvSpPr>
-        <p:spPr>
-          <a:xfrm>
-            <a:off x="379364" y="1388547"/>
-            <a:ext cx="6383588" cy="5291613"/>
-          </a:xfrm>
-        </p:spPr>
+        <p:spPr/>
         <p:txBody>
           <a:bodyPr/>
           <a:lstStyle/>
           <a:p>
             <a:r>
-              <a:rPr lang="en-US" dirty="0" smtClean="0"/>
-              <a:t>Framework </a:t>
-            </a:r>
-            <a:r>
-              <a:rPr lang="en-US" dirty="0" err="1" smtClean="0"/>
-              <a:t>zum</a:t>
-            </a:r>
-            <a:r>
-              <a:rPr lang="en-US" dirty="0" smtClean="0"/>
-              <a:t> </a:t>
-            </a:r>
-            <a:r>
-              <a:rPr lang="en-US" dirty="0" err="1" smtClean="0"/>
-              <a:t>Entwickeln</a:t>
-            </a:r>
-            <a:r>
-              <a:rPr lang="en-US" dirty="0" smtClean="0"/>
-              <a:t> von REST APIs</a:t>
-            </a:r>
-          </a:p>
-          <a:p>
-            <a:r>
-              <a:rPr lang="en-US" dirty="0" err="1" smtClean="0"/>
-              <a:t>ApiController</a:t>
-            </a:r>
-            <a:r>
-              <a:rPr lang="en-US" dirty="0" smtClean="0"/>
-              <a:t> </a:t>
-            </a:r>
-            <a:r>
-              <a:rPr lang="en-US" dirty="0" err="1" smtClean="0"/>
-              <a:t>verarbeiten</a:t>
-            </a:r>
-            <a:r>
-              <a:rPr lang="en-US" dirty="0" smtClean="0"/>
-              <a:t> REST Requests </a:t>
-            </a:r>
-            <a:br>
-              <a:rPr lang="en-US" dirty="0" smtClean="0"/>
-            </a:br>
-            <a:r>
-              <a:rPr lang="en-US" sz="1600" dirty="0" smtClean="0"/>
-              <a:t>(</a:t>
-            </a:r>
-            <a:r>
-              <a:rPr lang="en-US" sz="1600" dirty="0" err="1" smtClean="0"/>
-              <a:t>ähnlich</a:t>
-            </a:r>
-            <a:r>
-              <a:rPr lang="en-US" sz="1600" dirty="0" smtClean="0"/>
-              <a:t> </a:t>
-            </a:r>
-            <a:r>
-              <a:rPr lang="en-US" sz="1600" dirty="0" err="1" smtClean="0"/>
-              <a:t>zu</a:t>
-            </a:r>
-            <a:r>
-              <a:rPr lang="en-US" sz="1600" dirty="0" smtClean="0"/>
-              <a:t> MVC </a:t>
-            </a:r>
-            <a:r>
-              <a:rPr lang="en-US" sz="1600" dirty="0" err="1" smtClean="0"/>
-              <a:t>Controllern</a:t>
-            </a:r>
-            <a:r>
-              <a:rPr lang="en-US" sz="1600" dirty="0" smtClean="0"/>
-              <a:t>)</a:t>
-            </a:r>
-            <a:endParaRPr lang="en-US" dirty="0" smtClean="0"/>
-          </a:p>
-          <a:p>
-            <a:r>
-              <a:rPr lang="en-US" dirty="0" err="1" smtClean="0"/>
-              <a:t>Für</a:t>
-            </a:r>
-            <a:r>
-              <a:rPr lang="en-US" dirty="0" smtClean="0"/>
-              <a:t> die </a:t>
-            </a:r>
-            <a:r>
-              <a:rPr lang="en-US" dirty="0" err="1" smtClean="0"/>
-              <a:t>Ansteuerung</a:t>
-            </a:r>
-            <a:r>
-              <a:rPr lang="en-US" dirty="0" smtClean="0"/>
-              <a:t> der </a:t>
-            </a:r>
-            <a:r>
-              <a:rPr lang="en-US" dirty="0" err="1" smtClean="0"/>
-              <a:t>Methoden</a:t>
-            </a:r>
-            <a:r>
-              <a:rPr lang="en-US" dirty="0" smtClean="0"/>
-              <a:t> </a:t>
-            </a:r>
-            <a:r>
-              <a:rPr lang="en-US" dirty="0" err="1" smtClean="0"/>
-              <a:t>werden</a:t>
-            </a:r>
-            <a:r>
-              <a:rPr lang="en-US" dirty="0" smtClean="0"/>
-              <a:t> </a:t>
-            </a:r>
-            <a:r>
-              <a:rPr lang="en-US" dirty="0" err="1" smtClean="0"/>
-              <a:t>Routen</a:t>
-            </a:r>
-            <a:r>
-              <a:rPr lang="en-US" dirty="0" smtClean="0"/>
-              <a:t> </a:t>
-            </a:r>
-            <a:r>
-              <a:rPr lang="en-US" dirty="0" err="1" smtClean="0"/>
-              <a:t>benötigt</a:t>
-            </a:r>
-            <a:endParaRPr lang="en-US" dirty="0" smtClean="0"/>
-          </a:p>
-          <a:p>
-            <a:pPr lvl="1"/>
-            <a:r>
-              <a:rPr lang="en-US" dirty="0" smtClean="0">
-                <a:solidFill>
-                  <a:schemeClr val="accent3"/>
-                </a:solidFill>
-              </a:rPr>
-              <a:t>Convention based Routing</a:t>
-            </a:r>
-          </a:p>
-          <a:p>
-            <a:pPr lvl="1"/>
-            <a:r>
-              <a:rPr lang="en-US" dirty="0" smtClean="0">
-                <a:solidFill>
-                  <a:schemeClr val="accent3"/>
-                </a:solidFill>
-              </a:rPr>
-              <a:t>Attribute based Routing</a:t>
-            </a:r>
-          </a:p>
-          <a:p>
-            <a:pPr lvl="1"/>
-            <a:r>
-              <a:rPr lang="en-US" dirty="0" err="1" smtClean="0">
-                <a:solidFill>
-                  <a:schemeClr val="accent3"/>
-                </a:solidFill>
-              </a:rPr>
-              <a:t>WebApiConfig</a:t>
-            </a:r>
-            <a:endParaRPr lang="en-US" dirty="0" smtClean="0">
-              <a:solidFill>
-                <a:schemeClr val="accent3"/>
-              </a:solidFill>
-            </a:endParaRPr>
-          </a:p>
-          <a:p>
-            <a:pPr lvl="1"/>
-            <a:endParaRPr lang="en-US" dirty="0">
-              <a:solidFill>
-                <a:schemeClr val="accent3"/>
-              </a:solidFill>
-            </a:endParaRPr>
+              <a:rPr lang="de-DE" sz="4800" dirty="0" smtClean="0"/>
+              <a:t>05</a:t>
+            </a:r>
+            <a:r>
+              <a:rPr lang="de-DE" sz="4800" dirty="0"/>
+              <a:t>. Entwicklung einer Schnittstelle mit ASP.NET Web API</a:t>
+            </a:r>
           </a:p>
         </p:txBody>
       </p:sp>
       <p:sp>
         <p:nvSpPr>
-          <p:cNvPr id="5" name="Rechteck 4"/>
-          <p:cNvSpPr/>
-          <p:nvPr/>
-        </p:nvSpPr>
-        <p:spPr>
-          <a:xfrm>
-            <a:off x="7395250" y="1700557"/>
-            <a:ext cx="4795163" cy="1200329"/>
-          </a:xfrm>
-          <a:prstGeom prst="rect">
-            <a:avLst/>
-          </a:prstGeom>
-        </p:spPr>
+          <p:cNvPr id="4" name="Foliennummernplatzhalter 3"/>
+          <p:cNvSpPr>
+            <a:spLocks noGrp="1"/>
+          </p:cNvSpPr>
+          <p:nvPr>
+            <p:ph type="sldNum" sz="quarter" idx="10"/>
+          </p:nvPr>
+        </p:nvSpPr>
+        <p:spPr/>
         <p:txBody>
-          <a:bodyPr wrap="square">
-            <a:spAutoFit/>
-          </a:bodyPr>
+          <a:bodyPr/>
           <a:lstStyle/>
           <a:p>
-            <a:r>
-              <a:rPr lang="de-DE" sz="1200" dirty="0" err="1">
-                <a:solidFill>
-                  <a:srgbClr val="0000FF"/>
-                </a:solidFill>
-                <a:latin typeface="Consolas" panose="020B0609020204030204" pitchFamily="49" charset="0"/>
-              </a:rPr>
-              <a:t>public</a:t>
-            </a:r>
-            <a:r>
-              <a:rPr lang="de-DE" sz="1200" dirty="0">
-                <a:solidFill>
-                  <a:srgbClr val="000000"/>
-                </a:solidFill>
-                <a:latin typeface="Consolas" panose="020B0609020204030204" pitchFamily="49" charset="0"/>
-              </a:rPr>
-              <a:t> </a:t>
-            </a:r>
-            <a:r>
-              <a:rPr lang="de-DE" sz="1200" dirty="0" err="1">
-                <a:solidFill>
-                  <a:srgbClr val="2B91AF"/>
-                </a:solidFill>
-                <a:latin typeface="Consolas" panose="020B0609020204030204" pitchFamily="49" charset="0"/>
-              </a:rPr>
-              <a:t>IEnumerable</a:t>
-            </a:r>
-            <a:r>
-              <a:rPr lang="de-DE" sz="1200" dirty="0">
-                <a:solidFill>
-                  <a:srgbClr val="000000"/>
-                </a:solidFill>
-                <a:latin typeface="Consolas" panose="020B0609020204030204" pitchFamily="49" charset="0"/>
-              </a:rPr>
-              <a:t>&lt;</a:t>
-            </a:r>
-            <a:r>
-              <a:rPr lang="de-DE" sz="1200" dirty="0" err="1">
-                <a:solidFill>
-                  <a:srgbClr val="2B91AF"/>
-                </a:solidFill>
-                <a:latin typeface="Consolas" panose="020B0609020204030204" pitchFamily="49" charset="0"/>
-              </a:rPr>
-              <a:t>PostDto</a:t>
-            </a:r>
-            <a:r>
-              <a:rPr lang="de-DE" sz="1200" dirty="0">
-                <a:solidFill>
-                  <a:srgbClr val="000000"/>
-                </a:solidFill>
-                <a:latin typeface="Consolas" panose="020B0609020204030204" pitchFamily="49" charset="0"/>
-              </a:rPr>
-              <a:t>&gt; </a:t>
-            </a:r>
-            <a:r>
-              <a:rPr lang="de-DE" sz="1200" dirty="0" err="1">
-                <a:solidFill>
-                  <a:srgbClr val="000000"/>
-                </a:solidFill>
-                <a:latin typeface="Consolas" panose="020B0609020204030204" pitchFamily="49" charset="0"/>
-              </a:rPr>
-              <a:t>Get</a:t>
-            </a:r>
-            <a:r>
-              <a:rPr lang="de-DE" sz="1200" dirty="0">
-                <a:solidFill>
-                  <a:srgbClr val="000000"/>
-                </a:solidFill>
-                <a:latin typeface="Consolas" panose="020B0609020204030204" pitchFamily="49" charset="0"/>
-              </a:rPr>
-              <a:t>()</a:t>
-            </a:r>
-          </a:p>
-          <a:p>
-            <a:r>
-              <a:rPr lang="de-DE" sz="1200" dirty="0">
-                <a:solidFill>
-                  <a:srgbClr val="000000"/>
-                </a:solidFill>
-                <a:latin typeface="Consolas" panose="020B0609020204030204" pitchFamily="49" charset="0"/>
-              </a:rPr>
-              <a:t>{</a:t>
-            </a:r>
-          </a:p>
-          <a:p>
-            <a:r>
-              <a:rPr lang="de-DE" sz="1200" dirty="0">
-                <a:solidFill>
-                  <a:srgbClr val="000000"/>
-                </a:solidFill>
-                <a:latin typeface="Consolas" panose="020B0609020204030204" pitchFamily="49" charset="0"/>
-              </a:rPr>
-              <a:t>    </a:t>
-            </a:r>
-            <a:r>
-              <a:rPr lang="de-DE" sz="1200" dirty="0" err="1">
-                <a:solidFill>
-                  <a:srgbClr val="0000FF"/>
-                </a:solidFill>
-                <a:latin typeface="Consolas" panose="020B0609020204030204" pitchFamily="49" charset="0"/>
-              </a:rPr>
-              <a:t>return</a:t>
-            </a:r>
-            <a:r>
-              <a:rPr lang="de-DE" sz="1200" dirty="0">
-                <a:solidFill>
-                  <a:srgbClr val="000000"/>
-                </a:solidFill>
-                <a:latin typeface="Consolas" panose="020B0609020204030204" pitchFamily="49" charset="0"/>
-              </a:rPr>
-              <a:t> </a:t>
-            </a:r>
-            <a:r>
-              <a:rPr lang="de-DE" sz="1200" dirty="0" err="1" smtClean="0">
-                <a:solidFill>
-                  <a:srgbClr val="0000FF"/>
-                </a:solidFill>
-                <a:latin typeface="Consolas" panose="020B0609020204030204" pitchFamily="49" charset="0"/>
-              </a:rPr>
-              <a:t>this</a:t>
-            </a:r>
-            <a:r>
-              <a:rPr lang="de-DE" sz="1200" dirty="0" err="1" smtClean="0">
-                <a:solidFill>
-                  <a:srgbClr val="000000"/>
-                </a:solidFill>
-                <a:latin typeface="Consolas" panose="020B0609020204030204" pitchFamily="49" charset="0"/>
-              </a:rPr>
-              <a:t>.db.Posts</a:t>
-            </a:r>
-            <a:endParaRPr lang="de-DE" sz="1200" dirty="0" smtClean="0">
-              <a:solidFill>
-                <a:srgbClr val="000000"/>
-              </a:solidFill>
-              <a:latin typeface="Consolas" panose="020B0609020204030204" pitchFamily="49" charset="0"/>
-            </a:endParaRPr>
-          </a:p>
-          <a:p>
-            <a:r>
-              <a:rPr lang="de-DE" sz="1200" dirty="0">
-                <a:solidFill>
-                  <a:srgbClr val="000000"/>
-                </a:solidFill>
-                <a:latin typeface="Consolas" panose="020B0609020204030204" pitchFamily="49" charset="0"/>
-              </a:rPr>
-              <a:t> </a:t>
-            </a:r>
-            <a:r>
-              <a:rPr lang="de-DE" sz="1200" dirty="0" smtClean="0">
-                <a:solidFill>
-                  <a:srgbClr val="000000"/>
-                </a:solidFill>
-                <a:latin typeface="Consolas" panose="020B0609020204030204" pitchFamily="49" charset="0"/>
-              </a:rPr>
-              <a:t>                 .</a:t>
-            </a:r>
-            <a:r>
-              <a:rPr lang="de-DE" sz="1200" dirty="0" err="1">
-                <a:solidFill>
-                  <a:srgbClr val="000000"/>
-                </a:solidFill>
-                <a:latin typeface="Consolas" panose="020B0609020204030204" pitchFamily="49" charset="0"/>
-              </a:rPr>
-              <a:t>ToList</a:t>
-            </a:r>
-            <a:r>
-              <a:rPr lang="de-DE" sz="1200" dirty="0" smtClean="0">
-                <a:solidFill>
-                  <a:srgbClr val="000000"/>
-                </a:solidFill>
-                <a:latin typeface="Consolas" panose="020B0609020204030204" pitchFamily="49" charset="0"/>
-              </a:rPr>
-              <a:t>()</a:t>
-            </a:r>
-          </a:p>
-          <a:p>
-            <a:r>
-              <a:rPr lang="de-DE" sz="1200" dirty="0">
-                <a:solidFill>
-                  <a:srgbClr val="000000"/>
-                </a:solidFill>
-                <a:latin typeface="Consolas" panose="020B0609020204030204" pitchFamily="49" charset="0"/>
-              </a:rPr>
-              <a:t> </a:t>
-            </a:r>
-            <a:r>
-              <a:rPr lang="de-DE" sz="1200" dirty="0" smtClean="0">
-                <a:solidFill>
-                  <a:srgbClr val="000000"/>
-                </a:solidFill>
-                <a:latin typeface="Consolas" panose="020B0609020204030204" pitchFamily="49" charset="0"/>
-              </a:rPr>
-              <a:t>                 .</a:t>
-            </a:r>
-            <a:r>
-              <a:rPr lang="de-DE" sz="1200" dirty="0">
-                <a:solidFill>
-                  <a:srgbClr val="000000"/>
-                </a:solidFill>
-                <a:latin typeface="Consolas" panose="020B0609020204030204" pitchFamily="49" charset="0"/>
-              </a:rPr>
-              <a:t>Select(p =&gt; </a:t>
-            </a:r>
-            <a:r>
-              <a:rPr lang="de-DE" sz="1200" dirty="0" err="1">
-                <a:solidFill>
-                  <a:srgbClr val="2B91AF"/>
-                </a:solidFill>
-                <a:latin typeface="Consolas" panose="020B0609020204030204" pitchFamily="49" charset="0"/>
-              </a:rPr>
-              <a:t>PostDto</a:t>
-            </a:r>
-            <a:r>
-              <a:rPr lang="de-DE" sz="1200" dirty="0" err="1">
-                <a:solidFill>
-                  <a:srgbClr val="000000"/>
-                </a:solidFill>
-                <a:latin typeface="Consolas" panose="020B0609020204030204" pitchFamily="49" charset="0"/>
-              </a:rPr>
-              <a:t>.Map</a:t>
-            </a:r>
-            <a:r>
-              <a:rPr lang="de-DE" sz="1200" dirty="0">
-                <a:solidFill>
-                  <a:srgbClr val="000000"/>
-                </a:solidFill>
-                <a:latin typeface="Consolas" panose="020B0609020204030204" pitchFamily="49" charset="0"/>
-              </a:rPr>
-              <a:t>(p));</a:t>
-            </a:r>
-          </a:p>
-          <a:p>
-            <a:r>
-              <a:rPr lang="de-DE" sz="1200" dirty="0">
-                <a:solidFill>
-                  <a:srgbClr val="000000"/>
-                </a:solidFill>
-                <a:latin typeface="Consolas" panose="020B0609020204030204" pitchFamily="49" charset="0"/>
-              </a:rPr>
-              <a:t>}</a:t>
-            </a:r>
-            <a:endParaRPr lang="de-DE" sz="1200" dirty="0"/>
-          </a:p>
-        </p:txBody>
-      </p:sp>
-      <p:sp>
-        <p:nvSpPr>
-          <p:cNvPr id="9" name="Rechteck 8"/>
-          <p:cNvSpPr/>
-          <p:nvPr/>
-        </p:nvSpPr>
-        <p:spPr>
-          <a:xfrm>
-            <a:off x="7395250" y="3249523"/>
-            <a:ext cx="6092825" cy="1569660"/>
-          </a:xfrm>
-          <a:prstGeom prst="rect">
-            <a:avLst/>
-          </a:prstGeom>
-        </p:spPr>
-        <p:txBody>
-          <a:bodyPr>
-            <a:spAutoFit/>
-          </a:bodyPr>
-          <a:lstStyle/>
-          <a:p>
-            <a:r>
-              <a:rPr lang="de-DE" sz="1200" dirty="0">
-                <a:solidFill>
-                  <a:srgbClr val="000000"/>
-                </a:solidFill>
-                <a:latin typeface="Consolas" panose="020B0609020204030204" pitchFamily="49" charset="0"/>
-              </a:rPr>
-              <a:t>[</a:t>
-            </a:r>
-            <a:r>
-              <a:rPr lang="de-DE" sz="1200" dirty="0">
-                <a:solidFill>
-                  <a:srgbClr val="2B91AF"/>
-                </a:solidFill>
-                <a:latin typeface="Consolas" panose="020B0609020204030204" pitchFamily="49" charset="0"/>
-              </a:rPr>
-              <a:t>Route</a:t>
-            </a:r>
-            <a:r>
-              <a:rPr lang="de-DE" sz="1200" dirty="0">
-                <a:solidFill>
-                  <a:srgbClr val="000000"/>
-                </a:solidFill>
-                <a:latin typeface="Consolas" panose="020B0609020204030204" pitchFamily="49" charset="0"/>
-              </a:rPr>
-              <a:t>(</a:t>
-            </a:r>
-            <a:r>
-              <a:rPr lang="de-DE" sz="1200" dirty="0">
-                <a:solidFill>
-                  <a:srgbClr val="A31515"/>
-                </a:solidFill>
-                <a:latin typeface="Consolas" panose="020B0609020204030204" pitchFamily="49" charset="0"/>
-              </a:rPr>
-              <a:t>"</a:t>
-            </a:r>
-            <a:r>
-              <a:rPr lang="de-DE" sz="1200" dirty="0" err="1">
-                <a:solidFill>
-                  <a:srgbClr val="A31515"/>
-                </a:solidFill>
-                <a:latin typeface="Consolas" panose="020B0609020204030204" pitchFamily="49" charset="0"/>
-              </a:rPr>
-              <a:t>api</a:t>
-            </a:r>
-            <a:r>
-              <a:rPr lang="de-DE" sz="1200" dirty="0">
-                <a:solidFill>
-                  <a:srgbClr val="A31515"/>
-                </a:solidFill>
-                <a:latin typeface="Consolas" panose="020B0609020204030204" pitchFamily="49" charset="0"/>
-              </a:rPr>
-              <a:t>/</a:t>
-            </a:r>
-            <a:r>
-              <a:rPr lang="de-DE" sz="1200" dirty="0" err="1">
-                <a:solidFill>
-                  <a:srgbClr val="A31515"/>
-                </a:solidFill>
-                <a:latin typeface="Consolas" panose="020B0609020204030204" pitchFamily="49" charset="0"/>
-              </a:rPr>
-              <a:t>posts</a:t>
-            </a:r>
-            <a:r>
-              <a:rPr lang="de-DE" sz="1200" dirty="0">
-                <a:solidFill>
-                  <a:srgbClr val="A31515"/>
-                </a:solidFill>
-                <a:latin typeface="Consolas" panose="020B0609020204030204" pitchFamily="49" charset="0"/>
-              </a:rPr>
-              <a:t>/</a:t>
-            </a:r>
-            <a:r>
-              <a:rPr lang="de-DE" sz="1200" dirty="0" err="1">
-                <a:solidFill>
-                  <a:srgbClr val="A31515"/>
-                </a:solidFill>
-                <a:latin typeface="Consolas" panose="020B0609020204030204" pitchFamily="49" charset="0"/>
-              </a:rPr>
-              <a:t>latest</a:t>
-            </a:r>
-            <a:r>
-              <a:rPr lang="de-DE" sz="1200" dirty="0">
-                <a:solidFill>
-                  <a:srgbClr val="A31515"/>
-                </a:solidFill>
-                <a:latin typeface="Consolas" panose="020B0609020204030204" pitchFamily="49" charset="0"/>
-              </a:rPr>
-              <a:t>"</a:t>
-            </a:r>
-            <a:r>
-              <a:rPr lang="de-DE" sz="1200" dirty="0">
-                <a:solidFill>
-                  <a:srgbClr val="000000"/>
-                </a:solidFill>
-                <a:latin typeface="Consolas" panose="020B0609020204030204" pitchFamily="49" charset="0"/>
-              </a:rPr>
-              <a:t>)]</a:t>
-            </a:r>
-          </a:p>
-          <a:p>
-            <a:r>
-              <a:rPr lang="de-DE" sz="1200" dirty="0" err="1">
-                <a:solidFill>
-                  <a:srgbClr val="0000FF"/>
-                </a:solidFill>
-                <a:latin typeface="Consolas" panose="020B0609020204030204" pitchFamily="49" charset="0"/>
-              </a:rPr>
-              <a:t>public</a:t>
-            </a:r>
-            <a:r>
-              <a:rPr lang="de-DE" sz="1200" dirty="0">
-                <a:solidFill>
-                  <a:srgbClr val="000000"/>
-                </a:solidFill>
-                <a:latin typeface="Consolas" panose="020B0609020204030204" pitchFamily="49" charset="0"/>
-              </a:rPr>
-              <a:t> </a:t>
-            </a:r>
-            <a:r>
-              <a:rPr lang="de-DE" sz="1200" dirty="0" err="1">
-                <a:solidFill>
-                  <a:srgbClr val="2B91AF"/>
-                </a:solidFill>
-                <a:latin typeface="Consolas" panose="020B0609020204030204" pitchFamily="49" charset="0"/>
-              </a:rPr>
-              <a:t>IEnumerable</a:t>
-            </a:r>
-            <a:r>
-              <a:rPr lang="de-DE" sz="1200" dirty="0">
-                <a:solidFill>
-                  <a:srgbClr val="000000"/>
-                </a:solidFill>
-                <a:latin typeface="Consolas" panose="020B0609020204030204" pitchFamily="49" charset="0"/>
-              </a:rPr>
-              <a:t>&lt;</a:t>
-            </a:r>
-            <a:r>
-              <a:rPr lang="de-DE" sz="1200" dirty="0" err="1">
-                <a:solidFill>
-                  <a:srgbClr val="2B91AF"/>
-                </a:solidFill>
-                <a:latin typeface="Consolas" panose="020B0609020204030204" pitchFamily="49" charset="0"/>
-              </a:rPr>
-              <a:t>PostDto</a:t>
-            </a:r>
-            <a:r>
-              <a:rPr lang="de-DE" sz="1200" dirty="0">
-                <a:solidFill>
-                  <a:srgbClr val="000000"/>
-                </a:solidFill>
-                <a:latin typeface="Consolas" panose="020B0609020204030204" pitchFamily="49" charset="0"/>
-              </a:rPr>
-              <a:t>&gt; </a:t>
-            </a:r>
-            <a:r>
-              <a:rPr lang="de-DE" sz="1200" dirty="0" err="1">
-                <a:solidFill>
-                  <a:srgbClr val="000000"/>
-                </a:solidFill>
-                <a:latin typeface="Consolas" panose="020B0609020204030204" pitchFamily="49" charset="0"/>
-              </a:rPr>
-              <a:t>GetLatest</a:t>
-            </a:r>
-            <a:r>
-              <a:rPr lang="de-DE" sz="1200" dirty="0">
-                <a:solidFill>
-                  <a:srgbClr val="000000"/>
-                </a:solidFill>
-                <a:latin typeface="Consolas" panose="020B0609020204030204" pitchFamily="49" charset="0"/>
-              </a:rPr>
-              <a:t>()</a:t>
-            </a:r>
-          </a:p>
-          <a:p>
-            <a:r>
-              <a:rPr lang="de-DE" sz="1200" dirty="0">
-                <a:solidFill>
-                  <a:srgbClr val="000000"/>
-                </a:solidFill>
-                <a:latin typeface="Consolas" panose="020B0609020204030204" pitchFamily="49" charset="0"/>
-              </a:rPr>
-              <a:t>{</a:t>
-            </a:r>
-          </a:p>
-          <a:p>
-            <a:r>
-              <a:rPr lang="de-DE" sz="1200" dirty="0">
-                <a:solidFill>
-                  <a:srgbClr val="000000"/>
-                </a:solidFill>
-                <a:latin typeface="Consolas" panose="020B0609020204030204" pitchFamily="49" charset="0"/>
-              </a:rPr>
-              <a:t>    </a:t>
-            </a:r>
-            <a:r>
-              <a:rPr lang="de-DE" sz="1200" dirty="0" err="1">
-                <a:solidFill>
-                  <a:srgbClr val="0000FF"/>
-                </a:solidFill>
-                <a:latin typeface="Consolas" panose="020B0609020204030204" pitchFamily="49" charset="0"/>
-              </a:rPr>
-              <a:t>return</a:t>
-            </a:r>
-            <a:r>
-              <a:rPr lang="de-DE" sz="1200" dirty="0">
-                <a:solidFill>
-                  <a:srgbClr val="000000"/>
-                </a:solidFill>
-                <a:latin typeface="Consolas" panose="020B0609020204030204" pitchFamily="49" charset="0"/>
-              </a:rPr>
-              <a:t> </a:t>
-            </a:r>
-            <a:r>
-              <a:rPr lang="de-DE" sz="1200" dirty="0" err="1" smtClean="0">
-                <a:solidFill>
-                  <a:srgbClr val="0000FF"/>
-                </a:solidFill>
-                <a:latin typeface="Consolas" panose="020B0609020204030204" pitchFamily="49" charset="0"/>
-              </a:rPr>
-              <a:t>this</a:t>
-            </a:r>
-            <a:r>
-              <a:rPr lang="de-DE" sz="1200" dirty="0" err="1" smtClean="0">
-                <a:solidFill>
-                  <a:srgbClr val="000000"/>
-                </a:solidFill>
-                <a:latin typeface="Consolas" panose="020B0609020204030204" pitchFamily="49" charset="0"/>
-              </a:rPr>
-              <a:t>.db.Posts</a:t>
-            </a:r>
-            <a:endParaRPr lang="de-DE" sz="1200" dirty="0" smtClean="0">
-              <a:solidFill>
-                <a:srgbClr val="000000"/>
-              </a:solidFill>
-              <a:latin typeface="Consolas" panose="020B0609020204030204" pitchFamily="49" charset="0"/>
-            </a:endParaRPr>
-          </a:p>
-          <a:p>
-            <a:r>
-              <a:rPr lang="de-DE" sz="1200" dirty="0">
-                <a:solidFill>
-                  <a:srgbClr val="000000"/>
-                </a:solidFill>
-                <a:latin typeface="Consolas" panose="020B0609020204030204" pitchFamily="49" charset="0"/>
-              </a:rPr>
-              <a:t> </a:t>
-            </a:r>
-            <a:r>
-              <a:rPr lang="de-DE" sz="1200" dirty="0" smtClean="0">
-                <a:solidFill>
-                  <a:srgbClr val="000000"/>
-                </a:solidFill>
-                <a:latin typeface="Consolas" panose="020B0609020204030204" pitchFamily="49" charset="0"/>
-              </a:rPr>
-              <a:t>                 .</a:t>
-            </a:r>
-            <a:r>
-              <a:rPr lang="de-DE" sz="1200" dirty="0" err="1" smtClean="0">
-                <a:solidFill>
-                  <a:srgbClr val="000000"/>
-                </a:solidFill>
-                <a:latin typeface="Consolas" panose="020B0609020204030204" pitchFamily="49" charset="0"/>
-              </a:rPr>
-              <a:t>OrderByDescending</a:t>
-            </a:r>
-            <a:r>
-              <a:rPr lang="de-DE" sz="1200" dirty="0" smtClean="0">
-                <a:solidFill>
-                  <a:srgbClr val="000000"/>
-                </a:solidFill>
-                <a:latin typeface="Consolas" panose="020B0609020204030204" pitchFamily="49" charset="0"/>
-              </a:rPr>
-              <a:t>(o </a:t>
-            </a:r>
-            <a:r>
-              <a:rPr lang="de-DE" sz="1200" dirty="0">
-                <a:solidFill>
-                  <a:srgbClr val="000000"/>
-                </a:solidFill>
-                <a:latin typeface="Consolas" panose="020B0609020204030204" pitchFamily="49" charset="0"/>
-              </a:rPr>
-              <a:t>=&gt; </a:t>
-            </a:r>
-            <a:r>
-              <a:rPr lang="de-DE" sz="1200" dirty="0" err="1">
-                <a:solidFill>
-                  <a:srgbClr val="000000"/>
-                </a:solidFill>
-                <a:latin typeface="Consolas" panose="020B0609020204030204" pitchFamily="49" charset="0"/>
-              </a:rPr>
-              <a:t>o.Created</a:t>
-            </a:r>
-            <a:r>
-              <a:rPr lang="de-DE" sz="1200" dirty="0" smtClean="0">
-                <a:solidFill>
-                  <a:srgbClr val="000000"/>
-                </a:solidFill>
-                <a:latin typeface="Consolas" panose="020B0609020204030204" pitchFamily="49" charset="0"/>
-              </a:rPr>
-              <a:t>)</a:t>
-            </a:r>
-          </a:p>
-          <a:p>
-            <a:r>
-              <a:rPr lang="de-DE" sz="1200" dirty="0" smtClean="0">
-                <a:solidFill>
-                  <a:srgbClr val="000000"/>
-                </a:solidFill>
-                <a:latin typeface="Consolas" panose="020B0609020204030204" pitchFamily="49" charset="0"/>
-              </a:rPr>
-              <a:t>                  .</a:t>
-            </a:r>
-            <a:r>
-              <a:rPr lang="de-DE" sz="1200" dirty="0" err="1">
-                <a:solidFill>
-                  <a:srgbClr val="000000"/>
-                </a:solidFill>
-                <a:latin typeface="Consolas" panose="020B0609020204030204" pitchFamily="49" charset="0"/>
-              </a:rPr>
-              <a:t>ToList</a:t>
-            </a:r>
-            <a:r>
-              <a:rPr lang="de-DE" sz="1200" dirty="0" smtClean="0">
-                <a:solidFill>
-                  <a:srgbClr val="000000"/>
-                </a:solidFill>
-                <a:latin typeface="Consolas" panose="020B0609020204030204" pitchFamily="49" charset="0"/>
-              </a:rPr>
-              <a:t>()</a:t>
-            </a:r>
-          </a:p>
-          <a:p>
-            <a:r>
-              <a:rPr lang="de-DE" sz="1200" dirty="0">
-                <a:solidFill>
-                  <a:srgbClr val="000000"/>
-                </a:solidFill>
-                <a:latin typeface="Consolas" panose="020B0609020204030204" pitchFamily="49" charset="0"/>
-              </a:rPr>
-              <a:t> </a:t>
-            </a:r>
-            <a:r>
-              <a:rPr lang="de-DE" sz="1200" dirty="0" smtClean="0">
-                <a:solidFill>
-                  <a:srgbClr val="000000"/>
-                </a:solidFill>
-                <a:latin typeface="Consolas" panose="020B0609020204030204" pitchFamily="49" charset="0"/>
-              </a:rPr>
-              <a:t>                 .</a:t>
-            </a:r>
-            <a:r>
-              <a:rPr lang="de-DE" sz="1200" dirty="0">
-                <a:solidFill>
-                  <a:srgbClr val="000000"/>
-                </a:solidFill>
-                <a:latin typeface="Consolas" panose="020B0609020204030204" pitchFamily="49" charset="0"/>
-              </a:rPr>
-              <a:t>Select(p =&gt; </a:t>
-            </a:r>
-            <a:r>
-              <a:rPr lang="de-DE" sz="1200" dirty="0" err="1">
-                <a:solidFill>
-                  <a:srgbClr val="2B91AF"/>
-                </a:solidFill>
-                <a:latin typeface="Consolas" panose="020B0609020204030204" pitchFamily="49" charset="0"/>
-              </a:rPr>
-              <a:t>PostDto</a:t>
-            </a:r>
-            <a:r>
-              <a:rPr lang="de-DE" sz="1200" dirty="0" err="1">
-                <a:solidFill>
-                  <a:srgbClr val="000000"/>
-                </a:solidFill>
-                <a:latin typeface="Consolas" panose="020B0609020204030204" pitchFamily="49" charset="0"/>
-              </a:rPr>
-              <a:t>.Map</a:t>
-            </a:r>
-            <a:r>
-              <a:rPr lang="de-DE" sz="1200" dirty="0">
-                <a:solidFill>
-                  <a:srgbClr val="000000"/>
-                </a:solidFill>
-                <a:latin typeface="Consolas" panose="020B0609020204030204" pitchFamily="49" charset="0"/>
-              </a:rPr>
-              <a:t>(p));</a:t>
-            </a:r>
-          </a:p>
-          <a:p>
-            <a:r>
-              <a:rPr lang="de-DE" sz="1200" dirty="0">
-                <a:solidFill>
-                  <a:srgbClr val="000000"/>
-                </a:solidFill>
-                <a:latin typeface="Consolas" panose="020B0609020204030204" pitchFamily="49" charset="0"/>
-              </a:rPr>
-              <a:t>}</a:t>
-            </a:r>
-            <a:endParaRPr lang="de-DE" sz="1200" dirty="0"/>
+            <a:fld id="{8F35CB8A-22DD-4279-9E9E-A49CDB5FBE56}" type="slidenum">
+              <a:rPr lang="en-US" smtClean="0"/>
+              <a:pPr/>
+              <a:t>10</a:t>
+            </a:fld>
+            <a:endParaRPr lang="en-US" dirty="0"/>
           </a:p>
         </p:txBody>
       </p:sp>
     </p:spTree>
     <p:extLst>
       <p:ext uri="{BB962C8B-B14F-4D97-AF65-F5344CB8AC3E}">
-        <p14:creationId xmlns:p14="http://schemas.microsoft.com/office/powerpoint/2010/main" val="200086261"/>
+        <p14:creationId xmlns:p14="http://schemas.microsoft.com/office/powerpoint/2010/main" val="1662466920"/>
       </p:ext>
     </p:extLst>
   </p:cSld>
@@ -6730,109 +5896,6 @@
       </p:grpSpPr>
       <p:sp>
         <p:nvSpPr>
-          <p:cNvPr id="6" name="Titel 5"/>
-          <p:cNvSpPr>
-            <a:spLocks noGrp="1"/>
-          </p:cNvSpPr>
-          <p:nvPr>
-            <p:ph type="title"/>
-          </p:nvPr>
-        </p:nvSpPr>
-        <p:spPr/>
-        <p:txBody>
-          <a:bodyPr/>
-          <a:lstStyle/>
-          <a:p>
-            <a:r>
-              <a:rPr lang="de-DE" dirty="0" smtClean="0"/>
-              <a:t>HANDS-ON</a:t>
-            </a:r>
-            <a:endParaRPr lang="de-DE" dirty="0"/>
-          </a:p>
-        </p:txBody>
-      </p:sp>
-      <p:sp>
-        <p:nvSpPr>
-          <p:cNvPr id="7" name="Untertitel 6"/>
-          <p:cNvSpPr>
-            <a:spLocks noGrp="1"/>
-          </p:cNvSpPr>
-          <p:nvPr>
-            <p:ph type="subTitle" idx="1"/>
-          </p:nvPr>
-        </p:nvSpPr>
-        <p:spPr/>
-        <p:txBody>
-          <a:bodyPr/>
-          <a:lstStyle/>
-          <a:p>
-            <a:r>
-              <a:rPr lang="de-DE" sz="4800" dirty="0" smtClean="0"/>
-              <a:t>05</a:t>
-            </a:r>
-            <a:r>
-              <a:rPr lang="de-DE" sz="4800" dirty="0"/>
-              <a:t>. Entwicklung einer Schnittstelle mit ASP.NET Web API</a:t>
-            </a:r>
-          </a:p>
-        </p:txBody>
-      </p:sp>
-      <p:sp>
-        <p:nvSpPr>
-          <p:cNvPr id="4" name="Foliennummernplatzhalter 3"/>
-          <p:cNvSpPr>
-            <a:spLocks noGrp="1"/>
-          </p:cNvSpPr>
-          <p:nvPr>
-            <p:ph type="sldNum" sz="quarter" idx="10"/>
-          </p:nvPr>
-        </p:nvSpPr>
-        <p:spPr/>
-        <p:txBody>
-          <a:bodyPr/>
-          <a:lstStyle/>
-          <a:p>
-            <a:fld id="{8F35CB8A-22DD-4279-9E9E-A49CDB5FBE56}" type="slidenum">
-              <a:rPr lang="en-US" smtClean="0"/>
-              <a:pPr/>
-              <a:t>11</a:t>
-            </a:fld>
-            <a:endParaRPr lang="en-US" dirty="0"/>
-          </a:p>
-        </p:txBody>
-      </p:sp>
-    </p:spTree>
-    <p:extLst>
-      <p:ext uri="{BB962C8B-B14F-4D97-AF65-F5344CB8AC3E}">
-        <p14:creationId xmlns:p14="http://schemas.microsoft.com/office/powerpoint/2010/main" val="1662466920"/>
-      </p:ext>
-    </p:extLst>
-  </p:cSld>
-  <p:clrMapOvr>
-    <a:masterClrMapping/>
-  </p:clrMapOvr>
-</p:sld>
-</file>
-
-<file path=ppt/slides/slide12.xml><?xml version="1.0" encoding="utf-8"?>
-<p:sld xmlns:a="http://schemas.openxmlformats.org/drawingml/2006/main" xmlns:r="http://schemas.openxmlformats.org/officeDocument/2006/relationships" xmlns:p="http://schemas.openxmlformats.org/presentationml/2006/main">
-  <p:cSld>
-    <p:spTree>
-      <p:nvGrpSpPr>
-        <p:cNvPr id="1" name=""/>
-        <p:cNvGrpSpPr/>
-        <p:nvPr/>
-      </p:nvGrpSpPr>
-      <p:grpSpPr>
-        <a:xfrm>
-          <a:off x="0" y="0"/>
-          <a:ext cx="0" cy="0"/>
-          <a:chOff x="0" y="0"/>
-          <a:chExt cx="0" cy="0"/>
-        </a:xfrm>
-      </p:grpSpPr>
-      <p:sp>
-        <p:nvSpPr>
           <p:cNvPr id="2" name="Titel 1"/>
           <p:cNvSpPr>
             <a:spLocks noGrp="1"/>
@@ -6971,7 +6034,7 @@
             <a:fld id="{8F35CB8A-22DD-4279-9E9E-A49CDB5FBE56}" type="slidenum">
               <a:rPr lang="en-US" smtClean="0"/>
               <a:pPr/>
-              <a:t>12</a:t>
+              <a:t>11</a:t>
             </a:fld>
             <a:endParaRPr lang="en-US"/>
           </a:p>
@@ -7027,7 +6090,7 @@
 </p:sld>
 </file>
 
-<file path=ppt/slides/slide13.xml><?xml version="1.0" encoding="utf-8"?>
+<file path=ppt/slides/slide12.xml><?xml version="1.0" encoding="utf-8"?>
 <p:sld xmlns:a="http://schemas.openxmlformats.org/drawingml/2006/main" xmlns:r="http://schemas.openxmlformats.org/officeDocument/2006/relationships" xmlns:p="http://schemas.openxmlformats.org/presentationml/2006/main">
   <p:cSld>
     <p:spTree>
@@ -7067,7 +6130,7 @@
               <a:pPr>
                 <a:defRPr/>
               </a:pPr>
-              <a:t>13</a:t>
+              <a:t>12</a:t>
             </a:fld>
             <a:endParaRPr lang="sv-SE" dirty="0"/>
           </a:p>
@@ -8172,97 +7235,6 @@
       </p:grpSpPr>
       <p:sp>
         <p:nvSpPr>
-          <p:cNvPr id="2" name="Titel 1"/>
-          <p:cNvSpPr>
-            <a:spLocks noGrp="1"/>
-          </p:cNvSpPr>
-          <p:nvPr>
-            <p:ph type="ctrTitle"/>
-          </p:nvPr>
-        </p:nvSpPr>
-        <p:spPr>
-          <a:xfrm>
-            <a:off x="587299" y="584335"/>
-            <a:ext cx="7804226" cy="757413"/>
-          </a:xfrm>
-        </p:spPr>
-        <p:txBody>
-          <a:bodyPr/>
-          <a:lstStyle/>
-          <a:p>
-            <a:r>
-              <a:rPr lang="de-DE" dirty="0" smtClean="0"/>
-              <a:t>05 | Entwicklung </a:t>
-            </a:r>
-            <a:r>
-              <a:rPr lang="de-DE" dirty="0"/>
-              <a:t>einer Schnittstelle mit ASP.NET Web API</a:t>
-            </a:r>
-          </a:p>
-        </p:txBody>
-      </p:sp>
-      <p:sp>
-        <p:nvSpPr>
-          <p:cNvPr id="4" name="Untertitel 3"/>
-          <p:cNvSpPr>
-            <a:spLocks noGrp="1"/>
-          </p:cNvSpPr>
-          <p:nvPr>
-            <p:ph type="subTitle" idx="1"/>
-          </p:nvPr>
-        </p:nvSpPr>
-        <p:spPr/>
-        <p:txBody>
-          <a:bodyPr/>
-          <a:lstStyle/>
-          <a:p>
-            <a:r>
-              <a:rPr lang="de-DE" dirty="0" smtClean="0"/>
-              <a:t>Florian Sibinger</a:t>
-            </a:r>
-            <a:endParaRPr lang="de-DE" dirty="0"/>
-          </a:p>
-        </p:txBody>
-      </p:sp>
-    </p:spTree>
-    <p:extLst>
-      <p:ext uri="{BB962C8B-B14F-4D97-AF65-F5344CB8AC3E}">
-        <p14:creationId xmlns:p14="http://schemas.microsoft.com/office/powerpoint/2010/main" val="3075312266"/>
-      </p:ext>
-    </p:extLst>
-  </p:cSld>
-  <p:clrMapOvr>
-    <a:masterClrMapping/>
-  </p:clrMapOvr>
-  <p:timing>
-    <p:tnLst>
-      <p:par>
-        <p:cTn id="1" dur="indefinite" restart="never" nodeType="tmRoot"/>
-      </p:par>
-    </p:tnLst>
-  </p:timing>
-</p:sld>
-</file>
-
-<file path=ppt/slides/slide5.xml><?xml version="1.0" encoding="utf-8"?>
-<p:sld xmlns:a="http://schemas.openxmlformats.org/drawingml/2006/main" xmlns:r="http://schemas.openxmlformats.org/officeDocument/2006/relationships" xmlns:p="http://schemas.openxmlformats.org/presentationml/2006/main">
-  <p:cSld>
-    <p:spTree>
-      <p:nvGrpSpPr>
-        <p:cNvPr id="1" name=""/>
-        <p:cNvGrpSpPr/>
-        <p:nvPr/>
-      </p:nvGrpSpPr>
-      <p:grpSpPr>
-        <a:xfrm>
-          <a:off x="0" y="0"/>
-          <a:ext cx="0" cy="0"/>
-          <a:chOff x="0" y="0"/>
-          <a:chExt cx="0" cy="0"/>
-        </a:xfrm>
-      </p:grpSpPr>
-      <p:sp>
-        <p:nvSpPr>
           <p:cNvPr id="6" name="Titel 1"/>
           <p:cNvSpPr>
             <a:spLocks noGrp="1"/>
@@ -8417,7 +7389,7 @@
 </p:sld>
 </file>
 
-<file path=ppt/slides/slide6.xml><?xml version="1.0" encoding="utf-8"?>
+<file path=ppt/slides/slide5.xml><?xml version="1.0" encoding="utf-8"?>
 <p:sld xmlns:a="http://schemas.openxmlformats.org/drawingml/2006/main" xmlns:r="http://schemas.openxmlformats.org/officeDocument/2006/relationships" xmlns:p="http://schemas.openxmlformats.org/presentationml/2006/main">
   <p:cSld>
     <p:spTree>
@@ -8697,7 +7669,7 @@
 </p:sld>
 </file>
 
-<file path=ppt/slides/slide7.xml><?xml version="1.0" encoding="utf-8"?>
+<file path=ppt/slides/slide6.xml><?xml version="1.0" encoding="utf-8"?>
 <p:sld xmlns:a="http://schemas.openxmlformats.org/drawingml/2006/main" xmlns:r="http://schemas.openxmlformats.org/officeDocument/2006/relationships" xmlns:p="http://schemas.openxmlformats.org/presentationml/2006/main">
   <p:cSld>
     <p:spTree>
@@ -8774,12 +7746,12 @@
               <a:t> APIs (</a:t>
             </a:r>
             <a:r>
-              <a:rPr lang="en-US" dirty="0" err="1" smtClean="0"/>
-              <a:t>Represential</a:t>
-            </a:r>
-            <a:r>
               <a:rPr lang="en-US" dirty="0" smtClean="0"/>
-              <a:t> State Transfer)</a:t>
+              <a:t>Representational </a:t>
+            </a:r>
+            <a:r>
+              <a:rPr lang="en-US" dirty="0" smtClean="0"/>
+              <a:t>State Transfer)</a:t>
             </a:r>
             <a:endParaRPr lang="en-US" dirty="0" smtClean="0">
               <a:solidFill>
@@ -9499,7 +8471,7 @@
 </p:sld>
 </file>
 
-<file path=ppt/slides/slide8.xml><?xml version="1.0" encoding="utf-8"?>
+<file path=ppt/slides/slide7.xml><?xml version="1.0" encoding="utf-8"?>
 <p:sld xmlns:a="http://schemas.openxmlformats.org/drawingml/2006/main" xmlns:r="http://schemas.openxmlformats.org/officeDocument/2006/relationships" xmlns:p="http://schemas.openxmlformats.org/presentationml/2006/main">
   <p:cSld>
     <p:spTree>
@@ -9659,6 +8631,723 @@
 </p:sld>
 </file>
 
+<file path=ppt/slides/slide8.xml><?xml version="1.0" encoding="utf-8"?>
+<p:sld xmlns:a="http://schemas.openxmlformats.org/drawingml/2006/main" xmlns:r="http://schemas.openxmlformats.org/officeDocument/2006/relationships" xmlns:p="http://schemas.openxmlformats.org/presentationml/2006/main">
+  <p:cSld>
+    <p:spTree>
+      <p:nvGrpSpPr>
+        <p:cNvPr id="1" name=""/>
+        <p:cNvGrpSpPr/>
+        <p:nvPr/>
+      </p:nvGrpSpPr>
+      <p:grpSpPr>
+        <a:xfrm>
+          <a:off x="0" y="0"/>
+          <a:ext cx="0" cy="0"/>
+          <a:chOff x="0" y="0"/>
+          <a:chExt cx="0" cy="0"/>
+        </a:xfrm>
+      </p:grpSpPr>
+      <p:sp>
+        <p:nvSpPr>
+          <p:cNvPr id="2" name="Title 1"/>
+          <p:cNvSpPr>
+            <a:spLocks noGrp="1"/>
+          </p:cNvSpPr>
+          <p:nvPr>
+            <p:ph type="title"/>
+          </p:nvPr>
+        </p:nvSpPr>
+        <p:spPr/>
+        <p:txBody>
+          <a:bodyPr/>
+          <a:lstStyle/>
+          <a:p>
+            <a:r>
+              <a:rPr lang="en-US" dirty="0" smtClean="0"/>
+              <a:t>1.4 DTO (Data-Transfer-Object)</a:t>
+            </a:r>
+            <a:endParaRPr lang="en-US" dirty="0"/>
+          </a:p>
+        </p:txBody>
+      </p:sp>
+      <p:sp>
+        <p:nvSpPr>
+          <p:cNvPr id="3" name="Content Placeholder 2"/>
+          <p:cNvSpPr>
+            <a:spLocks noGrp="1"/>
+          </p:cNvSpPr>
+          <p:nvPr>
+            <p:ph sz="quarter" idx="10"/>
+          </p:nvPr>
+        </p:nvSpPr>
+        <p:spPr>
+          <a:xfrm>
+            <a:off x="587298" y="1371600"/>
+            <a:ext cx="6020331" cy="5308560"/>
+          </a:xfrm>
+        </p:spPr>
+        <p:txBody>
+          <a:bodyPr/>
+          <a:lstStyle/>
+          <a:p>
+            <a:r>
+              <a:rPr lang="en-US" dirty="0" smtClean="0"/>
+              <a:t>Man will </a:t>
+            </a:r>
+            <a:r>
+              <a:rPr lang="en-US" dirty="0" err="1" smtClean="0"/>
+              <a:t>nicht</a:t>
+            </a:r>
+            <a:r>
+              <a:rPr lang="en-US" dirty="0" smtClean="0"/>
+              <a:t> </a:t>
+            </a:r>
+            <a:r>
+              <a:rPr lang="en-US" dirty="0" err="1" smtClean="0"/>
+              <a:t>alle</a:t>
+            </a:r>
+            <a:r>
+              <a:rPr lang="en-US" dirty="0" smtClean="0"/>
+              <a:t> Attribute </a:t>
+            </a:r>
+            <a:r>
+              <a:rPr lang="en-US" dirty="0" err="1" smtClean="0"/>
+              <a:t>eines</a:t>
+            </a:r>
+            <a:r>
+              <a:rPr lang="en-US" dirty="0" smtClean="0"/>
+              <a:t> </a:t>
+            </a:r>
+            <a:r>
+              <a:rPr lang="en-US" dirty="0" err="1" smtClean="0"/>
+              <a:t>Objekts</a:t>
+            </a:r>
+            <a:r>
+              <a:rPr lang="en-US" dirty="0" smtClean="0"/>
+              <a:t> </a:t>
+            </a:r>
+            <a:r>
+              <a:rPr lang="en-US" dirty="0" err="1" smtClean="0"/>
+              <a:t>über</a:t>
+            </a:r>
+            <a:r>
+              <a:rPr lang="en-US" dirty="0" smtClean="0"/>
+              <a:t> APIs </a:t>
+            </a:r>
+            <a:r>
+              <a:rPr lang="en-US" dirty="0" err="1" smtClean="0"/>
+              <a:t>veröffentlichen</a:t>
+            </a:r>
+            <a:endParaRPr lang="en-US" dirty="0" smtClean="0"/>
+          </a:p>
+          <a:p>
+            <a:pPr lvl="1"/>
+            <a:r>
+              <a:rPr lang="en-US" dirty="0" smtClean="0">
+                <a:solidFill>
+                  <a:schemeClr val="accent3"/>
+                </a:solidFill>
+              </a:rPr>
+              <a:t>Security</a:t>
+            </a:r>
+          </a:p>
+          <a:p>
+            <a:pPr lvl="1"/>
+            <a:r>
+              <a:rPr lang="en-US" dirty="0" smtClean="0">
+                <a:solidFill>
+                  <a:schemeClr val="accent3"/>
+                </a:solidFill>
+              </a:rPr>
+              <a:t>Performance</a:t>
+            </a:r>
+          </a:p>
+          <a:p>
+            <a:pPr lvl="1"/>
+            <a:r>
+              <a:rPr lang="en-US" dirty="0" err="1" smtClean="0">
+                <a:solidFill>
+                  <a:schemeClr val="accent3"/>
+                </a:solidFill>
+              </a:rPr>
+              <a:t>Zirkuläre</a:t>
+            </a:r>
+            <a:r>
+              <a:rPr lang="en-US" dirty="0" smtClean="0">
+                <a:solidFill>
+                  <a:schemeClr val="accent3"/>
+                </a:solidFill>
+              </a:rPr>
+              <a:t> </a:t>
+            </a:r>
+            <a:r>
+              <a:rPr lang="en-US" dirty="0" err="1" smtClean="0">
+                <a:solidFill>
+                  <a:schemeClr val="accent3"/>
+                </a:solidFill>
+              </a:rPr>
+              <a:t>Referenzen</a:t>
+            </a:r>
+            <a:endParaRPr lang="en-US" dirty="0" smtClean="0"/>
+          </a:p>
+          <a:p>
+            <a:r>
+              <a:rPr lang="en-US" dirty="0" err="1" smtClean="0"/>
+              <a:t>Lösung</a:t>
+            </a:r>
+            <a:r>
+              <a:rPr lang="en-US" dirty="0" smtClean="0"/>
+              <a:t>: </a:t>
+            </a:r>
+            <a:r>
+              <a:rPr lang="en-US" dirty="0" err="1" smtClean="0"/>
+              <a:t>Vereinfachte</a:t>
+            </a:r>
+            <a:r>
+              <a:rPr lang="en-US" dirty="0" smtClean="0"/>
+              <a:t> Version von </a:t>
+            </a:r>
+            <a:r>
+              <a:rPr lang="en-US" dirty="0" err="1" smtClean="0"/>
+              <a:t>Klassen</a:t>
+            </a:r>
+            <a:r>
+              <a:rPr lang="en-US" dirty="0" smtClean="0"/>
+              <a:t> </a:t>
+            </a:r>
+            <a:r>
+              <a:rPr lang="en-US" dirty="0" err="1" smtClean="0"/>
+              <a:t>über</a:t>
+            </a:r>
+            <a:r>
+              <a:rPr lang="en-US" dirty="0" smtClean="0"/>
+              <a:t> API </a:t>
+            </a:r>
+            <a:r>
+              <a:rPr lang="en-US" dirty="0" err="1" smtClean="0"/>
+              <a:t>nach</a:t>
+            </a:r>
+            <a:r>
+              <a:rPr lang="en-US" dirty="0" smtClean="0"/>
+              <a:t> </a:t>
+            </a:r>
+            <a:r>
+              <a:rPr lang="en-US" dirty="0" err="1" smtClean="0"/>
+              <a:t>außen</a:t>
+            </a:r>
+            <a:r>
+              <a:rPr lang="en-US" dirty="0" smtClean="0"/>
+              <a:t> </a:t>
+            </a:r>
+            <a:r>
+              <a:rPr lang="en-US" dirty="0" err="1" smtClean="0"/>
+              <a:t>reichen</a:t>
+            </a:r>
+            <a:endParaRPr lang="en-US" dirty="0"/>
+          </a:p>
+          <a:p>
+            <a:pPr lvl="1"/>
+            <a:r>
+              <a:rPr lang="en-US" dirty="0" err="1">
+                <a:solidFill>
+                  <a:schemeClr val="accent3"/>
+                </a:solidFill>
+              </a:rPr>
+              <a:t>Objekt</a:t>
+            </a:r>
+            <a:r>
+              <a:rPr lang="en-US" dirty="0">
+                <a:solidFill>
+                  <a:schemeClr val="accent3"/>
+                </a:solidFill>
+              </a:rPr>
+              <a:t> </a:t>
+            </a:r>
+            <a:r>
+              <a:rPr lang="en-US" dirty="0" err="1">
+                <a:solidFill>
+                  <a:schemeClr val="accent3"/>
+                </a:solidFill>
+              </a:rPr>
+              <a:t>zu</a:t>
+            </a:r>
+            <a:r>
+              <a:rPr lang="en-US" dirty="0">
+                <a:solidFill>
+                  <a:schemeClr val="accent3"/>
+                </a:solidFill>
+              </a:rPr>
+              <a:t> DTO </a:t>
+            </a:r>
+            <a:r>
+              <a:rPr lang="en-US" dirty="0" err="1">
+                <a:solidFill>
+                  <a:schemeClr val="accent3"/>
+                </a:solidFill>
+              </a:rPr>
+              <a:t>mappen</a:t>
+            </a:r>
+            <a:r>
+              <a:rPr lang="en-US" dirty="0">
+                <a:solidFill>
+                  <a:schemeClr val="accent3"/>
+                </a:solidFill>
+              </a:rPr>
+              <a:t> und </a:t>
+            </a:r>
+            <a:r>
+              <a:rPr lang="en-US" dirty="0" err="1">
+                <a:solidFill>
+                  <a:schemeClr val="accent3"/>
+                </a:solidFill>
+              </a:rPr>
+              <a:t>zurück</a:t>
+            </a:r>
+            <a:endParaRPr lang="en-US" dirty="0">
+              <a:solidFill>
+                <a:schemeClr val="accent3"/>
+              </a:solidFill>
+            </a:endParaRPr>
+          </a:p>
+        </p:txBody>
+      </p:sp>
+      <p:pic>
+        <p:nvPicPr>
+          <p:cNvPr id="4" name="Grafik 3"/>
+          <p:cNvPicPr>
+            <a:picLocks noChangeAspect="1"/>
+          </p:cNvPicPr>
+          <p:nvPr/>
+        </p:nvPicPr>
+        <p:blipFill>
+          <a:blip r:embed="rId3"/>
+          <a:stretch>
+            <a:fillRect/>
+          </a:stretch>
+        </p:blipFill>
+        <p:spPr>
+          <a:xfrm>
+            <a:off x="7157357" y="1044870"/>
+            <a:ext cx="4267200" cy="3028950"/>
+          </a:xfrm>
+          <a:prstGeom prst="rect">
+            <a:avLst/>
+          </a:prstGeom>
+        </p:spPr>
+      </p:pic>
+      <p:sp>
+        <p:nvSpPr>
+          <p:cNvPr id="5" name="Textfeld 4"/>
+          <p:cNvSpPr txBox="1"/>
+          <p:nvPr/>
+        </p:nvSpPr>
+        <p:spPr>
+          <a:xfrm>
+            <a:off x="6882493" y="4073820"/>
+            <a:ext cx="4816928" cy="1815882"/>
+          </a:xfrm>
+          <a:prstGeom prst="rect">
+            <a:avLst/>
+          </a:prstGeom>
+          <a:noFill/>
+        </p:spPr>
+        <p:txBody>
+          <a:bodyPr wrap="square" rtlCol="0">
+            <a:spAutoFit/>
+          </a:bodyPr>
+          <a:lstStyle/>
+          <a:p>
+            <a:r>
+              <a:rPr lang="en-US" sz="1600" dirty="0">
+                <a:solidFill>
+                  <a:srgbClr val="000000"/>
+                </a:solidFill>
+                <a:latin typeface="Consolas" panose="020B0609020204030204" pitchFamily="49" charset="0"/>
+              </a:rPr>
+              <a:t> </a:t>
+            </a:r>
+            <a:r>
+              <a:rPr lang="en-US" sz="1600" dirty="0">
+                <a:solidFill>
+                  <a:srgbClr val="0000FF"/>
+                </a:solidFill>
+                <a:latin typeface="Consolas" panose="020B0609020204030204" pitchFamily="49" charset="0"/>
+              </a:rPr>
+              <a:t>public</a:t>
+            </a:r>
+            <a:r>
+              <a:rPr lang="en-US" sz="1600" dirty="0">
+                <a:solidFill>
+                  <a:srgbClr val="000000"/>
+                </a:solidFill>
+                <a:latin typeface="Consolas" panose="020B0609020204030204" pitchFamily="49" charset="0"/>
+              </a:rPr>
+              <a:t> </a:t>
+            </a:r>
+            <a:r>
+              <a:rPr lang="en-US" sz="1600" dirty="0">
+                <a:solidFill>
+                  <a:srgbClr val="0000FF"/>
+                </a:solidFill>
+                <a:latin typeface="Consolas" panose="020B0609020204030204" pitchFamily="49" charset="0"/>
+              </a:rPr>
+              <a:t>static</a:t>
+            </a:r>
+            <a:r>
+              <a:rPr lang="en-US" sz="1600" dirty="0">
+                <a:solidFill>
+                  <a:srgbClr val="000000"/>
+                </a:solidFill>
+                <a:latin typeface="Consolas" panose="020B0609020204030204" pitchFamily="49" charset="0"/>
+              </a:rPr>
+              <a:t> </a:t>
+            </a:r>
+            <a:r>
+              <a:rPr lang="en-US" sz="1600" dirty="0" err="1" smtClean="0">
+                <a:solidFill>
+                  <a:srgbClr val="2B91AF"/>
+                </a:solidFill>
+                <a:latin typeface="Consolas" panose="020B0609020204030204" pitchFamily="49" charset="0"/>
+              </a:rPr>
+              <a:t>UserDto</a:t>
+            </a:r>
+            <a:r>
+              <a:rPr lang="en-US" sz="1600" dirty="0" smtClean="0">
+                <a:solidFill>
+                  <a:srgbClr val="000000"/>
+                </a:solidFill>
+                <a:latin typeface="Consolas" panose="020B0609020204030204" pitchFamily="49" charset="0"/>
+              </a:rPr>
+              <a:t> Map(User user) </a:t>
+            </a:r>
+            <a:r>
+              <a:rPr lang="de-DE" sz="1600" dirty="0" smtClean="0">
+                <a:solidFill>
+                  <a:srgbClr val="000000"/>
+                </a:solidFill>
+                <a:latin typeface="Consolas" panose="020B0609020204030204" pitchFamily="49" charset="0"/>
+              </a:rPr>
+              <a:t>{</a:t>
+            </a:r>
+            <a:endParaRPr lang="de-DE" sz="1600" dirty="0">
+              <a:solidFill>
+                <a:srgbClr val="000000"/>
+              </a:solidFill>
+              <a:latin typeface="Consolas" panose="020B0609020204030204" pitchFamily="49" charset="0"/>
+            </a:endParaRPr>
+          </a:p>
+          <a:p>
+            <a:r>
+              <a:rPr lang="de-DE" sz="1600" dirty="0">
+                <a:solidFill>
+                  <a:srgbClr val="000000"/>
+                </a:solidFill>
+                <a:latin typeface="Consolas" panose="020B0609020204030204" pitchFamily="49" charset="0"/>
+              </a:rPr>
+              <a:t>            </a:t>
+            </a:r>
+            <a:r>
+              <a:rPr lang="de-DE" sz="1600" dirty="0" err="1">
+                <a:solidFill>
+                  <a:srgbClr val="0000FF"/>
+                </a:solidFill>
+                <a:latin typeface="Consolas" panose="020B0609020204030204" pitchFamily="49" charset="0"/>
+              </a:rPr>
+              <a:t>return</a:t>
+            </a:r>
+            <a:r>
+              <a:rPr lang="de-DE" sz="1600" dirty="0">
+                <a:solidFill>
+                  <a:srgbClr val="000000"/>
+                </a:solidFill>
+                <a:latin typeface="Consolas" panose="020B0609020204030204" pitchFamily="49" charset="0"/>
+              </a:rPr>
+              <a:t> </a:t>
+            </a:r>
+            <a:r>
+              <a:rPr lang="de-DE" sz="1600" dirty="0" err="1">
+                <a:solidFill>
+                  <a:srgbClr val="0000FF"/>
+                </a:solidFill>
+                <a:latin typeface="Consolas" panose="020B0609020204030204" pitchFamily="49" charset="0"/>
+              </a:rPr>
+              <a:t>new</a:t>
+            </a:r>
+            <a:r>
+              <a:rPr lang="de-DE" sz="1600" dirty="0">
+                <a:solidFill>
+                  <a:srgbClr val="000000"/>
+                </a:solidFill>
+                <a:latin typeface="Consolas" panose="020B0609020204030204" pitchFamily="49" charset="0"/>
+              </a:rPr>
+              <a:t> </a:t>
+            </a:r>
+            <a:r>
+              <a:rPr lang="de-DE" sz="1600" dirty="0" err="1" smtClean="0">
+                <a:solidFill>
+                  <a:srgbClr val="2B91AF"/>
+                </a:solidFill>
+                <a:latin typeface="Consolas" panose="020B0609020204030204" pitchFamily="49" charset="0"/>
+              </a:rPr>
+              <a:t>UserDto</a:t>
+            </a:r>
+            <a:r>
+              <a:rPr lang="de-DE" sz="1600" dirty="0" smtClean="0">
+                <a:solidFill>
+                  <a:srgbClr val="000000"/>
+                </a:solidFill>
+                <a:latin typeface="Consolas" panose="020B0609020204030204" pitchFamily="49" charset="0"/>
+              </a:rPr>
+              <a:t> {</a:t>
+            </a:r>
+            <a:endParaRPr lang="de-DE" sz="1600" dirty="0">
+              <a:solidFill>
+                <a:srgbClr val="000000"/>
+              </a:solidFill>
+              <a:latin typeface="Consolas" panose="020B0609020204030204" pitchFamily="49" charset="0"/>
+            </a:endParaRPr>
+          </a:p>
+          <a:p>
+            <a:r>
+              <a:rPr lang="de-DE" sz="1600" dirty="0">
+                <a:solidFill>
+                  <a:srgbClr val="000000"/>
+                </a:solidFill>
+                <a:latin typeface="Consolas" panose="020B0609020204030204" pitchFamily="49" charset="0"/>
+              </a:rPr>
+              <a:t>            </a:t>
+            </a:r>
+            <a:r>
+              <a:rPr lang="de-DE" sz="1600" dirty="0" smtClean="0">
+                <a:solidFill>
+                  <a:srgbClr val="000000"/>
+                </a:solidFill>
+                <a:latin typeface="Consolas" panose="020B0609020204030204" pitchFamily="49" charset="0"/>
+              </a:rPr>
+              <a:t>	</a:t>
+            </a:r>
+            <a:r>
+              <a:rPr lang="de-DE" sz="1600" dirty="0" err="1" smtClean="0">
+                <a:solidFill>
+                  <a:srgbClr val="000000"/>
+                </a:solidFill>
+                <a:latin typeface="Consolas" panose="020B0609020204030204" pitchFamily="49" charset="0"/>
+              </a:rPr>
+              <a:t>Id</a:t>
+            </a:r>
+            <a:r>
+              <a:rPr lang="de-DE" sz="1600" dirty="0" smtClean="0">
+                <a:solidFill>
+                  <a:srgbClr val="000000"/>
+                </a:solidFill>
+                <a:latin typeface="Consolas" panose="020B0609020204030204" pitchFamily="49" charset="0"/>
+              </a:rPr>
+              <a:t> </a:t>
+            </a:r>
+            <a:r>
+              <a:rPr lang="de-DE" sz="1600" dirty="0">
+                <a:solidFill>
+                  <a:srgbClr val="000000"/>
+                </a:solidFill>
+                <a:latin typeface="Consolas" panose="020B0609020204030204" pitchFamily="49" charset="0"/>
+              </a:rPr>
+              <a:t>= </a:t>
+            </a:r>
+            <a:r>
+              <a:rPr lang="de-DE" sz="1600" dirty="0" err="1" smtClean="0">
+                <a:solidFill>
+                  <a:srgbClr val="000000"/>
+                </a:solidFill>
+                <a:latin typeface="Consolas" panose="020B0609020204030204" pitchFamily="49" charset="0"/>
+              </a:rPr>
+              <a:t>user.Id</a:t>
+            </a:r>
+            <a:r>
+              <a:rPr lang="de-DE" sz="1600" dirty="0" smtClean="0">
+                <a:solidFill>
+                  <a:srgbClr val="000000"/>
+                </a:solidFill>
+                <a:latin typeface="Consolas" panose="020B0609020204030204" pitchFamily="49" charset="0"/>
+              </a:rPr>
+              <a:t>,</a:t>
+            </a:r>
+            <a:r>
+              <a:rPr lang="de-DE" sz="1600" dirty="0">
+                <a:solidFill>
+                  <a:srgbClr val="000000"/>
+                </a:solidFill>
+                <a:latin typeface="Consolas" panose="020B0609020204030204" pitchFamily="49" charset="0"/>
+              </a:rPr>
+              <a:t> </a:t>
+            </a:r>
+            <a:endParaRPr lang="de-DE" sz="1600" dirty="0" smtClean="0">
+              <a:solidFill>
+                <a:srgbClr val="000000"/>
+              </a:solidFill>
+              <a:latin typeface="Consolas" panose="020B0609020204030204" pitchFamily="49" charset="0"/>
+            </a:endParaRPr>
+          </a:p>
+          <a:p>
+            <a:r>
+              <a:rPr lang="de-DE" sz="1600" dirty="0">
+                <a:solidFill>
+                  <a:srgbClr val="000000"/>
+                </a:solidFill>
+                <a:latin typeface="Consolas" panose="020B0609020204030204" pitchFamily="49" charset="0"/>
+              </a:rPr>
+              <a:t>	</a:t>
+            </a:r>
+            <a:r>
+              <a:rPr lang="de-DE" sz="1600" dirty="0" smtClean="0">
+                <a:solidFill>
+                  <a:srgbClr val="000000"/>
+                </a:solidFill>
+                <a:latin typeface="Consolas" panose="020B0609020204030204" pitchFamily="49" charset="0"/>
+              </a:rPr>
+              <a:t>	Status </a:t>
+            </a:r>
+            <a:r>
+              <a:rPr lang="de-DE" sz="1600" dirty="0">
+                <a:solidFill>
+                  <a:srgbClr val="000000"/>
+                </a:solidFill>
+                <a:latin typeface="Consolas" panose="020B0609020204030204" pitchFamily="49" charset="0"/>
+              </a:rPr>
+              <a:t>= </a:t>
+            </a:r>
+            <a:r>
+              <a:rPr lang="de-DE" sz="1600" dirty="0" err="1" smtClean="0">
+                <a:solidFill>
+                  <a:srgbClr val="000000"/>
+                </a:solidFill>
+                <a:latin typeface="Consolas" panose="020B0609020204030204" pitchFamily="49" charset="0"/>
+              </a:rPr>
+              <a:t>user.Status</a:t>
+            </a:r>
+            <a:endParaRPr lang="de-DE" sz="1600" dirty="0" smtClean="0">
+              <a:solidFill>
+                <a:srgbClr val="000000"/>
+              </a:solidFill>
+              <a:latin typeface="Consolas" panose="020B0609020204030204" pitchFamily="49" charset="0"/>
+            </a:endParaRPr>
+          </a:p>
+          <a:p>
+            <a:r>
+              <a:rPr lang="de-DE" sz="1600" dirty="0" smtClean="0">
+                <a:solidFill>
+                  <a:srgbClr val="000000"/>
+                </a:solidFill>
+                <a:latin typeface="Consolas" panose="020B0609020204030204" pitchFamily="49" charset="0"/>
+              </a:rPr>
+              <a:t> </a:t>
+            </a:r>
+            <a:r>
+              <a:rPr lang="de-DE" sz="1600" dirty="0">
+                <a:solidFill>
+                  <a:srgbClr val="000000"/>
+                </a:solidFill>
+                <a:latin typeface="Consolas" panose="020B0609020204030204" pitchFamily="49" charset="0"/>
+              </a:rPr>
+              <a:t>	</a:t>
+            </a:r>
+            <a:r>
+              <a:rPr lang="de-DE" sz="1600" dirty="0" smtClean="0">
+                <a:solidFill>
+                  <a:srgbClr val="000000"/>
+                </a:solidFill>
+                <a:latin typeface="Consolas" panose="020B0609020204030204" pitchFamily="49" charset="0"/>
+              </a:rPr>
+              <a:t>	Name </a:t>
+            </a:r>
+            <a:r>
+              <a:rPr lang="de-DE" sz="1600" dirty="0">
+                <a:solidFill>
+                  <a:srgbClr val="000000"/>
+                </a:solidFill>
+                <a:latin typeface="Consolas" panose="020B0609020204030204" pitchFamily="49" charset="0"/>
+              </a:rPr>
+              <a:t>= </a:t>
+            </a:r>
+            <a:r>
+              <a:rPr lang="de-DE" sz="1600" dirty="0" err="1" smtClean="0">
+                <a:solidFill>
+                  <a:srgbClr val="000000"/>
+                </a:solidFill>
+                <a:latin typeface="Consolas" panose="020B0609020204030204" pitchFamily="49" charset="0"/>
+              </a:rPr>
+              <a:t>user.Name</a:t>
+            </a:r>
+            <a:r>
+              <a:rPr lang="de-DE" sz="1600" dirty="0">
+                <a:solidFill>
+                  <a:srgbClr val="000000"/>
+                </a:solidFill>
+                <a:latin typeface="Consolas" panose="020B0609020204030204" pitchFamily="49" charset="0"/>
+              </a:rPr>
+              <a:t>,</a:t>
+            </a:r>
+          </a:p>
+          <a:p>
+            <a:r>
+              <a:rPr lang="de-DE" sz="1600" dirty="0">
+                <a:solidFill>
+                  <a:srgbClr val="000000"/>
+                </a:solidFill>
+                <a:latin typeface="Consolas" panose="020B0609020204030204" pitchFamily="49" charset="0"/>
+              </a:rPr>
+              <a:t>             </a:t>
+            </a:r>
+            <a:r>
+              <a:rPr lang="de-DE" sz="1600" dirty="0" smtClean="0">
+                <a:solidFill>
+                  <a:srgbClr val="000000"/>
+                </a:solidFill>
+                <a:latin typeface="Consolas" panose="020B0609020204030204" pitchFamily="49" charset="0"/>
+              </a:rPr>
+              <a:t>	};</a:t>
+            </a:r>
+          </a:p>
+          <a:p>
+            <a:r>
+              <a:rPr lang="de-DE" sz="1600" dirty="0">
+                <a:solidFill>
+                  <a:srgbClr val="000000"/>
+                </a:solidFill>
+                <a:latin typeface="Consolas" panose="020B0609020204030204" pitchFamily="49" charset="0"/>
+              </a:rPr>
+              <a:t> </a:t>
+            </a:r>
+            <a:r>
+              <a:rPr lang="de-DE" sz="1600" dirty="0" smtClean="0">
+                <a:solidFill>
+                  <a:srgbClr val="000000"/>
+                </a:solidFill>
+                <a:latin typeface="Consolas" panose="020B0609020204030204" pitchFamily="49" charset="0"/>
+              </a:rPr>
+              <a:t>}</a:t>
+            </a:r>
+            <a:endParaRPr lang="de-DE" sz="1200" dirty="0" smtClean="0">
+              <a:solidFill>
+                <a:schemeClr val="accent3"/>
+              </a:solidFill>
+            </a:endParaRPr>
+          </a:p>
+        </p:txBody>
+      </p:sp>
+    </p:spTree>
+    <p:extLst>
+      <p:ext uri="{BB962C8B-B14F-4D97-AF65-F5344CB8AC3E}">
+        <p14:creationId xmlns:p14="http://schemas.microsoft.com/office/powerpoint/2010/main" val="2505954915"/>
+      </p:ext>
+    </p:extLst>
+  </p:cSld>
+  <p:clrMapOvr>
+    <a:masterClrMapping/>
+  </p:clrMapOvr>
+</p:sld>
+</file>
+
 <file path=ppt/slides/slide9.xml><?xml version="1.0" encoding="utf-8"?>
 <p:sld xmlns:a="http://schemas.openxmlformats.org/drawingml/2006/main" xmlns:r="http://schemas.openxmlformats.org/officeDocument/2006/relationships" xmlns:p="http://schemas.openxmlformats.org/presentationml/2006/main">
   <p:cSld>
@@ -9693,7 +9382,15 @@
           <a:p>
             <a:r>
               <a:rPr lang="en-US" dirty="0" smtClean="0"/>
-              <a:t>1.4 DTO (Data-Transfer-Object)</a:t>
+              <a:t>2.1 ASP.NET Web </a:t>
+            </a:r>
+            <a:r>
+              <a:rPr lang="en-US" dirty="0" err="1" smtClean="0"/>
+              <a:t>Api</a:t>
+            </a:r>
+            <a:r>
+              <a:rPr lang="en-US" dirty="0" smtClean="0"/>
+              <a:t>: Controller und Routing</a:t>
             </a:r>
             <a:endParaRPr lang="en-US" dirty="0"/>
           </a:p>
@@ -9711,8 +9408,8 @@
         </p:nvSpPr>
         <p:spPr>
           <a:xfrm>
-            <a:off x="587298" y="1371600"/>
-            <a:ext cx="6880302" cy="5308560"/>
+            <a:off x="379364" y="1388547"/>
+            <a:ext cx="6383588" cy="5291613"/>
           </a:xfrm>
         </p:spPr>
         <p:txBody>
@@ -9721,11 +9418,11 @@
           <a:p>
             <a:r>
               <a:rPr lang="en-US" dirty="0" smtClean="0"/>
-              <a:t>Man will </a:t>
+              <a:t>Framework </a:t>
             </a:r>
             <a:r>
               <a:rPr lang="en-US" dirty="0" err="1" smtClean="0"/>
-              <a:t>nicht</a:t>
+              <a:t>zum</a:t>
             </a:r>
             <a:r>
               <a:rPr lang="en-US" dirty="0" smtClean="0"/>
@@ -9733,15 +9430,17 @@
             </a:r>
             <a:r>
               <a:rPr lang="en-US" dirty="0" err="1" smtClean="0"/>
-              <a:t>alle</a:t>
+              <a:t>Entwickeln</a:t>
             </a:r>
             <a:r>
               <a:rPr lang="en-US" dirty="0" smtClean="0"/>
-              <a:t> Attribute </a:t>
-            </a:r>
+              <a:t> von REST APIs</a:t>
+            </a:r>
+          </a:p>
+          <a:p>
             <a:r>
               <a:rPr lang="en-US" dirty="0" err="1" smtClean="0"/>
-              <a:t>eines</a:t>
+              <a:t>ApiController</a:t>
             </a:r>
             <a:r>
               <a:rPr lang="en-US" dirty="0" smtClean="0"/>
@@ -9749,7 +9448,65 @@
             </a:r>
             <a:r>
               <a:rPr lang="en-US" dirty="0" err="1" smtClean="0"/>
-              <a:t>Objekts</a:t>
+              <a:t>verarbeiten</a:t>
+            </a:r>
+            <a:r>
+              <a:rPr lang="en-US" dirty="0" smtClean="0"/>
+              <a:t> REST Requests </a:t>
+            </a:r>
+            <a:br>
+              <a:rPr lang="en-US" dirty="0" smtClean="0"/>
+            </a:br>
+            <a:r>
+              <a:rPr lang="en-US" sz="1600" dirty="0" smtClean="0"/>
+              <a:t>(</a:t>
+            </a:r>
+            <a:r>
+              <a:rPr lang="en-US" sz="1600" dirty="0" err="1" smtClean="0"/>
+              <a:t>ähnlich</a:t>
+            </a:r>
+            <a:r>
+              <a:rPr lang="en-US" sz="1600" dirty="0" smtClean="0"/>
+              <a:t> </a:t>
+            </a:r>
+            <a:r>
+              <a:rPr lang="en-US" sz="1600" dirty="0" err="1" smtClean="0"/>
+              <a:t>zu</a:t>
+            </a:r>
+            <a:r>
+              <a:rPr lang="en-US" sz="1600" dirty="0" smtClean="0"/>
+              <a:t> MVC </a:t>
+            </a:r>
+            <a:r>
+              <a:rPr lang="en-US" sz="1600" dirty="0" err="1" smtClean="0"/>
+              <a:t>Controllern</a:t>
+            </a:r>
+            <a:r>
+              <a:rPr lang="en-US" sz="1600" dirty="0" smtClean="0"/>
+              <a:t>)</a:t>
+            </a:r>
+            <a:endParaRPr lang="en-US" dirty="0" smtClean="0"/>
+          </a:p>
+          <a:p>
+            <a:r>
+              <a:rPr lang="en-US" dirty="0" err="1" smtClean="0"/>
+              <a:t>Für</a:t>
+            </a:r>
+            <a:r>
+              <a:rPr lang="en-US" dirty="0" smtClean="0"/>
+              <a:t> die </a:t>
+            </a:r>
+            <a:r>
+              <a:rPr lang="en-US" dirty="0" err="1" smtClean="0"/>
+              <a:t>Ansteuerung</a:t>
+            </a:r>
+            <a:r>
+              <a:rPr lang="en-US" dirty="0" smtClean="0"/>
+              <a:t> der </a:t>
+            </a:r>
+            <a:r>
+              <a:rPr lang="en-US" dirty="0" err="1" smtClean="0"/>
+              <a:t>Methoden</a:t>
             </a:r>
             <a:r>
               <a:rPr lang="en-US" dirty="0" smtClean="0"/>
@@ -9757,88 +9514,7 @@
             </a:r>
             <a:r>
               <a:rPr lang="en-US" dirty="0" err="1" smtClean="0"/>
-              <a:t>über</a:t>
-            </a:r>
-            <a:r>
-              <a:rPr lang="en-US" dirty="0" smtClean="0"/>
-              <a:t> APIs </a:t>
-            </a:r>
-            <a:r>
-              <a:rPr lang="en-US" dirty="0" err="1" smtClean="0"/>
-              <a:t>veröffentlichen</a:t>
-            </a:r>
-            <a:endParaRPr lang="en-US" dirty="0" smtClean="0"/>
-          </a:p>
-          <a:p>
-            <a:pPr lvl="1"/>
-            <a:r>
-              <a:rPr lang="en-US" dirty="0" smtClean="0">
-                <a:solidFill>
-                  <a:schemeClr val="accent3"/>
-                </a:solidFill>
-              </a:rPr>
-              <a:t>Security</a:t>
-            </a:r>
-          </a:p>
-          <a:p>
-            <a:pPr lvl="1"/>
-            <a:r>
-              <a:rPr lang="en-US" dirty="0" smtClean="0">
-                <a:solidFill>
-                  <a:schemeClr val="accent3"/>
-                </a:solidFill>
-              </a:rPr>
-              <a:t>Performance</a:t>
-            </a:r>
-          </a:p>
-          <a:p>
-            <a:pPr lvl="1"/>
-            <a:r>
-              <a:rPr lang="en-US" dirty="0" err="1" smtClean="0">
-                <a:solidFill>
-                  <a:schemeClr val="accent3"/>
-                </a:solidFill>
-              </a:rPr>
-              <a:t>Zirkuläre</a:t>
-            </a:r>
-            <a:r>
-              <a:rPr lang="en-US" dirty="0" smtClean="0">
-                <a:solidFill>
-                  <a:schemeClr val="accent3"/>
-                </a:solidFill>
-              </a:rPr>
-              <a:t> </a:t>
-            </a:r>
-            <a:r>
-              <a:rPr lang="en-US" dirty="0" err="1" smtClean="0">
-                <a:solidFill>
-                  <a:schemeClr val="accent3"/>
-                </a:solidFill>
-              </a:rPr>
-              <a:t>Referenzen</a:t>
-            </a:r>
-            <a:endParaRPr lang="en-US" dirty="0" smtClean="0"/>
-          </a:p>
-          <a:p>
-            <a:r>
-              <a:rPr lang="en-US" dirty="0" err="1" smtClean="0"/>
-              <a:t>Lösung</a:t>
-            </a:r>
-            <a:r>
-              <a:rPr lang="en-US" dirty="0" smtClean="0"/>
-              <a:t>: </a:t>
-            </a:r>
-            <a:r>
-              <a:rPr lang="en-US" dirty="0" err="1" smtClean="0"/>
-              <a:t>Vereinfachte</a:t>
-            </a:r>
-            <a:r>
-              <a:rPr lang="en-US" dirty="0" smtClean="0"/>
-              <a:t> Version von </a:t>
-            </a:r>
-            <a:r>
-              <a:rPr lang="en-US" dirty="0" err="1" smtClean="0"/>
-              <a:t>Klassen</a:t>
+              <a:t>werden</a:t>
             </a:r>
             <a:r>
               <a:rPr lang="en-US" dirty="0" smtClean="0"/>
@@ -9846,15 +9522,7 @@
             </a:r>
             <a:r>
               <a:rPr lang="en-US" dirty="0" err="1" smtClean="0"/>
-              <a:t>über</a:t>
-            </a:r>
-            <a:r>
-              <a:rPr lang="en-US" dirty="0" smtClean="0"/>
-              <a:t> API </a:t>
-            </a:r>
-            <a:r>
-              <a:rPr lang="en-US" dirty="0" err="1" smtClean="0"/>
-              <a:t>nach</a:t>
+              <a:t>Routen</a:t>
             </a:r>
             <a:r>
               <a:rPr lang="en-US" dirty="0" smtClean="0"/>
@@ -9862,87 +9530,873 @@
             </a:r>
             <a:r>
               <a:rPr lang="en-US" dirty="0" err="1" smtClean="0"/>
-              <a:t>außen</a:t>
-            </a:r>
-            <a:r>
-              <a:rPr lang="en-US" dirty="0" smtClean="0"/>
-              <a:t> </a:t>
-            </a:r>
-            <a:r>
-              <a:rPr lang="en-US" dirty="0" err="1" smtClean="0"/>
-              <a:t>reichen</a:t>
+              <a:t>benötigt</a:t>
             </a:r>
             <a:endParaRPr lang="en-US" dirty="0" smtClean="0"/>
           </a:p>
           <a:p>
-            <a:r>
-              <a:rPr lang="en-US" dirty="0" err="1" smtClean="0"/>
-              <a:t>Objekt</a:t>
-            </a:r>
-            <a:r>
-              <a:rPr lang="en-US" dirty="0" smtClean="0"/>
-              <a:t> muss in DTO </a:t>
-            </a:r>
-            <a:r>
-              <a:rPr lang="en-US" dirty="0" err="1" smtClean="0"/>
-              <a:t>gemappt</a:t>
-            </a:r>
-            <a:r>
-              <a:rPr lang="en-US" dirty="0" smtClean="0"/>
-              <a:t> </a:t>
-            </a:r>
-            <a:r>
-              <a:rPr lang="en-US" dirty="0" err="1" smtClean="0"/>
-              <a:t>werden</a:t>
-            </a:r>
-            <a:r>
-              <a:rPr lang="en-US" dirty="0" smtClean="0"/>
-              <a:t> und </a:t>
-            </a:r>
-            <a:r>
-              <a:rPr lang="en-US" dirty="0" err="1" smtClean="0"/>
-              <a:t>anders</a:t>
-            </a:r>
-            <a:r>
-              <a:rPr lang="en-US" dirty="0" smtClean="0"/>
-              <a:t> </a:t>
-            </a:r>
-            <a:r>
-              <a:rPr lang="en-US" dirty="0" err="1" smtClean="0"/>
-              <a:t>herum</a:t>
-            </a:r>
-            <a:endParaRPr lang="en-US" dirty="0"/>
+            <a:pPr lvl="1"/>
+            <a:r>
+              <a:rPr lang="en-US" dirty="0" smtClean="0">
+                <a:solidFill>
+                  <a:schemeClr val="accent3"/>
+                </a:solidFill>
+              </a:rPr>
+              <a:t>Convention based </a:t>
+            </a:r>
+            <a:r>
+              <a:rPr lang="en-US" dirty="0" smtClean="0">
+                <a:solidFill>
+                  <a:schemeClr val="accent3"/>
+                </a:solidFill>
+              </a:rPr>
+              <a:t>Routing / </a:t>
+            </a:r>
+            <a:r>
+              <a:rPr lang="en-US" dirty="0" err="1" smtClean="0">
+                <a:solidFill>
+                  <a:schemeClr val="accent3"/>
+                </a:solidFill>
+              </a:rPr>
+              <a:t>WebApiConfig</a:t>
+            </a:r>
+            <a:endParaRPr lang="en-US" dirty="0" smtClean="0">
+              <a:solidFill>
+                <a:schemeClr val="accent3"/>
+              </a:solidFill>
+            </a:endParaRPr>
+          </a:p>
+          <a:p>
+            <a:pPr lvl="1"/>
+            <a:r>
+              <a:rPr lang="en-US" dirty="0" smtClean="0">
+                <a:solidFill>
+                  <a:schemeClr val="accent3"/>
+                </a:solidFill>
+              </a:rPr>
+              <a:t>Attribute based </a:t>
+            </a:r>
+            <a:r>
+              <a:rPr lang="en-US" dirty="0" smtClean="0">
+                <a:solidFill>
+                  <a:schemeClr val="accent3"/>
+                </a:solidFill>
+              </a:rPr>
+              <a:t>Routing</a:t>
+            </a:r>
+            <a:endParaRPr lang="en-US" dirty="0">
+              <a:solidFill>
+                <a:schemeClr val="accent3"/>
+              </a:solidFill>
+            </a:endParaRPr>
           </a:p>
         </p:txBody>
       </p:sp>
-      <p:pic>
-        <p:nvPicPr>
-          <p:cNvPr id="4" name="Grafik 3"/>
-          <p:cNvPicPr>
-            <a:picLocks noChangeAspect="1"/>
-          </p:cNvPicPr>
+      <p:sp>
+        <p:nvSpPr>
+          <p:cNvPr id="5" name="Rechteck 4"/>
+          <p:cNvSpPr/>
           <p:nvPr/>
-        </p:nvPicPr>
-        <p:blipFill>
-          <a:blip r:embed="rId3"/>
-          <a:stretch>
-            <a:fillRect/>
-          </a:stretch>
-        </p:blipFill>
+        </p:nvSpPr>
         <p:spPr>
           <a:xfrm>
-            <a:off x="7635914" y="1472865"/>
-            <a:ext cx="4267200" cy="3028950"/>
+            <a:off x="7010400" y="1700557"/>
+            <a:ext cx="5180013" cy="1569660"/>
           </a:xfrm>
           <a:prstGeom prst="rect">
             <a:avLst/>
           </a:prstGeom>
         </p:spPr>
-      </p:pic>
+        <p:txBody>
+          <a:bodyPr wrap="square">
+            <a:spAutoFit/>
+          </a:bodyPr>
+          <a:lstStyle/>
+          <a:p>
+            <a:r>
+              <a:rPr lang="de-DE" sz="1200" dirty="0" err="1">
+                <a:solidFill>
+                  <a:srgbClr val="0000FF"/>
+                </a:solidFill>
+                <a:latin typeface="Consolas" panose="020B0609020204030204" pitchFamily="49" charset="0"/>
+              </a:rPr>
+              <a:t>public</a:t>
+            </a:r>
+            <a:r>
+              <a:rPr lang="de-DE" sz="1200" dirty="0">
+                <a:solidFill>
+                  <a:srgbClr val="000000"/>
+                </a:solidFill>
+                <a:latin typeface="Consolas" panose="020B0609020204030204" pitchFamily="49" charset="0"/>
+              </a:rPr>
+              <a:t> </a:t>
+            </a:r>
+            <a:r>
+              <a:rPr lang="de-DE" sz="1200" dirty="0" err="1">
+                <a:solidFill>
+                  <a:srgbClr val="0000FF"/>
+                </a:solidFill>
+                <a:latin typeface="Consolas" panose="020B0609020204030204" pitchFamily="49" charset="0"/>
+              </a:rPr>
+              <a:t>class</a:t>
+            </a:r>
+            <a:r>
+              <a:rPr lang="de-DE" sz="1200" dirty="0">
+                <a:solidFill>
+                  <a:srgbClr val="000000"/>
+                </a:solidFill>
+                <a:latin typeface="Consolas" panose="020B0609020204030204" pitchFamily="49" charset="0"/>
+              </a:rPr>
+              <a:t> </a:t>
+            </a:r>
+            <a:r>
+              <a:rPr lang="de-DE" sz="1200" dirty="0" err="1">
+                <a:solidFill>
+                  <a:srgbClr val="2B91AF"/>
+                </a:solidFill>
+                <a:latin typeface="Consolas" panose="020B0609020204030204" pitchFamily="49" charset="0"/>
+              </a:rPr>
+              <a:t>PostsController</a:t>
+            </a:r>
+            <a:r>
+              <a:rPr lang="de-DE" sz="1200" dirty="0">
+                <a:solidFill>
+                  <a:srgbClr val="000000"/>
+                </a:solidFill>
+                <a:latin typeface="Consolas" panose="020B0609020204030204" pitchFamily="49" charset="0"/>
+              </a:rPr>
+              <a:t> : </a:t>
+            </a:r>
+            <a:r>
+              <a:rPr lang="de-DE" sz="1200" dirty="0" err="1" smtClean="0">
+                <a:solidFill>
+                  <a:srgbClr val="000000"/>
+                </a:solidFill>
+                <a:latin typeface="Consolas" panose="020B0609020204030204" pitchFamily="49" charset="0"/>
+              </a:rPr>
+              <a:t>ApiController</a:t>
+            </a:r>
+            <a:endParaRPr lang="de-DE" sz="1200" dirty="0">
+              <a:solidFill>
+                <a:srgbClr val="000000"/>
+              </a:solidFill>
+              <a:latin typeface="Consolas" panose="020B0609020204030204" pitchFamily="49" charset="0"/>
+            </a:endParaRPr>
+          </a:p>
+          <a:p>
+            <a:r>
+              <a:rPr lang="de-DE" sz="1200" dirty="0" smtClean="0">
+                <a:solidFill>
+                  <a:srgbClr val="000000"/>
+                </a:solidFill>
+                <a:latin typeface="Consolas" panose="020B0609020204030204" pitchFamily="49" charset="0"/>
+              </a:rPr>
+              <a:t>{</a:t>
+            </a:r>
+            <a:endParaRPr lang="de-DE" sz="1200" dirty="0" smtClean="0">
+              <a:solidFill>
+                <a:srgbClr val="0000FF"/>
+              </a:solidFill>
+              <a:latin typeface="Consolas" panose="020B0609020204030204" pitchFamily="49" charset="0"/>
+            </a:endParaRPr>
+          </a:p>
+          <a:p>
+            <a:pPr lvl="1"/>
+            <a:r>
+              <a:rPr lang="de-DE" sz="1200" dirty="0" err="1" smtClean="0">
+                <a:solidFill>
+                  <a:srgbClr val="0000FF"/>
+                </a:solidFill>
+                <a:latin typeface="Consolas" panose="020B0609020204030204" pitchFamily="49" charset="0"/>
+              </a:rPr>
+              <a:t>public</a:t>
+            </a:r>
+            <a:r>
+              <a:rPr lang="de-DE" sz="1200" dirty="0" smtClean="0">
+                <a:solidFill>
+                  <a:srgbClr val="000000"/>
+                </a:solidFill>
+                <a:latin typeface="Consolas" panose="020B0609020204030204" pitchFamily="49" charset="0"/>
+              </a:rPr>
+              <a:t> </a:t>
+            </a:r>
+            <a:r>
+              <a:rPr lang="de-DE" sz="1200" dirty="0" err="1">
+                <a:solidFill>
+                  <a:srgbClr val="2B91AF"/>
+                </a:solidFill>
+                <a:latin typeface="Consolas" panose="020B0609020204030204" pitchFamily="49" charset="0"/>
+              </a:rPr>
+              <a:t>IEnumerable</a:t>
+            </a:r>
+            <a:r>
+              <a:rPr lang="de-DE" sz="1200" dirty="0">
+                <a:solidFill>
+                  <a:srgbClr val="000000"/>
+                </a:solidFill>
+                <a:latin typeface="Consolas" panose="020B0609020204030204" pitchFamily="49" charset="0"/>
+              </a:rPr>
+              <a:t>&lt;</a:t>
+            </a:r>
+            <a:r>
+              <a:rPr lang="de-DE" sz="1200" dirty="0" err="1">
+                <a:solidFill>
+                  <a:srgbClr val="2B91AF"/>
+                </a:solidFill>
+                <a:latin typeface="Consolas" panose="020B0609020204030204" pitchFamily="49" charset="0"/>
+              </a:rPr>
+              <a:t>PostDto</a:t>
+            </a:r>
+            <a:r>
+              <a:rPr lang="de-DE" sz="1200" dirty="0">
+                <a:solidFill>
+                  <a:srgbClr val="000000"/>
+                </a:solidFill>
+                <a:latin typeface="Consolas" panose="020B0609020204030204" pitchFamily="49" charset="0"/>
+              </a:rPr>
+              <a:t>&gt; </a:t>
+            </a:r>
+            <a:r>
+              <a:rPr lang="de-DE" sz="1200" dirty="0" err="1">
+                <a:solidFill>
+                  <a:srgbClr val="000000"/>
+                </a:solidFill>
+                <a:latin typeface="Consolas" panose="020B0609020204030204" pitchFamily="49" charset="0"/>
+              </a:rPr>
+              <a:t>Get</a:t>
+            </a:r>
+            <a:r>
+              <a:rPr lang="de-DE" sz="1200" dirty="0">
+                <a:solidFill>
+                  <a:srgbClr val="000000"/>
+                </a:solidFill>
+                <a:latin typeface="Consolas" panose="020B0609020204030204" pitchFamily="49" charset="0"/>
+              </a:rPr>
+              <a:t>()</a:t>
+            </a:r>
+          </a:p>
+          <a:p>
+            <a:pPr lvl="1"/>
+            <a:r>
+              <a:rPr lang="de-DE" sz="1200" dirty="0">
+                <a:solidFill>
+                  <a:srgbClr val="000000"/>
+                </a:solidFill>
+                <a:latin typeface="Consolas" panose="020B0609020204030204" pitchFamily="49" charset="0"/>
+              </a:rPr>
+              <a:t>{</a:t>
+            </a:r>
+          </a:p>
+          <a:p>
+            <a:pPr lvl="1"/>
+            <a:r>
+              <a:rPr lang="de-DE" sz="1200" dirty="0">
+                <a:solidFill>
+                  <a:srgbClr val="000000"/>
+                </a:solidFill>
+                <a:latin typeface="Consolas" panose="020B0609020204030204" pitchFamily="49" charset="0"/>
+              </a:rPr>
+              <a:t>    </a:t>
+            </a:r>
+            <a:r>
+              <a:rPr lang="de-DE" sz="1200" dirty="0" err="1">
+                <a:solidFill>
+                  <a:srgbClr val="0000FF"/>
+                </a:solidFill>
+                <a:latin typeface="Consolas" panose="020B0609020204030204" pitchFamily="49" charset="0"/>
+              </a:rPr>
+              <a:t>return</a:t>
+            </a:r>
+            <a:r>
+              <a:rPr lang="de-DE" sz="1200" dirty="0">
+                <a:solidFill>
+                  <a:srgbClr val="000000"/>
+                </a:solidFill>
+                <a:latin typeface="Consolas" panose="020B0609020204030204" pitchFamily="49" charset="0"/>
+              </a:rPr>
+              <a:t> </a:t>
+            </a:r>
+            <a:r>
+              <a:rPr lang="de-DE" sz="1200" dirty="0" err="1" smtClean="0">
+                <a:solidFill>
+                  <a:srgbClr val="0000FF"/>
+                </a:solidFill>
+                <a:latin typeface="Consolas" panose="020B0609020204030204" pitchFamily="49" charset="0"/>
+              </a:rPr>
+              <a:t>this</a:t>
+            </a:r>
+            <a:r>
+              <a:rPr lang="de-DE" sz="1200" dirty="0" err="1" smtClean="0">
+                <a:solidFill>
+                  <a:srgbClr val="000000"/>
+                </a:solidFill>
+                <a:latin typeface="Consolas" panose="020B0609020204030204" pitchFamily="49" charset="0"/>
+              </a:rPr>
+              <a:t>.db.Posts</a:t>
+            </a:r>
+            <a:endParaRPr lang="de-DE" sz="1200" dirty="0" smtClean="0">
+              <a:solidFill>
+                <a:srgbClr val="000000"/>
+              </a:solidFill>
+              <a:latin typeface="Consolas" panose="020B0609020204030204" pitchFamily="49" charset="0"/>
+            </a:endParaRPr>
+          </a:p>
+          <a:p>
+            <a:pPr lvl="1"/>
+            <a:r>
+              <a:rPr lang="de-DE" sz="1200" dirty="0">
+                <a:solidFill>
+                  <a:srgbClr val="000000"/>
+                </a:solidFill>
+                <a:latin typeface="Consolas" panose="020B0609020204030204" pitchFamily="49" charset="0"/>
+              </a:rPr>
+              <a:t> </a:t>
+            </a:r>
+            <a:r>
+              <a:rPr lang="de-DE" sz="1200" dirty="0" smtClean="0">
+                <a:solidFill>
+                  <a:srgbClr val="000000"/>
+                </a:solidFill>
+                <a:latin typeface="Consolas" panose="020B0609020204030204" pitchFamily="49" charset="0"/>
+              </a:rPr>
+              <a:t>                 .</a:t>
+            </a:r>
+            <a:r>
+              <a:rPr lang="de-DE" sz="1200" dirty="0" err="1">
+                <a:solidFill>
+                  <a:srgbClr val="000000"/>
+                </a:solidFill>
+                <a:latin typeface="Consolas" panose="020B0609020204030204" pitchFamily="49" charset="0"/>
+              </a:rPr>
+              <a:t>ToList</a:t>
+            </a:r>
+            <a:r>
+              <a:rPr lang="de-DE" sz="1200" dirty="0" smtClean="0">
+                <a:solidFill>
+                  <a:srgbClr val="000000"/>
+                </a:solidFill>
+                <a:latin typeface="Consolas" panose="020B0609020204030204" pitchFamily="49" charset="0"/>
+              </a:rPr>
+              <a:t>()</a:t>
+            </a:r>
+          </a:p>
+          <a:p>
+            <a:pPr lvl="1"/>
+            <a:r>
+              <a:rPr lang="de-DE" sz="1200" dirty="0">
+                <a:solidFill>
+                  <a:srgbClr val="000000"/>
+                </a:solidFill>
+                <a:latin typeface="Consolas" panose="020B0609020204030204" pitchFamily="49" charset="0"/>
+              </a:rPr>
+              <a:t> </a:t>
+            </a:r>
+            <a:r>
+              <a:rPr lang="de-DE" sz="1200" dirty="0" smtClean="0">
+                <a:solidFill>
+                  <a:srgbClr val="000000"/>
+                </a:solidFill>
+                <a:latin typeface="Consolas" panose="020B0609020204030204" pitchFamily="49" charset="0"/>
+              </a:rPr>
+              <a:t>                 .</a:t>
+            </a:r>
+            <a:r>
+              <a:rPr lang="de-DE" sz="1200" dirty="0">
+                <a:solidFill>
+                  <a:srgbClr val="000000"/>
+                </a:solidFill>
+                <a:latin typeface="Consolas" panose="020B0609020204030204" pitchFamily="49" charset="0"/>
+              </a:rPr>
+              <a:t>Select(p =&gt; </a:t>
+            </a:r>
+            <a:r>
+              <a:rPr lang="de-DE" sz="1200" dirty="0" err="1">
+                <a:solidFill>
+                  <a:srgbClr val="2B91AF"/>
+                </a:solidFill>
+                <a:latin typeface="Consolas" panose="020B0609020204030204" pitchFamily="49" charset="0"/>
+              </a:rPr>
+              <a:t>PostDto</a:t>
+            </a:r>
+            <a:r>
+              <a:rPr lang="de-DE" sz="1200" dirty="0" err="1">
+                <a:solidFill>
+                  <a:srgbClr val="000000"/>
+                </a:solidFill>
+                <a:latin typeface="Consolas" panose="020B0609020204030204" pitchFamily="49" charset="0"/>
+              </a:rPr>
+              <a:t>.Map</a:t>
+            </a:r>
+            <a:r>
+              <a:rPr lang="de-DE" sz="1200" dirty="0">
+                <a:solidFill>
+                  <a:srgbClr val="000000"/>
+                </a:solidFill>
+                <a:latin typeface="Consolas" panose="020B0609020204030204" pitchFamily="49" charset="0"/>
+              </a:rPr>
+              <a:t>(p));</a:t>
+            </a:r>
+          </a:p>
+          <a:p>
+            <a:pPr lvl="1"/>
+            <a:r>
+              <a:rPr lang="de-DE" sz="1200" dirty="0">
+                <a:solidFill>
+                  <a:srgbClr val="000000"/>
+                </a:solidFill>
+                <a:latin typeface="Consolas" panose="020B0609020204030204" pitchFamily="49" charset="0"/>
+              </a:rPr>
+              <a:t>}</a:t>
+            </a:r>
+            <a:endParaRPr lang="de-DE" sz="1200" dirty="0"/>
+          </a:p>
+        </p:txBody>
+      </p:sp>
+      <p:sp>
+        <p:nvSpPr>
+          <p:cNvPr id="9" name="Rechteck 8"/>
+          <p:cNvSpPr/>
+          <p:nvPr/>
+        </p:nvSpPr>
+        <p:spPr>
+          <a:xfrm>
+            <a:off x="7010400" y="3249523"/>
+            <a:ext cx="6477675" cy="1754326"/>
+          </a:xfrm>
+          <a:prstGeom prst="rect">
+            <a:avLst/>
+          </a:prstGeom>
+        </p:spPr>
+        <p:txBody>
+          <a:bodyPr wrap="square">
+            <a:spAutoFit/>
+          </a:bodyPr>
+          <a:lstStyle/>
+          <a:p>
+            <a:pPr lvl="1"/>
+            <a:r>
+              <a:rPr lang="de-DE" sz="1200" dirty="0">
+                <a:solidFill>
+                  <a:srgbClr val="000000"/>
+                </a:solidFill>
+                <a:latin typeface="Consolas" panose="020B0609020204030204" pitchFamily="49" charset="0"/>
+              </a:rPr>
+              <a:t>[</a:t>
+            </a:r>
+            <a:r>
+              <a:rPr lang="de-DE" sz="1200" dirty="0">
+                <a:solidFill>
+                  <a:srgbClr val="2B91AF"/>
+                </a:solidFill>
+                <a:latin typeface="Consolas" panose="020B0609020204030204" pitchFamily="49" charset="0"/>
+              </a:rPr>
+              <a:t>Route</a:t>
+            </a:r>
+            <a:r>
+              <a:rPr lang="de-DE" sz="1200" dirty="0">
+                <a:solidFill>
+                  <a:srgbClr val="000000"/>
+                </a:solidFill>
+                <a:latin typeface="Consolas" panose="020B0609020204030204" pitchFamily="49" charset="0"/>
+              </a:rPr>
+              <a:t>(</a:t>
+            </a:r>
+            <a:r>
+              <a:rPr lang="de-DE" sz="1200" dirty="0">
+                <a:solidFill>
+                  <a:srgbClr val="A31515"/>
+                </a:solidFill>
+                <a:latin typeface="Consolas" panose="020B0609020204030204" pitchFamily="49" charset="0"/>
+              </a:rPr>
+              <a:t>"</a:t>
+            </a:r>
+            <a:r>
+              <a:rPr lang="de-DE" sz="1200" dirty="0" err="1">
+                <a:solidFill>
+                  <a:srgbClr val="A31515"/>
+                </a:solidFill>
+                <a:latin typeface="Consolas" panose="020B0609020204030204" pitchFamily="49" charset="0"/>
+              </a:rPr>
+              <a:t>api</a:t>
+            </a:r>
+            <a:r>
+              <a:rPr lang="de-DE" sz="1200" dirty="0">
+                <a:solidFill>
+                  <a:srgbClr val="A31515"/>
+                </a:solidFill>
+                <a:latin typeface="Consolas" panose="020B0609020204030204" pitchFamily="49" charset="0"/>
+              </a:rPr>
+              <a:t>/</a:t>
+            </a:r>
+            <a:r>
+              <a:rPr lang="de-DE" sz="1200" dirty="0" err="1">
+                <a:solidFill>
+                  <a:srgbClr val="A31515"/>
+                </a:solidFill>
+                <a:latin typeface="Consolas" panose="020B0609020204030204" pitchFamily="49" charset="0"/>
+              </a:rPr>
+              <a:t>posts</a:t>
+            </a:r>
+            <a:r>
+              <a:rPr lang="de-DE" sz="1200" dirty="0">
+                <a:solidFill>
+                  <a:srgbClr val="A31515"/>
+                </a:solidFill>
+                <a:latin typeface="Consolas" panose="020B0609020204030204" pitchFamily="49" charset="0"/>
+              </a:rPr>
+              <a:t>/</a:t>
+            </a:r>
+            <a:r>
+              <a:rPr lang="de-DE" sz="1200" dirty="0" err="1">
+                <a:solidFill>
+                  <a:srgbClr val="A31515"/>
+                </a:solidFill>
+                <a:latin typeface="Consolas" panose="020B0609020204030204" pitchFamily="49" charset="0"/>
+              </a:rPr>
+              <a:t>latest</a:t>
+            </a:r>
+            <a:r>
+              <a:rPr lang="de-DE" sz="1200" dirty="0">
+                <a:solidFill>
+                  <a:srgbClr val="A31515"/>
+                </a:solidFill>
+                <a:latin typeface="Consolas" panose="020B0609020204030204" pitchFamily="49" charset="0"/>
+              </a:rPr>
+              <a:t>"</a:t>
+            </a:r>
+            <a:r>
+              <a:rPr lang="de-DE" sz="1200" dirty="0">
+                <a:solidFill>
+                  <a:srgbClr val="000000"/>
+                </a:solidFill>
+                <a:latin typeface="Consolas" panose="020B0609020204030204" pitchFamily="49" charset="0"/>
+              </a:rPr>
+              <a:t>)]</a:t>
+            </a:r>
+          </a:p>
+          <a:p>
+            <a:pPr lvl="1"/>
+            <a:r>
+              <a:rPr lang="de-DE" sz="1200" dirty="0" err="1">
+                <a:solidFill>
+                  <a:srgbClr val="0000FF"/>
+                </a:solidFill>
+                <a:latin typeface="Consolas" panose="020B0609020204030204" pitchFamily="49" charset="0"/>
+              </a:rPr>
+              <a:t>public</a:t>
+            </a:r>
+            <a:r>
+              <a:rPr lang="de-DE" sz="1200" dirty="0">
+                <a:solidFill>
+                  <a:srgbClr val="000000"/>
+                </a:solidFill>
+                <a:latin typeface="Consolas" panose="020B0609020204030204" pitchFamily="49" charset="0"/>
+              </a:rPr>
+              <a:t> </a:t>
+            </a:r>
+            <a:r>
+              <a:rPr lang="de-DE" sz="1200" dirty="0" err="1">
+                <a:solidFill>
+                  <a:srgbClr val="2B91AF"/>
+                </a:solidFill>
+                <a:latin typeface="Consolas" panose="020B0609020204030204" pitchFamily="49" charset="0"/>
+              </a:rPr>
+              <a:t>IEnumerable</a:t>
+            </a:r>
+            <a:r>
+              <a:rPr lang="de-DE" sz="1200" dirty="0">
+                <a:solidFill>
+                  <a:srgbClr val="000000"/>
+                </a:solidFill>
+                <a:latin typeface="Consolas" panose="020B0609020204030204" pitchFamily="49" charset="0"/>
+              </a:rPr>
+              <a:t>&lt;</a:t>
+            </a:r>
+            <a:r>
+              <a:rPr lang="de-DE" sz="1200" dirty="0" err="1">
+                <a:solidFill>
+                  <a:srgbClr val="2B91AF"/>
+                </a:solidFill>
+                <a:latin typeface="Consolas" panose="020B0609020204030204" pitchFamily="49" charset="0"/>
+              </a:rPr>
+              <a:t>PostDto</a:t>
+            </a:r>
+            <a:r>
+              <a:rPr lang="de-DE" sz="1200" dirty="0">
+                <a:solidFill>
+                  <a:srgbClr val="000000"/>
+                </a:solidFill>
+                <a:latin typeface="Consolas" panose="020B0609020204030204" pitchFamily="49" charset="0"/>
+              </a:rPr>
+              <a:t>&gt; </a:t>
+            </a:r>
+            <a:r>
+              <a:rPr lang="de-DE" sz="1200" dirty="0" err="1">
+                <a:solidFill>
+                  <a:srgbClr val="000000"/>
+                </a:solidFill>
+                <a:latin typeface="Consolas" panose="020B0609020204030204" pitchFamily="49" charset="0"/>
+              </a:rPr>
+              <a:t>GetLatest</a:t>
+            </a:r>
+            <a:r>
+              <a:rPr lang="de-DE" sz="1200" dirty="0">
+                <a:solidFill>
+                  <a:srgbClr val="000000"/>
+                </a:solidFill>
+                <a:latin typeface="Consolas" panose="020B0609020204030204" pitchFamily="49" charset="0"/>
+              </a:rPr>
+              <a:t>()</a:t>
+            </a:r>
+          </a:p>
+          <a:p>
+            <a:pPr lvl="1"/>
+            <a:r>
+              <a:rPr lang="de-DE" sz="1200" dirty="0">
+                <a:solidFill>
+                  <a:srgbClr val="000000"/>
+                </a:solidFill>
+                <a:latin typeface="Consolas" panose="020B0609020204030204" pitchFamily="49" charset="0"/>
+              </a:rPr>
+              <a:t>{</a:t>
+            </a:r>
+          </a:p>
+          <a:p>
+            <a:pPr lvl="1"/>
+            <a:r>
+              <a:rPr lang="de-DE" sz="1200" dirty="0">
+                <a:solidFill>
+                  <a:srgbClr val="000000"/>
+                </a:solidFill>
+                <a:latin typeface="Consolas" panose="020B0609020204030204" pitchFamily="49" charset="0"/>
+              </a:rPr>
+              <a:t>    </a:t>
+            </a:r>
+            <a:r>
+              <a:rPr lang="de-DE" sz="1200" dirty="0" err="1">
+                <a:solidFill>
+                  <a:srgbClr val="0000FF"/>
+                </a:solidFill>
+                <a:latin typeface="Consolas" panose="020B0609020204030204" pitchFamily="49" charset="0"/>
+              </a:rPr>
+              <a:t>return</a:t>
+            </a:r>
+            <a:r>
+              <a:rPr lang="de-DE" sz="1200" dirty="0">
+                <a:solidFill>
+                  <a:srgbClr val="000000"/>
+                </a:solidFill>
+                <a:latin typeface="Consolas" panose="020B0609020204030204" pitchFamily="49" charset="0"/>
+              </a:rPr>
+              <a:t> </a:t>
+            </a:r>
+            <a:r>
+              <a:rPr lang="de-DE" sz="1200" dirty="0" err="1" smtClean="0">
+                <a:solidFill>
+                  <a:srgbClr val="0000FF"/>
+                </a:solidFill>
+                <a:latin typeface="Consolas" panose="020B0609020204030204" pitchFamily="49" charset="0"/>
+              </a:rPr>
+              <a:t>this</a:t>
+            </a:r>
+            <a:r>
+              <a:rPr lang="de-DE" sz="1200" dirty="0" err="1" smtClean="0">
+                <a:solidFill>
+                  <a:srgbClr val="000000"/>
+                </a:solidFill>
+                <a:latin typeface="Consolas" panose="020B0609020204030204" pitchFamily="49" charset="0"/>
+              </a:rPr>
+              <a:t>.db.Posts</a:t>
+            </a:r>
+            <a:endParaRPr lang="de-DE" sz="1200" dirty="0" smtClean="0">
+              <a:solidFill>
+                <a:srgbClr val="000000"/>
+              </a:solidFill>
+              <a:latin typeface="Consolas" panose="020B0609020204030204" pitchFamily="49" charset="0"/>
+            </a:endParaRPr>
+          </a:p>
+          <a:p>
+            <a:pPr lvl="1"/>
+            <a:r>
+              <a:rPr lang="de-DE" sz="1200" dirty="0">
+                <a:solidFill>
+                  <a:srgbClr val="000000"/>
+                </a:solidFill>
+                <a:latin typeface="Consolas" panose="020B0609020204030204" pitchFamily="49" charset="0"/>
+              </a:rPr>
+              <a:t> </a:t>
+            </a:r>
+            <a:r>
+              <a:rPr lang="de-DE" sz="1200" dirty="0" smtClean="0">
+                <a:solidFill>
+                  <a:srgbClr val="000000"/>
+                </a:solidFill>
+                <a:latin typeface="Consolas" panose="020B0609020204030204" pitchFamily="49" charset="0"/>
+              </a:rPr>
+              <a:t>                 .</a:t>
+            </a:r>
+            <a:r>
+              <a:rPr lang="de-DE" sz="1200" dirty="0" err="1" smtClean="0">
+                <a:solidFill>
+                  <a:srgbClr val="000000"/>
+                </a:solidFill>
+                <a:latin typeface="Consolas" panose="020B0609020204030204" pitchFamily="49" charset="0"/>
+              </a:rPr>
+              <a:t>OrderByDescending</a:t>
+            </a:r>
+            <a:r>
+              <a:rPr lang="de-DE" sz="1200" dirty="0" smtClean="0">
+                <a:solidFill>
+                  <a:srgbClr val="000000"/>
+                </a:solidFill>
+                <a:latin typeface="Consolas" panose="020B0609020204030204" pitchFamily="49" charset="0"/>
+              </a:rPr>
+              <a:t>(o </a:t>
+            </a:r>
+            <a:r>
+              <a:rPr lang="de-DE" sz="1200" dirty="0">
+                <a:solidFill>
+                  <a:srgbClr val="000000"/>
+                </a:solidFill>
+                <a:latin typeface="Consolas" panose="020B0609020204030204" pitchFamily="49" charset="0"/>
+              </a:rPr>
+              <a:t>=&gt; </a:t>
+            </a:r>
+            <a:r>
+              <a:rPr lang="de-DE" sz="1200" dirty="0" err="1">
+                <a:solidFill>
+                  <a:srgbClr val="000000"/>
+                </a:solidFill>
+                <a:latin typeface="Consolas" panose="020B0609020204030204" pitchFamily="49" charset="0"/>
+              </a:rPr>
+              <a:t>o.Created</a:t>
+            </a:r>
+            <a:r>
+              <a:rPr lang="de-DE" sz="1200" dirty="0" smtClean="0">
+                <a:solidFill>
+                  <a:srgbClr val="000000"/>
+                </a:solidFill>
+                <a:latin typeface="Consolas" panose="020B0609020204030204" pitchFamily="49" charset="0"/>
+              </a:rPr>
+              <a:t>)</a:t>
+            </a:r>
+          </a:p>
+          <a:p>
+            <a:pPr lvl="1"/>
+            <a:r>
+              <a:rPr lang="de-DE" sz="1200" dirty="0" smtClean="0">
+                <a:solidFill>
+                  <a:srgbClr val="000000"/>
+                </a:solidFill>
+                <a:latin typeface="Consolas" panose="020B0609020204030204" pitchFamily="49" charset="0"/>
+              </a:rPr>
+              <a:t>                  .</a:t>
+            </a:r>
+            <a:r>
+              <a:rPr lang="de-DE" sz="1200" dirty="0" err="1">
+                <a:solidFill>
+                  <a:srgbClr val="000000"/>
+                </a:solidFill>
+                <a:latin typeface="Consolas" panose="020B0609020204030204" pitchFamily="49" charset="0"/>
+              </a:rPr>
+              <a:t>ToList</a:t>
+            </a:r>
+            <a:r>
+              <a:rPr lang="de-DE" sz="1200" dirty="0" smtClean="0">
+                <a:solidFill>
+                  <a:srgbClr val="000000"/>
+                </a:solidFill>
+                <a:latin typeface="Consolas" panose="020B0609020204030204" pitchFamily="49" charset="0"/>
+              </a:rPr>
+              <a:t>()</a:t>
+            </a:r>
+          </a:p>
+          <a:p>
+            <a:pPr lvl="1"/>
+            <a:r>
+              <a:rPr lang="de-DE" sz="1200" dirty="0">
+                <a:solidFill>
+                  <a:srgbClr val="000000"/>
+                </a:solidFill>
+                <a:latin typeface="Consolas" panose="020B0609020204030204" pitchFamily="49" charset="0"/>
+              </a:rPr>
+              <a:t> </a:t>
+            </a:r>
+            <a:r>
+              <a:rPr lang="de-DE" sz="1200" dirty="0" smtClean="0">
+                <a:solidFill>
+                  <a:srgbClr val="000000"/>
+                </a:solidFill>
+                <a:latin typeface="Consolas" panose="020B0609020204030204" pitchFamily="49" charset="0"/>
+              </a:rPr>
+              <a:t>                 .</a:t>
+            </a:r>
+            <a:r>
+              <a:rPr lang="de-DE" sz="1200" dirty="0">
+                <a:solidFill>
+                  <a:srgbClr val="000000"/>
+                </a:solidFill>
+                <a:latin typeface="Consolas" panose="020B0609020204030204" pitchFamily="49" charset="0"/>
+              </a:rPr>
+              <a:t>Select(p =&gt; </a:t>
+            </a:r>
+            <a:r>
+              <a:rPr lang="de-DE" sz="1200" dirty="0" err="1">
+                <a:solidFill>
+                  <a:srgbClr val="2B91AF"/>
+                </a:solidFill>
+                <a:latin typeface="Consolas" panose="020B0609020204030204" pitchFamily="49" charset="0"/>
+              </a:rPr>
+              <a:t>PostDto</a:t>
+            </a:r>
+            <a:r>
+              <a:rPr lang="de-DE" sz="1200" dirty="0" err="1">
+                <a:solidFill>
+                  <a:srgbClr val="000000"/>
+                </a:solidFill>
+                <a:latin typeface="Consolas" panose="020B0609020204030204" pitchFamily="49" charset="0"/>
+              </a:rPr>
+              <a:t>.Map</a:t>
+            </a:r>
+            <a:r>
+              <a:rPr lang="de-DE" sz="1200" dirty="0">
+                <a:solidFill>
+                  <a:srgbClr val="000000"/>
+                </a:solidFill>
+                <a:latin typeface="Consolas" panose="020B0609020204030204" pitchFamily="49" charset="0"/>
+              </a:rPr>
+              <a:t>(p));</a:t>
+            </a:r>
+          </a:p>
+          <a:p>
+            <a:pPr lvl="1"/>
+            <a:r>
+              <a:rPr lang="de-DE" sz="1200" dirty="0" smtClean="0">
+                <a:solidFill>
+                  <a:srgbClr val="000000"/>
+                </a:solidFill>
+                <a:latin typeface="Consolas" panose="020B0609020204030204" pitchFamily="49" charset="0"/>
+              </a:rPr>
+              <a:t>}</a:t>
+            </a:r>
+          </a:p>
+          <a:p>
+            <a:r>
+              <a:rPr lang="de-DE" sz="1200" dirty="0" smtClean="0">
+                <a:solidFill>
+                  <a:srgbClr val="000000"/>
+                </a:solidFill>
+                <a:latin typeface="Consolas" panose="020B0609020204030204" pitchFamily="49" charset="0"/>
+              </a:rPr>
+              <a:t>}	</a:t>
+            </a:r>
+          </a:p>
+        </p:txBody>
+      </p:sp>
     </p:spTree>
     <p:extLst>
       <p:ext uri="{BB962C8B-B14F-4D97-AF65-F5344CB8AC3E}">
-        <p14:creationId xmlns:p14="http://schemas.microsoft.com/office/powerpoint/2010/main" val="2505954915"/>
+        <p14:creationId xmlns:p14="http://schemas.microsoft.com/office/powerpoint/2010/main" val="200086261"/>
       </p:ext>
     </p:extLst>
   </p:cSld>

</xml_diff>

<commit_message>
added pages for code snippets
</commit_message>
<xml_diff>
--- a/05. ASP.NET Web API/Entwicklung einer Schnittstelle mit ASP.NET Web API.pptx
+++ b/05. ASP.NET Web API/Entwicklung einer Schnittstelle mit ASP.NET Web API.pptx
@@ -5,10 +5,10 @@
     <p:sldMasterId id="2147484690" r:id="rId1"/>
   </p:sldMasterIdLst>
   <p:notesMasterIdLst>
-    <p:notesMasterId r:id="rId14"/>
+    <p:notesMasterId r:id="rId16"/>
   </p:notesMasterIdLst>
   <p:handoutMasterIdLst>
-    <p:handoutMasterId r:id="rId15"/>
+    <p:handoutMasterId r:id="rId17"/>
   </p:handoutMasterIdLst>
   <p:sldIdLst>
     <p:sldId id="332" r:id="rId2"/>
@@ -19,10 +19,12 @@
     <p:sldId id="396" r:id="rId7"/>
     <p:sldId id="398" r:id="rId8"/>
     <p:sldId id="395" r:id="rId9"/>
-    <p:sldId id="401" r:id="rId10"/>
-    <p:sldId id="393" r:id="rId11"/>
-    <p:sldId id="400" r:id="rId12"/>
-    <p:sldId id="290" r:id="rId13"/>
+    <p:sldId id="403" r:id="rId10"/>
+    <p:sldId id="401" r:id="rId11"/>
+    <p:sldId id="402" r:id="rId12"/>
+    <p:sldId id="393" r:id="rId13"/>
+    <p:sldId id="400" r:id="rId14"/>
+    <p:sldId id="290" r:id="rId15"/>
   </p:sldIdLst>
   <p:sldSz cx="12190413" cy="6859588"/>
   <p:notesSz cx="7099300" cy="10234613"/>
@@ -307,7 +309,7 @@
               <a:pPr>
                 <a:defRPr/>
               </a:pPr>
-              <a:t>22.09.2017</a:t>
+              <a:t>24.09.2017</a:t>
             </a:fld>
             <a:endParaRPr lang="de-DE" dirty="0"/>
           </a:p>
@@ -506,7 +508,7 @@
               <a:pPr>
                 <a:defRPr/>
               </a:pPr>
-              <a:t>2017-09-22</a:t>
+              <a:t>2017-09-24</a:t>
             </a:fld>
             <a:endParaRPr lang="sv-SE"/>
           </a:p>
@@ -942,6 +944,116 @@
 </p:notes>
 </file>
 
+<file path=ppt/notesSlides/notesSlide10.xml><?xml version="1.0" encoding="utf-8"?>
+<p:notes xmlns:a="http://schemas.openxmlformats.org/drawingml/2006/main" xmlns:r="http://schemas.openxmlformats.org/officeDocument/2006/relationships" xmlns:p="http://schemas.openxmlformats.org/presentationml/2006/main">
+  <p:cSld>
+    <p:spTree>
+      <p:nvGrpSpPr>
+        <p:cNvPr id="1" name=""/>
+        <p:cNvGrpSpPr/>
+        <p:nvPr/>
+      </p:nvGrpSpPr>
+      <p:grpSpPr>
+        <a:xfrm>
+          <a:off x="0" y="0"/>
+          <a:ext cx="0" cy="0"/>
+          <a:chOff x="0" y="0"/>
+          <a:chExt cx="0" cy="0"/>
+        </a:xfrm>
+      </p:grpSpPr>
+      <p:sp>
+        <p:nvSpPr>
+          <p:cNvPr id="35842" name="Folienbildplatzhalter 1"/>
+          <p:cNvSpPr>
+            <a:spLocks noGrp="1" noRot="1" noChangeAspect="1" noTextEdit="1"/>
+          </p:cNvSpPr>
+          <p:nvPr>
+            <p:ph type="sldImg"/>
+          </p:nvPr>
+        </p:nvSpPr>
+        <p:spPr bwMode="auto">
+          <a:xfrm>
+            <a:off x="139700" y="768350"/>
+            <a:ext cx="6819900" cy="3836988"/>
+          </a:xfrm>
+          <a:noFill/>
+          <a:ln>
+            <a:solidFill>
+              <a:srgbClr val="000000"/>
+            </a:solidFill>
+            <a:miter lim="800000"/>
+            <a:headEnd/>
+            <a:tailEnd/>
+          </a:ln>
+        </p:spPr>
+      </p:sp>
+      <p:sp>
+        <p:nvSpPr>
+          <p:cNvPr id="35843" name="Notizenplatzhalter 2"/>
+          <p:cNvSpPr>
+            <a:spLocks noGrp="1"/>
+          </p:cNvSpPr>
+          <p:nvPr>
+            <p:ph type="body" idx="1"/>
+          </p:nvPr>
+        </p:nvSpPr>
+        <p:spPr bwMode="auto">
+          <a:noFill/>
+        </p:spPr>
+        <p:txBody>
+          <a:bodyPr wrap="square" numCol="1" anchor="t" anchorCtr="0" compatLnSpc="1">
+            <a:prstTxWarp prst="textNoShape">
+              <a:avLst/>
+            </a:prstTxWarp>
+          </a:bodyPr>
+          <a:lstStyle/>
+          <a:p>
+            <a:endParaRPr lang="de-DE" dirty="0" smtClean="0"/>
+          </a:p>
+        </p:txBody>
+      </p:sp>
+      <p:sp>
+        <p:nvSpPr>
+          <p:cNvPr id="4" name="Foliennummernplatzhalter 3"/>
+          <p:cNvSpPr>
+            <a:spLocks noGrp="1"/>
+          </p:cNvSpPr>
+          <p:nvPr>
+            <p:ph type="sldNum" sz="quarter" idx="5"/>
+          </p:nvPr>
+        </p:nvSpPr>
+        <p:spPr/>
+        <p:txBody>
+          <a:bodyPr/>
+          <a:lstStyle/>
+          <a:p>
+            <a:pPr>
+              <a:defRPr/>
+            </a:pPr>
+            <a:fld id="{E5B22351-C0A7-44C9-AD1C-4123D43CDD3F}" type="slidenum">
+              <a:rPr lang="sv-SE" smtClean="0"/>
+              <a:pPr>
+                <a:defRPr/>
+              </a:pPr>
+              <a:t>14</a:t>
+            </a:fld>
+            <a:endParaRPr lang="sv-SE"/>
+          </a:p>
+        </p:txBody>
+      </p:sp>
+    </p:spTree>
+    <p:extLst>
+      <p:ext uri="{BB962C8B-B14F-4D97-AF65-F5344CB8AC3E}">
+        <p14:creationId xmlns:p14="http://schemas.microsoft.com/office/powerpoint/2010/main" val="3268157013"/>
+      </p:ext>
+    </p:extLst>
+  </p:cSld>
+  <p:clrMapOvr>
+    <a:masterClrMapping/>
+  </p:clrMapOvr>
+</p:notes>
+</file>
+
 <file path=ppt/notesSlides/notesSlide2.xml><?xml version="1.0" encoding="utf-8"?>
 <p:notes xmlns:a="http://schemas.openxmlformats.org/drawingml/2006/main" xmlns:r="http://schemas.openxmlformats.org/officeDocument/2006/relationships" xmlns:p="http://schemas.openxmlformats.org/presentationml/2006/main">
   <p:cSld>
@@ -1331,7 +1443,7 @@
           </a:bodyPr>
           <a:lstStyle/>
           <a:p>
-            <a:endParaRPr lang="en-US" sz="1000">
+            <a:endParaRPr lang="en-US" sz="1000" dirty="0">
               <a:latin typeface="Arial"/>
             </a:endParaRPr>
           </a:p>
@@ -1924,7 +2036,7 @@
     </p:spTree>
     <p:extLst>
       <p:ext uri="{BB962C8B-B14F-4D97-AF65-F5344CB8AC3E}">
-        <p14:creationId xmlns:p14="http://schemas.microsoft.com/office/powerpoint/2010/main" val="4011492239"/>
+        <p14:creationId xmlns:p14="http://schemas.microsoft.com/office/powerpoint/2010/main" val="48703758"/>
       </p:ext>
     </p:extLst>
   </p:cSld>
@@ -1953,7 +2065,7 @@
       </p:grpSpPr>
       <p:sp>
         <p:nvSpPr>
-          <p:cNvPr id="2" name="Folienbildplatzhalter 1"/>
+          <p:cNvPr id="2" name="Slide Image Placeholder 1"/>
           <p:cNvSpPr>
             <a:spLocks noGrp="1" noRot="1" noChangeAspect="1"/>
           </p:cNvSpPr>
@@ -1961,11 +2073,16 @@
             <p:ph type="sldImg"/>
           </p:nvPr>
         </p:nvSpPr>
-        <p:spPr/>
-      </p:sp>
-      <p:sp>
-        <p:nvSpPr>
-          <p:cNvPr id="3" name="Notizenplatzhalter 2"/>
+        <p:spPr>
+          <a:xfrm>
+            <a:off x="3914775" y="73025"/>
+            <a:ext cx="3289300" cy="1851025"/>
+          </a:xfrm>
+        </p:spPr>
+      </p:sp>
+      <p:sp>
+        <p:nvSpPr>
+          <p:cNvPr id="3" name="Notes Placeholder 2"/>
           <p:cNvSpPr>
             <a:spLocks noGrp="1"/>
           </p:cNvSpPr>
@@ -1973,18 +2090,37 @@
             <p:ph type="body" idx="1"/>
           </p:nvPr>
         </p:nvSpPr>
-        <p:spPr/>
-        <p:txBody>
-          <a:bodyPr/>
+        <p:spPr>
+          <a:xfrm>
+            <a:off x="310895" y="2093975"/>
+            <a:ext cx="6153911" cy="6604000"/>
+          </a:xfrm>
+        </p:spPr>
+        <p:txBody>
+          <a:bodyPr>
+            <a:noAutofit/>
+          </a:bodyPr>
           <a:lstStyle/>
           <a:p>
-            <a:endParaRPr lang="de-DE" dirty="0"/>
-          </a:p>
-        </p:txBody>
-      </p:sp>
-      <p:sp>
-        <p:nvSpPr>
-          <p:cNvPr id="4" name="Foliennummernplatzhalter 3"/>
+            <a:pPr>
+              <a:lnSpc>
+                <a:spcPct val="115000"/>
+              </a:lnSpc>
+              <a:spcAft>
+                <a:spcPts val="1000"/>
+              </a:spcAft>
+            </a:pPr>
+            <a:endParaRPr lang="en-US" sz="1000" dirty="0">
+              <a:latin typeface="Arial"/>
+              <a:ea typeface="Times New Roman"/>
+              <a:cs typeface="Times New Roman"/>
+            </a:endParaRPr>
+          </a:p>
+        </p:txBody>
+      </p:sp>
+      <p:sp>
+        <p:nvSpPr>
+          <p:cNvPr id="4" name="Slide Number Placeholder 3"/>
           <p:cNvSpPr>
             <a:spLocks noGrp="1"/>
           </p:cNvSpPr>
@@ -1997,24 +2133,133 @@
           <a:bodyPr/>
           <a:lstStyle/>
           <a:p>
-            <a:pPr>
-              <a:defRPr/>
-            </a:pPr>
-            <a:fld id="{9FD97EF8-451C-4BD4-A577-78C919C344DB}" type="slidenum">
-              <a:rPr lang="sv-SE" smtClean="0"/>
-              <a:pPr>
-                <a:defRPr/>
-              </a:pPr>
-              <a:t>11</a:t>
+            <a:fld id="{0E250944-C459-49FA-BBE9-2A0996DD63D5}" type="slidenum">
+              <a:rPr lang="en-US" smtClean="0"/>
+              <a:pPr/>
+              <a:t>10</a:t>
             </a:fld>
-            <a:endParaRPr lang="sv-SE"/>
+            <a:endParaRPr lang="en-US"/>
+          </a:p>
+        </p:txBody>
+      </p:sp>
+      <p:sp>
+        <p:nvSpPr>
+          <p:cNvPr id="5" name="Rectangle 4"/>
+          <p:cNvSpPr/>
+          <p:nvPr/>
+        </p:nvSpPr>
+        <p:spPr>
+          <a:xfrm>
+            <a:off x="0" y="0"/>
+            <a:ext cx="3038475" cy="222250"/>
+          </a:xfrm>
+          <a:prstGeom prst="rect">
+            <a:avLst/>
+          </a:prstGeom>
+          <a:noFill/>
+          <a:ln>
+            <a:noFill/>
+          </a:ln>
+        </p:spPr>
+        <p:style>
+          <a:lnRef idx="2">
+            <a:schemeClr val="accent1">
+              <a:shade val="50000"/>
+            </a:schemeClr>
+          </a:lnRef>
+          <a:fillRef idx="1">
+            <a:schemeClr val="accent1"/>
+          </a:fillRef>
+          <a:effectRef idx="0">
+            <a:schemeClr val="accent1"/>
+          </a:effectRef>
+          <a:fontRef idx="minor">
+            <a:schemeClr val="lt1"/>
+          </a:fontRef>
+        </p:style>
+        <p:txBody>
+          <a:bodyPr rtlCol="0" anchor="ctr"/>
+          <a:lstStyle/>
+          <a:p>
+            <a:r>
+              <a:rPr lang="en-US" sz="1200" b="1" smtClean="0">
+                <a:solidFill>
+                  <a:srgbClr val="000000"/>
+                </a:solidFill>
+                <a:latin typeface="Arial"/>
+              </a:rPr>
+              <a:t>20486A</a:t>
+            </a:r>
+            <a:endParaRPr lang="en-US" sz="1200" b="1">
+              <a:solidFill>
+                <a:srgbClr val="000000"/>
+              </a:solidFill>
+              <a:latin typeface="Arial"/>
+            </a:endParaRPr>
+          </a:p>
+        </p:txBody>
+      </p:sp>
+      <p:sp>
+        <p:nvSpPr>
+          <p:cNvPr id="6" name="Rectangle 5"/>
+          <p:cNvSpPr/>
+          <p:nvPr/>
+        </p:nvSpPr>
+        <p:spPr>
+          <a:xfrm>
+            <a:off x="0" y="238125"/>
+            <a:ext cx="3038475" cy="347662"/>
+          </a:xfrm>
+          <a:prstGeom prst="rect">
+            <a:avLst/>
+          </a:prstGeom>
+          <a:noFill/>
+          <a:ln>
+            <a:noFill/>
+          </a:ln>
+        </p:spPr>
+        <p:style>
+          <a:lnRef idx="2">
+            <a:schemeClr val="accent1">
+              <a:shade val="50000"/>
+            </a:schemeClr>
+          </a:lnRef>
+          <a:fillRef idx="1">
+            <a:schemeClr val="accent1"/>
+          </a:fillRef>
+          <a:effectRef idx="0">
+            <a:schemeClr val="accent1"/>
+          </a:effectRef>
+          <a:fontRef idx="minor">
+            <a:schemeClr val="lt1"/>
+          </a:fontRef>
+        </p:style>
+        <p:txBody>
+          <a:bodyPr rtlCol="0" anchor="ctr"/>
+          <a:lstStyle/>
+          <a:p>
+            <a:r>
+              <a:rPr lang="en-US" sz="1200" b="1" smtClean="0">
+                <a:solidFill>
+                  <a:srgbClr val="336699"/>
+                </a:solidFill>
+                <a:latin typeface="Arial"/>
+              </a:rPr>
+              <a:t>14: Implementing Web APIs in ASP.NET MVC 4 Web Applications</a:t>
+            </a:r>
+            <a:endParaRPr lang="en-US" sz="1200" b="1">
+              <a:solidFill>
+                <a:srgbClr val="336699"/>
+              </a:solidFill>
+              <a:latin typeface="Arial"/>
+            </a:endParaRPr>
           </a:p>
         </p:txBody>
       </p:sp>
     </p:spTree>
     <p:extLst>
       <p:ext uri="{BB962C8B-B14F-4D97-AF65-F5344CB8AC3E}">
-        <p14:creationId xmlns:p14="http://schemas.microsoft.com/office/powerpoint/2010/main" val="177084759"/>
+        <p14:creationId xmlns:p14="http://schemas.microsoft.com/office/powerpoint/2010/main" val="4011492239"/>
       </p:ext>
     </p:extLst>
   </p:cSld>
@@ -2043,33 +2288,24 @@
       </p:grpSpPr>
       <p:sp>
         <p:nvSpPr>
-          <p:cNvPr id="35842" name="Folienbildplatzhalter 1"/>
+          <p:cNvPr id="2" name="Slide Image Placeholder 1"/>
           <p:cNvSpPr>
-            <a:spLocks noGrp="1" noRot="1" noChangeAspect="1" noTextEdit="1"/>
+            <a:spLocks noGrp="1" noRot="1" noChangeAspect="1"/>
           </p:cNvSpPr>
           <p:nvPr>
             <p:ph type="sldImg"/>
           </p:nvPr>
         </p:nvSpPr>
-        <p:spPr bwMode="auto">
+        <p:spPr>
           <a:xfrm>
-            <a:off x="139700" y="768350"/>
-            <a:ext cx="6819900" cy="3836988"/>
+            <a:off x="3914775" y="73025"/>
+            <a:ext cx="3289300" cy="1851025"/>
           </a:xfrm>
-          <a:noFill/>
-          <a:ln>
-            <a:solidFill>
-              <a:srgbClr val="000000"/>
-            </a:solidFill>
-            <a:miter lim="800000"/>
-            <a:headEnd/>
-            <a:tailEnd/>
-          </a:ln>
         </p:spPr>
       </p:sp>
       <p:sp>
         <p:nvSpPr>
-          <p:cNvPr id="35843" name="Notizenplatzhalter 2"/>
+          <p:cNvPr id="3" name="Notes Placeholder 2"/>
           <p:cNvSpPr>
             <a:spLocks noGrp="1"/>
           </p:cNvSpPr>
@@ -2077,18 +2313,230 @@
             <p:ph type="body" idx="1"/>
           </p:nvPr>
         </p:nvSpPr>
-        <p:spPr bwMode="auto">
-          <a:noFill/>
+        <p:spPr>
+          <a:xfrm>
+            <a:off x="310895" y="2093975"/>
+            <a:ext cx="6153911" cy="6604000"/>
+          </a:xfrm>
         </p:spPr>
         <p:txBody>
-          <a:bodyPr wrap="square" numCol="1" anchor="t" anchorCtr="0" compatLnSpc="1">
-            <a:prstTxWarp prst="textNoShape">
-              <a:avLst/>
-            </a:prstTxWarp>
+          <a:bodyPr>
+            <a:noAutofit/>
           </a:bodyPr>
           <a:lstStyle/>
           <a:p>
-            <a:endParaRPr lang="de-DE" dirty="0" smtClean="0"/>
+            <a:pPr>
+              <a:lnSpc>
+                <a:spcPct val="115000"/>
+              </a:lnSpc>
+              <a:spcAft>
+                <a:spcPts val="1000"/>
+              </a:spcAft>
+            </a:pPr>
+            <a:endParaRPr lang="en-US" sz="1000" dirty="0">
+              <a:latin typeface="Arial"/>
+              <a:ea typeface="Times New Roman"/>
+              <a:cs typeface="Times New Roman"/>
+            </a:endParaRPr>
+          </a:p>
+        </p:txBody>
+      </p:sp>
+      <p:sp>
+        <p:nvSpPr>
+          <p:cNvPr id="4" name="Slide Number Placeholder 3"/>
+          <p:cNvSpPr>
+            <a:spLocks noGrp="1"/>
+          </p:cNvSpPr>
+          <p:nvPr>
+            <p:ph type="sldNum" sz="quarter" idx="10"/>
+          </p:nvPr>
+        </p:nvSpPr>
+        <p:spPr/>
+        <p:txBody>
+          <a:bodyPr/>
+          <a:lstStyle/>
+          <a:p>
+            <a:fld id="{0E250944-C459-49FA-BBE9-2A0996DD63D5}" type="slidenum">
+              <a:rPr lang="en-US" smtClean="0"/>
+              <a:pPr/>
+              <a:t>11</a:t>
+            </a:fld>
+            <a:endParaRPr lang="en-US"/>
+          </a:p>
+        </p:txBody>
+      </p:sp>
+      <p:sp>
+        <p:nvSpPr>
+          <p:cNvPr id="5" name="Rectangle 4"/>
+          <p:cNvSpPr/>
+          <p:nvPr/>
+        </p:nvSpPr>
+        <p:spPr>
+          <a:xfrm>
+            <a:off x="0" y="0"/>
+            <a:ext cx="3038475" cy="222250"/>
+          </a:xfrm>
+          <a:prstGeom prst="rect">
+            <a:avLst/>
+          </a:prstGeom>
+          <a:noFill/>
+          <a:ln>
+            <a:noFill/>
+          </a:ln>
+        </p:spPr>
+        <p:style>
+          <a:lnRef idx="2">
+            <a:schemeClr val="accent1">
+              <a:shade val="50000"/>
+            </a:schemeClr>
+          </a:lnRef>
+          <a:fillRef idx="1">
+            <a:schemeClr val="accent1"/>
+          </a:fillRef>
+          <a:effectRef idx="0">
+            <a:schemeClr val="accent1"/>
+          </a:effectRef>
+          <a:fontRef idx="minor">
+            <a:schemeClr val="lt1"/>
+          </a:fontRef>
+        </p:style>
+        <p:txBody>
+          <a:bodyPr rtlCol="0" anchor="ctr"/>
+          <a:lstStyle/>
+          <a:p>
+            <a:r>
+              <a:rPr lang="en-US" sz="1200" b="1" smtClean="0">
+                <a:solidFill>
+                  <a:srgbClr val="000000"/>
+                </a:solidFill>
+                <a:latin typeface="Arial"/>
+              </a:rPr>
+              <a:t>20486A</a:t>
+            </a:r>
+            <a:endParaRPr lang="en-US" sz="1200" b="1">
+              <a:solidFill>
+                <a:srgbClr val="000000"/>
+              </a:solidFill>
+              <a:latin typeface="Arial"/>
+            </a:endParaRPr>
+          </a:p>
+        </p:txBody>
+      </p:sp>
+      <p:sp>
+        <p:nvSpPr>
+          <p:cNvPr id="6" name="Rectangle 5"/>
+          <p:cNvSpPr/>
+          <p:nvPr/>
+        </p:nvSpPr>
+        <p:spPr>
+          <a:xfrm>
+            <a:off x="0" y="238125"/>
+            <a:ext cx="3038475" cy="347662"/>
+          </a:xfrm>
+          <a:prstGeom prst="rect">
+            <a:avLst/>
+          </a:prstGeom>
+          <a:noFill/>
+          <a:ln>
+            <a:noFill/>
+          </a:ln>
+        </p:spPr>
+        <p:style>
+          <a:lnRef idx="2">
+            <a:schemeClr val="accent1">
+              <a:shade val="50000"/>
+            </a:schemeClr>
+          </a:lnRef>
+          <a:fillRef idx="1">
+            <a:schemeClr val="accent1"/>
+          </a:fillRef>
+          <a:effectRef idx="0">
+            <a:schemeClr val="accent1"/>
+          </a:effectRef>
+          <a:fontRef idx="minor">
+            <a:schemeClr val="lt1"/>
+          </a:fontRef>
+        </p:style>
+        <p:txBody>
+          <a:bodyPr rtlCol="0" anchor="ctr"/>
+          <a:lstStyle/>
+          <a:p>
+            <a:r>
+              <a:rPr lang="en-US" sz="1200" b="1" smtClean="0">
+                <a:solidFill>
+                  <a:srgbClr val="336699"/>
+                </a:solidFill>
+                <a:latin typeface="Arial"/>
+              </a:rPr>
+              <a:t>14: Implementing Web APIs in ASP.NET MVC 4 Web Applications</a:t>
+            </a:r>
+            <a:endParaRPr lang="en-US" sz="1200" b="1">
+              <a:solidFill>
+                <a:srgbClr val="336699"/>
+              </a:solidFill>
+              <a:latin typeface="Arial"/>
+            </a:endParaRPr>
+          </a:p>
+        </p:txBody>
+      </p:sp>
+    </p:spTree>
+    <p:extLst>
+      <p:ext uri="{BB962C8B-B14F-4D97-AF65-F5344CB8AC3E}">
+        <p14:creationId xmlns:p14="http://schemas.microsoft.com/office/powerpoint/2010/main" val="4133550646"/>
+      </p:ext>
+    </p:extLst>
+  </p:cSld>
+  <p:clrMapOvr>
+    <a:masterClrMapping/>
+  </p:clrMapOvr>
+</p:notes>
+</file>
+
+<file path=ppt/notesSlides/notesSlide9.xml><?xml version="1.0" encoding="utf-8"?>
+<p:notes xmlns:a="http://schemas.openxmlformats.org/drawingml/2006/main" xmlns:r="http://schemas.openxmlformats.org/officeDocument/2006/relationships" xmlns:p="http://schemas.openxmlformats.org/presentationml/2006/main">
+  <p:cSld>
+    <p:spTree>
+      <p:nvGrpSpPr>
+        <p:cNvPr id="1" name=""/>
+        <p:cNvGrpSpPr/>
+        <p:nvPr/>
+      </p:nvGrpSpPr>
+      <p:grpSpPr>
+        <a:xfrm>
+          <a:off x="0" y="0"/>
+          <a:ext cx="0" cy="0"/>
+          <a:chOff x="0" y="0"/>
+          <a:chExt cx="0" cy="0"/>
+        </a:xfrm>
+      </p:grpSpPr>
+      <p:sp>
+        <p:nvSpPr>
+          <p:cNvPr id="2" name="Folienbildplatzhalter 1"/>
+          <p:cNvSpPr>
+            <a:spLocks noGrp="1" noRot="1" noChangeAspect="1"/>
+          </p:cNvSpPr>
+          <p:nvPr>
+            <p:ph type="sldImg"/>
+          </p:nvPr>
+        </p:nvSpPr>
+        <p:spPr/>
+      </p:sp>
+      <p:sp>
+        <p:nvSpPr>
+          <p:cNvPr id="3" name="Notizenplatzhalter 2"/>
+          <p:cNvSpPr>
+            <a:spLocks noGrp="1"/>
+          </p:cNvSpPr>
+          <p:nvPr>
+            <p:ph type="body" idx="1"/>
+          </p:nvPr>
+        </p:nvSpPr>
+        <p:spPr/>
+        <p:txBody>
+          <a:bodyPr/>
+          <a:lstStyle/>
+          <a:p>
+            <a:endParaRPr lang="de-DE" dirty="0"/>
           </a:p>
         </p:txBody>
       </p:sp>
@@ -2099,7 +2547,7 @@
             <a:spLocks noGrp="1"/>
           </p:cNvSpPr>
           <p:nvPr>
-            <p:ph type="sldNum" sz="quarter" idx="5"/>
+            <p:ph type="sldNum" sz="quarter" idx="10"/>
           </p:nvPr>
         </p:nvSpPr>
         <p:spPr/>
@@ -2110,12 +2558,12 @@
             <a:pPr>
               <a:defRPr/>
             </a:pPr>
-            <a:fld id="{E5B22351-C0A7-44C9-AD1C-4123D43CDD3F}" type="slidenum">
+            <a:fld id="{9FD97EF8-451C-4BD4-A577-78C919C344DB}" type="slidenum">
               <a:rPr lang="sv-SE" smtClean="0"/>
               <a:pPr>
                 <a:defRPr/>
               </a:pPr>
-              <a:t>12</a:t>
+              <a:t>13</a:t>
             </a:fld>
             <a:endParaRPr lang="sv-SE"/>
           </a:p>
@@ -2124,7 +2572,7 @@
     </p:spTree>
     <p:extLst>
       <p:ext uri="{BB962C8B-B14F-4D97-AF65-F5344CB8AC3E}">
-        <p14:creationId xmlns:p14="http://schemas.microsoft.com/office/powerpoint/2010/main" val="3268157013"/>
+        <p14:creationId xmlns:p14="http://schemas.microsoft.com/office/powerpoint/2010/main" val="177084759"/>
       </p:ext>
     </p:extLst>
   </p:cSld>
@@ -5793,7 +6241,7 @@
       </p:grpSpPr>
       <p:sp>
         <p:nvSpPr>
-          <p:cNvPr id="6" name="Titel 5"/>
+          <p:cNvPr id="2" name="Title 1"/>
           <p:cNvSpPr>
             <a:spLocks noGrp="1"/>
           </p:cNvSpPr>
@@ -5807,73 +6255,218 @@
           <a:lstStyle/>
           <a:p>
             <a:r>
-              <a:rPr lang="de-DE" dirty="0" smtClean="0"/>
-              <a:t>HANDS-ON</a:t>
-            </a:r>
-            <a:endParaRPr lang="de-DE" dirty="0"/>
-          </a:p>
-        </p:txBody>
-      </p:sp>
-      <p:sp>
-        <p:nvSpPr>
-          <p:cNvPr id="7" name="Untertitel 6"/>
+              <a:rPr lang="en-US" dirty="0" smtClean="0"/>
+              <a:t>2.1 ASP.NET Web </a:t>
+            </a:r>
+            <a:r>
+              <a:rPr lang="en-US" dirty="0" err="1" smtClean="0"/>
+              <a:t>Api</a:t>
+            </a:r>
+            <a:r>
+              <a:rPr lang="en-US" dirty="0" smtClean="0"/>
+              <a:t>: Controller und Routing</a:t>
+            </a:r>
+            <a:endParaRPr lang="en-US" dirty="0"/>
+          </a:p>
+        </p:txBody>
+      </p:sp>
+      <p:sp>
+        <p:nvSpPr>
+          <p:cNvPr id="3" name="Content Placeholder 2"/>
           <p:cNvSpPr>
             <a:spLocks noGrp="1"/>
           </p:cNvSpPr>
           <p:nvPr>
-            <p:ph type="subTitle" idx="1"/>
+            <p:ph sz="quarter" idx="10"/>
           </p:nvPr>
         </p:nvSpPr>
-        <p:spPr/>
+        <p:spPr>
+          <a:xfrm>
+            <a:off x="379364" y="1388547"/>
+            <a:ext cx="6383588" cy="5291613"/>
+          </a:xfrm>
+        </p:spPr>
         <p:txBody>
           <a:bodyPr/>
           <a:lstStyle/>
           <a:p>
             <a:r>
-              <a:rPr lang="de-DE" sz="4800" dirty="0" smtClean="0"/>
-              <a:t>05</a:t>
-            </a:r>
-            <a:r>
-              <a:rPr lang="de-DE" sz="4800" dirty="0"/>
-              <a:t>. Entwicklung einer Schnittstelle mit ASP.NET Web API</a:t>
-            </a:r>
-          </a:p>
-        </p:txBody>
-      </p:sp>
-      <p:sp>
-        <p:nvSpPr>
-          <p:cNvPr id="4" name="Foliennummernplatzhalter 3"/>
-          <p:cNvSpPr>
-            <a:spLocks noGrp="1"/>
-          </p:cNvSpPr>
-          <p:nvPr>
-            <p:ph type="sldNum" sz="quarter" idx="10"/>
-          </p:nvPr>
-        </p:nvSpPr>
-        <p:spPr/>
-        <p:txBody>
-          <a:bodyPr/>
-          <a:lstStyle/>
-          <a:p>
-            <a:fld id="{8F35CB8A-22DD-4279-9E9E-A49CDB5FBE56}" type="slidenum">
-              <a:rPr lang="en-US" smtClean="0"/>
-              <a:pPr/>
-              <a:t>10</a:t>
-            </a:fld>
-            <a:endParaRPr lang="en-US" dirty="0"/>
+              <a:rPr lang="en-US" dirty="0" smtClean="0"/>
+              <a:t>Framework </a:t>
+            </a:r>
+            <a:r>
+              <a:rPr lang="en-US" dirty="0" err="1" smtClean="0"/>
+              <a:t>zum</a:t>
+            </a:r>
+            <a:r>
+              <a:rPr lang="en-US" dirty="0" smtClean="0"/>
+              <a:t> </a:t>
+            </a:r>
+            <a:r>
+              <a:rPr lang="en-US" dirty="0" err="1" smtClean="0"/>
+              <a:t>Entwickeln</a:t>
+            </a:r>
+            <a:r>
+              <a:rPr lang="en-US" dirty="0" smtClean="0"/>
+              <a:t> von REST APIs</a:t>
+            </a:r>
+          </a:p>
+          <a:p>
+            <a:r>
+              <a:rPr lang="en-US" dirty="0" err="1" smtClean="0"/>
+              <a:t>ApiController</a:t>
+            </a:r>
+            <a:r>
+              <a:rPr lang="en-US" dirty="0" smtClean="0"/>
+              <a:t> </a:t>
+            </a:r>
+            <a:r>
+              <a:rPr lang="en-US" dirty="0" err="1" smtClean="0"/>
+              <a:t>verarbeiten</a:t>
+            </a:r>
+            <a:r>
+              <a:rPr lang="en-US" dirty="0" smtClean="0"/>
+              <a:t> REST Requests </a:t>
+            </a:r>
+            <a:br>
+              <a:rPr lang="en-US" dirty="0" smtClean="0"/>
+            </a:br>
+            <a:r>
+              <a:rPr lang="en-US" sz="1600" dirty="0" smtClean="0"/>
+              <a:t>(</a:t>
+            </a:r>
+            <a:r>
+              <a:rPr lang="en-US" sz="1600" dirty="0" err="1" smtClean="0"/>
+              <a:t>ähnlich</a:t>
+            </a:r>
+            <a:r>
+              <a:rPr lang="en-US" sz="1600" dirty="0" smtClean="0"/>
+              <a:t> </a:t>
+            </a:r>
+            <a:r>
+              <a:rPr lang="en-US" sz="1600" dirty="0" err="1" smtClean="0"/>
+              <a:t>zu</a:t>
+            </a:r>
+            <a:r>
+              <a:rPr lang="en-US" sz="1600" dirty="0" smtClean="0"/>
+              <a:t> MVC </a:t>
+            </a:r>
+            <a:r>
+              <a:rPr lang="en-US" sz="1600" dirty="0" err="1" smtClean="0"/>
+              <a:t>Controllern</a:t>
+            </a:r>
+            <a:r>
+              <a:rPr lang="en-US" sz="1600" dirty="0" smtClean="0"/>
+              <a:t>)</a:t>
+            </a:r>
+            <a:endParaRPr lang="en-US" dirty="0" smtClean="0"/>
+          </a:p>
+          <a:p>
+            <a:r>
+              <a:rPr lang="en-US" dirty="0" err="1" smtClean="0"/>
+              <a:t>Für</a:t>
+            </a:r>
+            <a:r>
+              <a:rPr lang="en-US" dirty="0" smtClean="0"/>
+              <a:t> die </a:t>
+            </a:r>
+            <a:r>
+              <a:rPr lang="en-US" dirty="0" err="1" smtClean="0"/>
+              <a:t>Ansteuerung</a:t>
+            </a:r>
+            <a:r>
+              <a:rPr lang="en-US" dirty="0" smtClean="0"/>
+              <a:t> der </a:t>
+            </a:r>
+            <a:r>
+              <a:rPr lang="en-US" dirty="0" err="1" smtClean="0"/>
+              <a:t>Methoden</a:t>
+            </a:r>
+            <a:r>
+              <a:rPr lang="en-US" dirty="0" smtClean="0"/>
+              <a:t> </a:t>
+            </a:r>
+            <a:r>
+              <a:rPr lang="en-US" dirty="0" err="1" smtClean="0"/>
+              <a:t>werden</a:t>
+            </a:r>
+            <a:r>
+              <a:rPr lang="en-US" dirty="0" smtClean="0"/>
+              <a:t> </a:t>
+            </a:r>
+            <a:r>
+              <a:rPr lang="en-US" dirty="0" err="1" smtClean="0"/>
+              <a:t>Routen</a:t>
+            </a:r>
+            <a:r>
+              <a:rPr lang="en-US" dirty="0" smtClean="0"/>
+              <a:t> </a:t>
+            </a:r>
+            <a:r>
+              <a:rPr lang="en-US" dirty="0" err="1" smtClean="0"/>
+              <a:t>benötigt</a:t>
+            </a:r>
+            <a:endParaRPr lang="en-US" dirty="0" smtClean="0"/>
+          </a:p>
+          <a:p>
+            <a:pPr lvl="1"/>
+            <a:r>
+              <a:rPr lang="en-US" dirty="0" smtClean="0">
+                <a:solidFill>
+                  <a:schemeClr val="accent3"/>
+                </a:solidFill>
+              </a:rPr>
+              <a:t>Convention based Routing / </a:t>
+            </a:r>
+            <a:r>
+              <a:rPr lang="en-US" dirty="0" err="1" smtClean="0">
+                <a:solidFill>
+                  <a:schemeClr val="accent3"/>
+                </a:solidFill>
+              </a:rPr>
+              <a:t>WebApiConfig</a:t>
+            </a:r>
+            <a:endParaRPr lang="en-US" dirty="0" smtClean="0">
+              <a:solidFill>
+                <a:schemeClr val="accent3"/>
+              </a:solidFill>
+            </a:endParaRPr>
+          </a:p>
+          <a:p>
+            <a:pPr lvl="1"/>
+            <a:r>
+              <a:rPr lang="en-US" dirty="0" smtClean="0">
+                <a:solidFill>
+                  <a:schemeClr val="accent3"/>
+                </a:solidFill>
+              </a:rPr>
+              <a:t>Attribute based Routing</a:t>
+            </a:r>
+            <a:endParaRPr lang="en-US" dirty="0">
+              <a:solidFill>
+                <a:schemeClr val="accent3"/>
+              </a:solidFill>
+            </a:endParaRPr>
           </a:p>
         </p:txBody>
       </p:sp>
     </p:spTree>
     <p:extLst>
       <p:ext uri="{BB962C8B-B14F-4D97-AF65-F5344CB8AC3E}">
-        <p14:creationId xmlns:p14="http://schemas.microsoft.com/office/powerpoint/2010/main" val="1662466920"/>
+        <p14:creationId xmlns:p14="http://schemas.microsoft.com/office/powerpoint/2010/main" val="200086261"/>
       </p:ext>
     </p:extLst>
   </p:cSld>
   <p:clrMapOvr>
     <a:masterClrMapping/>
   </p:clrMapOvr>
+  <p:timing>
+    <p:tnLst>
+      <p:par>
+        <p:cTn id="1" dur="indefinite" restart="never" nodeType="tmRoot"/>
+      </p:par>
+    </p:tnLst>
+  </p:timing>
 </p:sld>
 </file>
 
@@ -5896,6 +6489,924 @@
       </p:grpSpPr>
       <p:sp>
         <p:nvSpPr>
+          <p:cNvPr id="2" name="Title 1"/>
+          <p:cNvSpPr>
+            <a:spLocks noGrp="1"/>
+          </p:cNvSpPr>
+          <p:nvPr>
+            <p:ph type="title"/>
+          </p:nvPr>
+        </p:nvSpPr>
+        <p:spPr/>
+        <p:txBody>
+          <a:bodyPr/>
+          <a:lstStyle/>
+          <a:p>
+            <a:r>
+              <a:rPr lang="en-US" dirty="0" smtClean="0"/>
+              <a:t>2.1 </a:t>
+            </a:r>
+            <a:r>
+              <a:rPr lang="en-US" dirty="0" err="1" smtClean="0"/>
+              <a:t>ASP.Net</a:t>
+            </a:r>
+            <a:r>
+              <a:rPr lang="en-US" dirty="0" smtClean="0"/>
+              <a:t> Web </a:t>
+            </a:r>
+            <a:r>
+              <a:rPr lang="en-US" dirty="0" err="1" smtClean="0"/>
+              <a:t>Api</a:t>
+            </a:r>
+            <a:r>
+              <a:rPr lang="en-US" dirty="0" smtClean="0"/>
+              <a:t> Code Snippet</a:t>
+            </a:r>
+            <a:endParaRPr lang="en-US" dirty="0"/>
+          </a:p>
+        </p:txBody>
+      </p:sp>
+      <p:sp>
+        <p:nvSpPr>
+          <p:cNvPr id="5" name="Rechteck 4"/>
+          <p:cNvSpPr/>
+          <p:nvPr/>
+        </p:nvSpPr>
+        <p:spPr>
+          <a:xfrm>
+            <a:off x="587298" y="1559042"/>
+            <a:ext cx="7479016" cy="3539430"/>
+          </a:xfrm>
+          <a:prstGeom prst="rect">
+            <a:avLst/>
+          </a:prstGeom>
+        </p:spPr>
+        <p:txBody>
+          <a:bodyPr wrap="square">
+            <a:spAutoFit/>
+          </a:bodyPr>
+          <a:lstStyle/>
+          <a:p>
+            <a:r>
+              <a:rPr lang="de-DE" sz="1400" dirty="0" err="1">
+                <a:solidFill>
+                  <a:srgbClr val="0000FF"/>
+                </a:solidFill>
+                <a:latin typeface="Consolas" panose="020B0609020204030204" pitchFamily="49" charset="0"/>
+              </a:rPr>
+              <a:t>public</a:t>
+            </a:r>
+            <a:r>
+              <a:rPr lang="de-DE" sz="1400" dirty="0">
+                <a:solidFill>
+                  <a:srgbClr val="000000"/>
+                </a:solidFill>
+                <a:latin typeface="Consolas" panose="020B0609020204030204" pitchFamily="49" charset="0"/>
+              </a:rPr>
+              <a:t> </a:t>
+            </a:r>
+            <a:r>
+              <a:rPr lang="de-DE" sz="1400" dirty="0" err="1">
+                <a:solidFill>
+                  <a:srgbClr val="0000FF"/>
+                </a:solidFill>
+                <a:latin typeface="Consolas" panose="020B0609020204030204" pitchFamily="49" charset="0"/>
+              </a:rPr>
+              <a:t>class</a:t>
+            </a:r>
+            <a:r>
+              <a:rPr lang="de-DE" sz="1400" dirty="0">
+                <a:solidFill>
+                  <a:srgbClr val="000000"/>
+                </a:solidFill>
+                <a:latin typeface="Consolas" panose="020B0609020204030204" pitchFamily="49" charset="0"/>
+              </a:rPr>
+              <a:t> </a:t>
+            </a:r>
+            <a:r>
+              <a:rPr lang="de-DE" sz="1400" dirty="0" err="1">
+                <a:solidFill>
+                  <a:srgbClr val="2B91AF"/>
+                </a:solidFill>
+                <a:latin typeface="Consolas" panose="020B0609020204030204" pitchFamily="49" charset="0"/>
+              </a:rPr>
+              <a:t>PostsController</a:t>
+            </a:r>
+            <a:r>
+              <a:rPr lang="de-DE" sz="1400" dirty="0">
+                <a:solidFill>
+                  <a:srgbClr val="000000"/>
+                </a:solidFill>
+                <a:latin typeface="Consolas" panose="020B0609020204030204" pitchFamily="49" charset="0"/>
+              </a:rPr>
+              <a:t> : </a:t>
+            </a:r>
+            <a:r>
+              <a:rPr lang="de-DE" sz="1400" dirty="0" err="1" smtClean="0">
+                <a:solidFill>
+                  <a:srgbClr val="000000"/>
+                </a:solidFill>
+                <a:latin typeface="Consolas" panose="020B0609020204030204" pitchFamily="49" charset="0"/>
+              </a:rPr>
+              <a:t>ApiController</a:t>
+            </a:r>
+            <a:endParaRPr lang="de-DE" sz="1400" dirty="0">
+              <a:solidFill>
+                <a:srgbClr val="000000"/>
+              </a:solidFill>
+              <a:latin typeface="Consolas" panose="020B0609020204030204" pitchFamily="49" charset="0"/>
+            </a:endParaRPr>
+          </a:p>
+          <a:p>
+            <a:r>
+              <a:rPr lang="de-DE" sz="1400" dirty="0" smtClean="0">
+                <a:solidFill>
+                  <a:srgbClr val="000000"/>
+                </a:solidFill>
+                <a:latin typeface="Consolas" panose="020B0609020204030204" pitchFamily="49" charset="0"/>
+              </a:rPr>
+              <a:t>{</a:t>
+            </a:r>
+            <a:endParaRPr lang="de-DE" sz="1400" dirty="0" smtClean="0">
+              <a:solidFill>
+                <a:srgbClr val="0000FF"/>
+              </a:solidFill>
+              <a:latin typeface="Consolas" panose="020B0609020204030204" pitchFamily="49" charset="0"/>
+            </a:endParaRPr>
+          </a:p>
+          <a:p>
+            <a:pPr lvl="1"/>
+            <a:r>
+              <a:rPr lang="de-DE" sz="1400" dirty="0" err="1" smtClean="0">
+                <a:solidFill>
+                  <a:srgbClr val="0000FF"/>
+                </a:solidFill>
+                <a:latin typeface="Consolas" panose="020B0609020204030204" pitchFamily="49" charset="0"/>
+              </a:rPr>
+              <a:t>public</a:t>
+            </a:r>
+            <a:r>
+              <a:rPr lang="de-DE" sz="1400" dirty="0" smtClean="0">
+                <a:solidFill>
+                  <a:srgbClr val="000000"/>
+                </a:solidFill>
+                <a:latin typeface="Consolas" panose="020B0609020204030204" pitchFamily="49" charset="0"/>
+              </a:rPr>
+              <a:t> </a:t>
+            </a:r>
+            <a:r>
+              <a:rPr lang="de-DE" sz="1400" dirty="0" err="1">
+                <a:solidFill>
+                  <a:srgbClr val="2B91AF"/>
+                </a:solidFill>
+                <a:latin typeface="Consolas" panose="020B0609020204030204" pitchFamily="49" charset="0"/>
+              </a:rPr>
+              <a:t>IEnumerable</a:t>
+            </a:r>
+            <a:r>
+              <a:rPr lang="de-DE" sz="1400" dirty="0">
+                <a:solidFill>
+                  <a:srgbClr val="000000"/>
+                </a:solidFill>
+                <a:latin typeface="Consolas" panose="020B0609020204030204" pitchFamily="49" charset="0"/>
+              </a:rPr>
+              <a:t>&lt;</a:t>
+            </a:r>
+            <a:r>
+              <a:rPr lang="de-DE" sz="1400" dirty="0" err="1">
+                <a:solidFill>
+                  <a:srgbClr val="2B91AF"/>
+                </a:solidFill>
+                <a:latin typeface="Consolas" panose="020B0609020204030204" pitchFamily="49" charset="0"/>
+              </a:rPr>
+              <a:t>PostDto</a:t>
+            </a:r>
+            <a:r>
+              <a:rPr lang="de-DE" sz="1400" dirty="0">
+                <a:solidFill>
+                  <a:srgbClr val="000000"/>
+                </a:solidFill>
+                <a:latin typeface="Consolas" panose="020B0609020204030204" pitchFamily="49" charset="0"/>
+              </a:rPr>
+              <a:t>&gt; </a:t>
+            </a:r>
+            <a:r>
+              <a:rPr lang="de-DE" sz="1400" dirty="0" err="1">
+                <a:solidFill>
+                  <a:srgbClr val="000000"/>
+                </a:solidFill>
+                <a:latin typeface="Consolas" panose="020B0609020204030204" pitchFamily="49" charset="0"/>
+              </a:rPr>
+              <a:t>Get</a:t>
+            </a:r>
+            <a:r>
+              <a:rPr lang="de-DE" sz="1400" dirty="0" smtClean="0">
+                <a:solidFill>
+                  <a:srgbClr val="000000"/>
+                </a:solidFill>
+                <a:latin typeface="Consolas" panose="020B0609020204030204" pitchFamily="49" charset="0"/>
+              </a:rPr>
+              <a:t>(){</a:t>
+            </a:r>
+            <a:endParaRPr lang="de-DE" sz="1400" dirty="0">
+              <a:solidFill>
+                <a:srgbClr val="000000"/>
+              </a:solidFill>
+              <a:latin typeface="Consolas" panose="020B0609020204030204" pitchFamily="49" charset="0"/>
+            </a:endParaRPr>
+          </a:p>
+          <a:p>
+            <a:pPr lvl="1"/>
+            <a:r>
+              <a:rPr lang="de-DE" sz="1400" dirty="0">
+                <a:solidFill>
+                  <a:srgbClr val="000000"/>
+                </a:solidFill>
+                <a:latin typeface="Consolas" panose="020B0609020204030204" pitchFamily="49" charset="0"/>
+              </a:rPr>
+              <a:t>    </a:t>
+            </a:r>
+            <a:r>
+              <a:rPr lang="de-DE" sz="1400" dirty="0" err="1">
+                <a:solidFill>
+                  <a:srgbClr val="0000FF"/>
+                </a:solidFill>
+                <a:latin typeface="Consolas" panose="020B0609020204030204" pitchFamily="49" charset="0"/>
+              </a:rPr>
+              <a:t>return</a:t>
+            </a:r>
+            <a:r>
+              <a:rPr lang="de-DE" sz="1400" dirty="0">
+                <a:solidFill>
+                  <a:srgbClr val="000000"/>
+                </a:solidFill>
+                <a:latin typeface="Consolas" panose="020B0609020204030204" pitchFamily="49" charset="0"/>
+              </a:rPr>
+              <a:t> </a:t>
+            </a:r>
+            <a:r>
+              <a:rPr lang="de-DE" sz="1400" dirty="0" err="1" smtClean="0">
+                <a:solidFill>
+                  <a:srgbClr val="0000FF"/>
+                </a:solidFill>
+                <a:latin typeface="Consolas" panose="020B0609020204030204" pitchFamily="49" charset="0"/>
+              </a:rPr>
+              <a:t>this</a:t>
+            </a:r>
+            <a:r>
+              <a:rPr lang="de-DE" sz="1400" dirty="0" err="1" smtClean="0">
+                <a:solidFill>
+                  <a:srgbClr val="000000"/>
+                </a:solidFill>
+                <a:latin typeface="Consolas" panose="020B0609020204030204" pitchFamily="49" charset="0"/>
+              </a:rPr>
+              <a:t>.db.Posts</a:t>
+            </a:r>
+            <a:endParaRPr lang="de-DE" sz="1400" dirty="0" smtClean="0">
+              <a:solidFill>
+                <a:srgbClr val="000000"/>
+              </a:solidFill>
+              <a:latin typeface="Consolas" panose="020B0609020204030204" pitchFamily="49" charset="0"/>
+            </a:endParaRPr>
+          </a:p>
+          <a:p>
+            <a:pPr lvl="1"/>
+            <a:r>
+              <a:rPr lang="de-DE" sz="1400" dirty="0">
+                <a:solidFill>
+                  <a:srgbClr val="000000"/>
+                </a:solidFill>
+                <a:latin typeface="Consolas" panose="020B0609020204030204" pitchFamily="49" charset="0"/>
+              </a:rPr>
+              <a:t> </a:t>
+            </a:r>
+            <a:r>
+              <a:rPr lang="de-DE" sz="1400" dirty="0" smtClean="0">
+                <a:solidFill>
+                  <a:srgbClr val="000000"/>
+                </a:solidFill>
+                <a:latin typeface="Consolas" panose="020B0609020204030204" pitchFamily="49" charset="0"/>
+              </a:rPr>
+              <a:t>                 .</a:t>
+            </a:r>
+            <a:r>
+              <a:rPr lang="de-DE" sz="1400" dirty="0" err="1">
+                <a:solidFill>
+                  <a:srgbClr val="000000"/>
+                </a:solidFill>
+                <a:latin typeface="Consolas" panose="020B0609020204030204" pitchFamily="49" charset="0"/>
+              </a:rPr>
+              <a:t>ToList</a:t>
+            </a:r>
+            <a:r>
+              <a:rPr lang="de-DE" sz="1400" dirty="0" smtClean="0">
+                <a:solidFill>
+                  <a:srgbClr val="000000"/>
+                </a:solidFill>
+                <a:latin typeface="Consolas" panose="020B0609020204030204" pitchFamily="49" charset="0"/>
+              </a:rPr>
+              <a:t>()</a:t>
+            </a:r>
+          </a:p>
+          <a:p>
+            <a:pPr lvl="1"/>
+            <a:r>
+              <a:rPr lang="de-DE" sz="1400" dirty="0">
+                <a:solidFill>
+                  <a:srgbClr val="000000"/>
+                </a:solidFill>
+                <a:latin typeface="Consolas" panose="020B0609020204030204" pitchFamily="49" charset="0"/>
+              </a:rPr>
+              <a:t> </a:t>
+            </a:r>
+            <a:r>
+              <a:rPr lang="de-DE" sz="1400" dirty="0" smtClean="0">
+                <a:solidFill>
+                  <a:srgbClr val="000000"/>
+                </a:solidFill>
+                <a:latin typeface="Consolas" panose="020B0609020204030204" pitchFamily="49" charset="0"/>
+              </a:rPr>
+              <a:t>                 .</a:t>
+            </a:r>
+            <a:r>
+              <a:rPr lang="de-DE" sz="1400" dirty="0">
+                <a:solidFill>
+                  <a:srgbClr val="000000"/>
+                </a:solidFill>
+                <a:latin typeface="Consolas" panose="020B0609020204030204" pitchFamily="49" charset="0"/>
+              </a:rPr>
+              <a:t>Select(p =&gt; </a:t>
+            </a:r>
+            <a:r>
+              <a:rPr lang="de-DE" sz="1400" dirty="0" err="1">
+                <a:solidFill>
+                  <a:srgbClr val="2B91AF"/>
+                </a:solidFill>
+                <a:latin typeface="Consolas" panose="020B0609020204030204" pitchFamily="49" charset="0"/>
+              </a:rPr>
+              <a:t>PostDto</a:t>
+            </a:r>
+            <a:r>
+              <a:rPr lang="de-DE" sz="1400" dirty="0" err="1">
+                <a:solidFill>
+                  <a:srgbClr val="000000"/>
+                </a:solidFill>
+                <a:latin typeface="Consolas" panose="020B0609020204030204" pitchFamily="49" charset="0"/>
+              </a:rPr>
+              <a:t>.Map</a:t>
+            </a:r>
+            <a:r>
+              <a:rPr lang="de-DE" sz="1400" dirty="0">
+                <a:solidFill>
+                  <a:srgbClr val="000000"/>
+                </a:solidFill>
+                <a:latin typeface="Consolas" panose="020B0609020204030204" pitchFamily="49" charset="0"/>
+              </a:rPr>
+              <a:t>(p));</a:t>
+            </a:r>
+          </a:p>
+          <a:p>
+            <a:pPr lvl="1"/>
+            <a:r>
+              <a:rPr lang="de-DE" sz="1400" dirty="0" smtClean="0">
+                <a:solidFill>
+                  <a:srgbClr val="000000"/>
+                </a:solidFill>
+                <a:latin typeface="Consolas" panose="020B0609020204030204" pitchFamily="49" charset="0"/>
+              </a:rPr>
+              <a:t>}</a:t>
+            </a:r>
+          </a:p>
+          <a:p>
+            <a:pPr lvl="1"/>
+            <a:endParaRPr lang="de-DE" sz="1400" dirty="0">
+              <a:solidFill>
+                <a:srgbClr val="000000"/>
+              </a:solidFill>
+              <a:latin typeface="Consolas" panose="020B0609020204030204" pitchFamily="49" charset="0"/>
+            </a:endParaRPr>
+          </a:p>
+          <a:p>
+            <a:pPr lvl="1"/>
+            <a:r>
+              <a:rPr lang="de-DE" sz="1400" dirty="0">
+                <a:solidFill>
+                  <a:srgbClr val="000000"/>
+                </a:solidFill>
+                <a:latin typeface="Consolas" panose="020B0609020204030204" pitchFamily="49" charset="0"/>
+              </a:rPr>
+              <a:t>[</a:t>
+            </a:r>
+            <a:r>
+              <a:rPr lang="de-DE" sz="1400" dirty="0">
+                <a:solidFill>
+                  <a:srgbClr val="2B91AF"/>
+                </a:solidFill>
+                <a:latin typeface="Consolas" panose="020B0609020204030204" pitchFamily="49" charset="0"/>
+              </a:rPr>
+              <a:t>Route</a:t>
+            </a:r>
+            <a:r>
+              <a:rPr lang="de-DE" sz="1400" dirty="0">
+                <a:solidFill>
+                  <a:srgbClr val="000000"/>
+                </a:solidFill>
+                <a:latin typeface="Consolas" panose="020B0609020204030204" pitchFamily="49" charset="0"/>
+              </a:rPr>
+              <a:t>(</a:t>
+            </a:r>
+            <a:r>
+              <a:rPr lang="de-DE" sz="1400" dirty="0">
+                <a:solidFill>
+                  <a:srgbClr val="A31515"/>
+                </a:solidFill>
+                <a:latin typeface="Consolas" panose="020B0609020204030204" pitchFamily="49" charset="0"/>
+              </a:rPr>
+              <a:t>"</a:t>
+            </a:r>
+            <a:r>
+              <a:rPr lang="de-DE" sz="1400" dirty="0" err="1">
+                <a:solidFill>
+                  <a:srgbClr val="A31515"/>
+                </a:solidFill>
+                <a:latin typeface="Consolas" panose="020B0609020204030204" pitchFamily="49" charset="0"/>
+              </a:rPr>
+              <a:t>api</a:t>
+            </a:r>
+            <a:r>
+              <a:rPr lang="de-DE" sz="1400" dirty="0">
+                <a:solidFill>
+                  <a:srgbClr val="A31515"/>
+                </a:solidFill>
+                <a:latin typeface="Consolas" panose="020B0609020204030204" pitchFamily="49" charset="0"/>
+              </a:rPr>
+              <a:t>/</a:t>
+            </a:r>
+            <a:r>
+              <a:rPr lang="de-DE" sz="1400" dirty="0" err="1">
+                <a:solidFill>
+                  <a:srgbClr val="A31515"/>
+                </a:solidFill>
+                <a:latin typeface="Consolas" panose="020B0609020204030204" pitchFamily="49" charset="0"/>
+              </a:rPr>
+              <a:t>posts</a:t>
+            </a:r>
+            <a:r>
+              <a:rPr lang="de-DE" sz="1400" dirty="0">
+                <a:solidFill>
+                  <a:srgbClr val="A31515"/>
+                </a:solidFill>
+                <a:latin typeface="Consolas" panose="020B0609020204030204" pitchFamily="49" charset="0"/>
+              </a:rPr>
+              <a:t>/</a:t>
+            </a:r>
+            <a:r>
+              <a:rPr lang="de-DE" sz="1400" dirty="0" err="1">
+                <a:solidFill>
+                  <a:srgbClr val="A31515"/>
+                </a:solidFill>
+                <a:latin typeface="Consolas" panose="020B0609020204030204" pitchFamily="49" charset="0"/>
+              </a:rPr>
+              <a:t>latest</a:t>
+            </a:r>
+            <a:r>
+              <a:rPr lang="de-DE" sz="1400" dirty="0">
+                <a:solidFill>
+                  <a:srgbClr val="A31515"/>
+                </a:solidFill>
+                <a:latin typeface="Consolas" panose="020B0609020204030204" pitchFamily="49" charset="0"/>
+              </a:rPr>
+              <a:t>"</a:t>
+            </a:r>
+            <a:r>
+              <a:rPr lang="de-DE" sz="1400" dirty="0">
+                <a:solidFill>
+                  <a:srgbClr val="000000"/>
+                </a:solidFill>
+                <a:latin typeface="Consolas" panose="020B0609020204030204" pitchFamily="49" charset="0"/>
+              </a:rPr>
+              <a:t>)]</a:t>
+            </a:r>
+          </a:p>
+          <a:p>
+            <a:pPr lvl="1"/>
+            <a:r>
+              <a:rPr lang="de-DE" sz="1400" dirty="0" err="1">
+                <a:solidFill>
+                  <a:srgbClr val="0000FF"/>
+                </a:solidFill>
+                <a:latin typeface="Consolas" panose="020B0609020204030204" pitchFamily="49" charset="0"/>
+              </a:rPr>
+              <a:t>public</a:t>
+            </a:r>
+            <a:r>
+              <a:rPr lang="de-DE" sz="1400" dirty="0">
+                <a:solidFill>
+                  <a:srgbClr val="000000"/>
+                </a:solidFill>
+                <a:latin typeface="Consolas" panose="020B0609020204030204" pitchFamily="49" charset="0"/>
+              </a:rPr>
+              <a:t> </a:t>
+            </a:r>
+            <a:r>
+              <a:rPr lang="de-DE" sz="1400" dirty="0" err="1">
+                <a:solidFill>
+                  <a:srgbClr val="2B91AF"/>
+                </a:solidFill>
+                <a:latin typeface="Consolas" panose="020B0609020204030204" pitchFamily="49" charset="0"/>
+              </a:rPr>
+              <a:t>IEnumerable</a:t>
+            </a:r>
+            <a:r>
+              <a:rPr lang="de-DE" sz="1400" dirty="0">
+                <a:solidFill>
+                  <a:srgbClr val="000000"/>
+                </a:solidFill>
+                <a:latin typeface="Consolas" panose="020B0609020204030204" pitchFamily="49" charset="0"/>
+              </a:rPr>
+              <a:t>&lt;</a:t>
+            </a:r>
+            <a:r>
+              <a:rPr lang="de-DE" sz="1400" dirty="0" err="1">
+                <a:solidFill>
+                  <a:srgbClr val="2B91AF"/>
+                </a:solidFill>
+                <a:latin typeface="Consolas" panose="020B0609020204030204" pitchFamily="49" charset="0"/>
+              </a:rPr>
+              <a:t>PostDto</a:t>
+            </a:r>
+            <a:r>
+              <a:rPr lang="de-DE" sz="1400" dirty="0">
+                <a:solidFill>
+                  <a:srgbClr val="000000"/>
+                </a:solidFill>
+                <a:latin typeface="Consolas" panose="020B0609020204030204" pitchFamily="49" charset="0"/>
+              </a:rPr>
+              <a:t>&gt; </a:t>
+            </a:r>
+            <a:r>
+              <a:rPr lang="de-DE" sz="1400" dirty="0" err="1">
+                <a:solidFill>
+                  <a:srgbClr val="000000"/>
+                </a:solidFill>
+                <a:latin typeface="Consolas" panose="020B0609020204030204" pitchFamily="49" charset="0"/>
+              </a:rPr>
+              <a:t>GetLatest</a:t>
+            </a:r>
+            <a:r>
+              <a:rPr lang="de-DE" sz="1400" dirty="0" smtClean="0">
+                <a:solidFill>
+                  <a:srgbClr val="000000"/>
+                </a:solidFill>
+                <a:latin typeface="Consolas" panose="020B0609020204030204" pitchFamily="49" charset="0"/>
+              </a:rPr>
+              <a:t>(){</a:t>
+            </a:r>
+            <a:endParaRPr lang="de-DE" sz="1400" dirty="0">
+              <a:solidFill>
+                <a:srgbClr val="000000"/>
+              </a:solidFill>
+              <a:latin typeface="Consolas" panose="020B0609020204030204" pitchFamily="49" charset="0"/>
+            </a:endParaRPr>
+          </a:p>
+          <a:p>
+            <a:pPr lvl="1"/>
+            <a:r>
+              <a:rPr lang="de-DE" sz="1400" dirty="0">
+                <a:solidFill>
+                  <a:srgbClr val="000000"/>
+                </a:solidFill>
+                <a:latin typeface="Consolas" panose="020B0609020204030204" pitchFamily="49" charset="0"/>
+              </a:rPr>
+              <a:t>    </a:t>
+            </a:r>
+            <a:r>
+              <a:rPr lang="de-DE" sz="1400" dirty="0" err="1">
+                <a:solidFill>
+                  <a:srgbClr val="0000FF"/>
+                </a:solidFill>
+                <a:latin typeface="Consolas" panose="020B0609020204030204" pitchFamily="49" charset="0"/>
+              </a:rPr>
+              <a:t>return</a:t>
+            </a:r>
+            <a:r>
+              <a:rPr lang="de-DE" sz="1400" dirty="0">
+                <a:solidFill>
+                  <a:srgbClr val="000000"/>
+                </a:solidFill>
+                <a:latin typeface="Consolas" panose="020B0609020204030204" pitchFamily="49" charset="0"/>
+              </a:rPr>
+              <a:t> </a:t>
+            </a:r>
+            <a:r>
+              <a:rPr lang="de-DE" sz="1400" dirty="0" err="1">
+                <a:solidFill>
+                  <a:srgbClr val="0000FF"/>
+                </a:solidFill>
+                <a:latin typeface="Consolas" panose="020B0609020204030204" pitchFamily="49" charset="0"/>
+              </a:rPr>
+              <a:t>this</a:t>
+            </a:r>
+            <a:r>
+              <a:rPr lang="de-DE" sz="1400" dirty="0" err="1">
+                <a:solidFill>
+                  <a:srgbClr val="000000"/>
+                </a:solidFill>
+                <a:latin typeface="Consolas" panose="020B0609020204030204" pitchFamily="49" charset="0"/>
+              </a:rPr>
+              <a:t>.db.Posts</a:t>
+            </a:r>
+            <a:endParaRPr lang="de-DE" sz="1400" dirty="0">
+              <a:solidFill>
+                <a:srgbClr val="000000"/>
+              </a:solidFill>
+              <a:latin typeface="Consolas" panose="020B0609020204030204" pitchFamily="49" charset="0"/>
+            </a:endParaRPr>
+          </a:p>
+          <a:p>
+            <a:pPr lvl="1"/>
+            <a:r>
+              <a:rPr lang="de-DE" sz="1400" dirty="0">
+                <a:solidFill>
+                  <a:srgbClr val="000000"/>
+                </a:solidFill>
+                <a:latin typeface="Consolas" panose="020B0609020204030204" pitchFamily="49" charset="0"/>
+              </a:rPr>
+              <a:t>                  .</a:t>
+            </a:r>
+            <a:r>
+              <a:rPr lang="de-DE" sz="1400" dirty="0" err="1">
+                <a:solidFill>
+                  <a:srgbClr val="000000"/>
+                </a:solidFill>
+                <a:latin typeface="Consolas" panose="020B0609020204030204" pitchFamily="49" charset="0"/>
+              </a:rPr>
+              <a:t>OrderByDescending</a:t>
+            </a:r>
+            <a:r>
+              <a:rPr lang="de-DE" sz="1400" dirty="0">
+                <a:solidFill>
+                  <a:srgbClr val="000000"/>
+                </a:solidFill>
+                <a:latin typeface="Consolas" panose="020B0609020204030204" pitchFamily="49" charset="0"/>
+              </a:rPr>
+              <a:t>(o =&gt; </a:t>
+            </a:r>
+            <a:r>
+              <a:rPr lang="de-DE" sz="1400" dirty="0" err="1">
+                <a:solidFill>
+                  <a:srgbClr val="000000"/>
+                </a:solidFill>
+                <a:latin typeface="Consolas" panose="020B0609020204030204" pitchFamily="49" charset="0"/>
+              </a:rPr>
+              <a:t>o.Created</a:t>
+            </a:r>
+            <a:r>
+              <a:rPr lang="de-DE" sz="1400" dirty="0">
+                <a:solidFill>
+                  <a:srgbClr val="000000"/>
+                </a:solidFill>
+                <a:latin typeface="Consolas" panose="020B0609020204030204" pitchFamily="49" charset="0"/>
+              </a:rPr>
+              <a:t>)</a:t>
+            </a:r>
+          </a:p>
+          <a:p>
+            <a:pPr lvl="1"/>
+            <a:r>
+              <a:rPr lang="de-DE" sz="1400" dirty="0">
+                <a:solidFill>
+                  <a:srgbClr val="000000"/>
+                </a:solidFill>
+                <a:latin typeface="Consolas" panose="020B0609020204030204" pitchFamily="49" charset="0"/>
+              </a:rPr>
+              <a:t>                  .</a:t>
+            </a:r>
+            <a:r>
+              <a:rPr lang="de-DE" sz="1400" dirty="0" err="1">
+                <a:solidFill>
+                  <a:srgbClr val="000000"/>
+                </a:solidFill>
+                <a:latin typeface="Consolas" panose="020B0609020204030204" pitchFamily="49" charset="0"/>
+              </a:rPr>
+              <a:t>ToList</a:t>
+            </a:r>
+            <a:r>
+              <a:rPr lang="de-DE" sz="1400" dirty="0">
+                <a:solidFill>
+                  <a:srgbClr val="000000"/>
+                </a:solidFill>
+                <a:latin typeface="Consolas" panose="020B0609020204030204" pitchFamily="49" charset="0"/>
+              </a:rPr>
+              <a:t>()</a:t>
+            </a:r>
+          </a:p>
+          <a:p>
+            <a:pPr lvl="1"/>
+            <a:r>
+              <a:rPr lang="de-DE" sz="1400" dirty="0">
+                <a:solidFill>
+                  <a:srgbClr val="000000"/>
+                </a:solidFill>
+                <a:latin typeface="Consolas" panose="020B0609020204030204" pitchFamily="49" charset="0"/>
+              </a:rPr>
+              <a:t>                  .Select(p =&gt; </a:t>
+            </a:r>
+            <a:r>
+              <a:rPr lang="de-DE" sz="1400" dirty="0" err="1">
+                <a:solidFill>
+                  <a:srgbClr val="2B91AF"/>
+                </a:solidFill>
+                <a:latin typeface="Consolas" panose="020B0609020204030204" pitchFamily="49" charset="0"/>
+              </a:rPr>
+              <a:t>PostDto</a:t>
+            </a:r>
+            <a:r>
+              <a:rPr lang="de-DE" sz="1400" dirty="0" err="1">
+                <a:solidFill>
+                  <a:srgbClr val="000000"/>
+                </a:solidFill>
+                <a:latin typeface="Consolas" panose="020B0609020204030204" pitchFamily="49" charset="0"/>
+              </a:rPr>
+              <a:t>.Map</a:t>
+            </a:r>
+            <a:r>
+              <a:rPr lang="de-DE" sz="1400" dirty="0">
+                <a:solidFill>
+                  <a:srgbClr val="000000"/>
+                </a:solidFill>
+                <a:latin typeface="Consolas" panose="020B0609020204030204" pitchFamily="49" charset="0"/>
+              </a:rPr>
+              <a:t>(p));</a:t>
+            </a:r>
+          </a:p>
+          <a:p>
+            <a:pPr lvl="1"/>
+            <a:r>
+              <a:rPr lang="de-DE" sz="1400" dirty="0">
+                <a:solidFill>
+                  <a:srgbClr val="000000"/>
+                </a:solidFill>
+                <a:latin typeface="Consolas" panose="020B0609020204030204" pitchFamily="49" charset="0"/>
+              </a:rPr>
+              <a:t>}</a:t>
+            </a:r>
+          </a:p>
+          <a:p>
+            <a:r>
+              <a:rPr lang="de-DE" sz="1400" dirty="0">
+                <a:solidFill>
+                  <a:srgbClr val="000000"/>
+                </a:solidFill>
+                <a:latin typeface="Consolas" panose="020B0609020204030204" pitchFamily="49" charset="0"/>
+              </a:rPr>
+              <a:t>}	</a:t>
+            </a:r>
+          </a:p>
+        </p:txBody>
+      </p:sp>
+    </p:spTree>
+    <p:extLst>
+      <p:ext uri="{BB962C8B-B14F-4D97-AF65-F5344CB8AC3E}">
+        <p14:creationId xmlns:p14="http://schemas.microsoft.com/office/powerpoint/2010/main" val="310283100"/>
+      </p:ext>
+    </p:extLst>
+  </p:cSld>
+  <p:clrMapOvr>
+    <a:masterClrMapping/>
+  </p:clrMapOvr>
+  <p:timing>
+    <p:tnLst>
+      <p:par>
+        <p:cTn id="1" dur="indefinite" restart="never" nodeType="tmRoot"/>
+      </p:par>
+    </p:tnLst>
+  </p:timing>
+</p:sld>
+</file>
+
+<file path=ppt/slides/slide12.xml><?xml version="1.0" encoding="utf-8"?>
+<p:sld xmlns:a="http://schemas.openxmlformats.org/drawingml/2006/main" xmlns:r="http://schemas.openxmlformats.org/officeDocument/2006/relationships" xmlns:p="http://schemas.openxmlformats.org/presentationml/2006/main">
+  <p:cSld>
+    <p:spTree>
+      <p:nvGrpSpPr>
+        <p:cNvPr id="1" name=""/>
+        <p:cNvGrpSpPr/>
+        <p:nvPr/>
+      </p:nvGrpSpPr>
+      <p:grpSpPr>
+        <a:xfrm>
+          <a:off x="0" y="0"/>
+          <a:ext cx="0" cy="0"/>
+          <a:chOff x="0" y="0"/>
+          <a:chExt cx="0" cy="0"/>
+        </a:xfrm>
+      </p:grpSpPr>
+      <p:sp>
+        <p:nvSpPr>
+          <p:cNvPr id="6" name="Titel 5"/>
+          <p:cNvSpPr>
+            <a:spLocks noGrp="1"/>
+          </p:cNvSpPr>
+          <p:nvPr>
+            <p:ph type="title"/>
+          </p:nvPr>
+        </p:nvSpPr>
+        <p:spPr/>
+        <p:txBody>
+          <a:bodyPr/>
+          <a:lstStyle/>
+          <a:p>
+            <a:r>
+              <a:rPr lang="de-DE" dirty="0" smtClean="0"/>
+              <a:t>HANDS-ON</a:t>
+            </a:r>
+            <a:endParaRPr lang="de-DE" dirty="0"/>
+          </a:p>
+        </p:txBody>
+      </p:sp>
+      <p:sp>
+        <p:nvSpPr>
+          <p:cNvPr id="7" name="Untertitel 6"/>
+          <p:cNvSpPr>
+            <a:spLocks noGrp="1"/>
+          </p:cNvSpPr>
+          <p:nvPr>
+            <p:ph type="subTitle" idx="1"/>
+          </p:nvPr>
+        </p:nvSpPr>
+        <p:spPr/>
+        <p:txBody>
+          <a:bodyPr/>
+          <a:lstStyle/>
+          <a:p>
+            <a:r>
+              <a:rPr lang="de-DE" sz="4800" dirty="0" smtClean="0"/>
+              <a:t>05</a:t>
+            </a:r>
+            <a:r>
+              <a:rPr lang="de-DE" sz="4800" dirty="0"/>
+              <a:t>. Entwicklung einer Schnittstelle mit ASP.NET Web API</a:t>
+            </a:r>
+          </a:p>
+        </p:txBody>
+      </p:sp>
+      <p:sp>
+        <p:nvSpPr>
+          <p:cNvPr id="4" name="Foliennummernplatzhalter 3"/>
+          <p:cNvSpPr>
+            <a:spLocks noGrp="1"/>
+          </p:cNvSpPr>
+          <p:nvPr>
+            <p:ph type="sldNum" sz="quarter" idx="10"/>
+          </p:nvPr>
+        </p:nvSpPr>
+        <p:spPr/>
+        <p:txBody>
+          <a:bodyPr/>
+          <a:lstStyle/>
+          <a:p>
+            <a:fld id="{8F35CB8A-22DD-4279-9E9E-A49CDB5FBE56}" type="slidenum">
+              <a:rPr lang="en-US" smtClean="0"/>
+              <a:pPr/>
+              <a:t>12</a:t>
+            </a:fld>
+            <a:endParaRPr lang="en-US" dirty="0"/>
+          </a:p>
+        </p:txBody>
+      </p:sp>
+    </p:spTree>
+    <p:extLst>
+      <p:ext uri="{BB962C8B-B14F-4D97-AF65-F5344CB8AC3E}">
+        <p14:creationId xmlns:p14="http://schemas.microsoft.com/office/powerpoint/2010/main" val="1662466920"/>
+      </p:ext>
+    </p:extLst>
+  </p:cSld>
+  <p:clrMapOvr>
+    <a:masterClrMapping/>
+  </p:clrMapOvr>
+</p:sld>
+</file>
+
+<file path=ppt/slides/slide13.xml><?xml version="1.0" encoding="utf-8"?>
+<p:sld xmlns:a="http://schemas.openxmlformats.org/drawingml/2006/main" xmlns:r="http://schemas.openxmlformats.org/officeDocument/2006/relationships" xmlns:p="http://schemas.openxmlformats.org/presentationml/2006/main">
+  <p:cSld>
+    <p:spTree>
+      <p:nvGrpSpPr>
+        <p:cNvPr id="1" name=""/>
+        <p:cNvGrpSpPr/>
+        <p:nvPr/>
+      </p:nvGrpSpPr>
+      <p:grpSpPr>
+        <a:xfrm>
+          <a:off x="0" y="0"/>
+          <a:ext cx="0" cy="0"/>
+          <a:chOff x="0" y="0"/>
+          <a:chExt cx="0" cy="0"/>
+        </a:xfrm>
+      </p:grpSpPr>
+      <p:sp>
+        <p:nvSpPr>
           <p:cNvPr id="2" name="Titel 1"/>
           <p:cNvSpPr>
             <a:spLocks noGrp="1"/>
@@ -6034,7 +7545,7 @@
             <a:fld id="{8F35CB8A-22DD-4279-9E9E-A49CDB5FBE56}" type="slidenum">
               <a:rPr lang="en-US" smtClean="0"/>
               <a:pPr/>
-              <a:t>11</a:t>
+              <a:t>13</a:t>
             </a:fld>
             <a:endParaRPr lang="en-US"/>
           </a:p>
@@ -6090,7 +7601,7 @@
 </p:sld>
 </file>
 
-<file path=ppt/slides/slide12.xml><?xml version="1.0" encoding="utf-8"?>
+<file path=ppt/slides/slide14.xml><?xml version="1.0" encoding="utf-8"?>
 <p:sld xmlns:a="http://schemas.openxmlformats.org/drawingml/2006/main" xmlns:r="http://schemas.openxmlformats.org/officeDocument/2006/relationships" xmlns:p="http://schemas.openxmlformats.org/presentationml/2006/main">
   <p:cSld>
     <p:spTree>
@@ -6130,7 +7641,7 @@
               <a:pPr>
                 <a:defRPr/>
               </a:pPr>
-              <a:t>12</a:t>
+              <a:t>14</a:t>
             </a:fld>
             <a:endParaRPr lang="sv-SE" dirty="0"/>
           </a:p>
@@ -7666,6 +9177,13 @@
   <p:clrMapOvr>
     <a:masterClrMapping/>
   </p:clrMapOvr>
+  <p:timing>
+    <p:tnLst>
+      <p:par>
+        <p:cTn id="1" dur="indefinite" restart="never" nodeType="tmRoot"/>
+      </p:par>
+    </p:tnLst>
+  </p:timing>
 </p:sld>
 </file>
 
@@ -7743,15 +9261,7 @@
             </a:r>
             <a:r>
               <a:rPr lang="en-US" dirty="0" smtClean="0"/>
-              <a:t> APIs (</a:t>
-            </a:r>
-            <a:r>
-              <a:rPr lang="en-US" dirty="0" smtClean="0"/>
-              <a:t>Representational </a:t>
-            </a:r>
-            <a:r>
-              <a:rPr lang="en-US" dirty="0" smtClean="0"/>
-              <a:t>State Transfer)</a:t>
+              <a:t> APIs (Representational State Transfer)</a:t>
             </a:r>
             <a:endParaRPr lang="en-US" dirty="0" smtClean="0">
               <a:solidFill>
@@ -8468,6 +9978,13 @@
   <p:clrMapOvr>
     <a:masterClrMapping/>
   </p:clrMapOvr>
+  <p:timing>
+    <p:tnLst>
+      <p:par>
+        <p:cTn id="1" dur="indefinite" restart="never" nodeType="tmRoot"/>
+      </p:par>
+    </p:tnLst>
+  </p:timing>
 </p:sld>
 </file>
 
@@ -8628,6 +10145,13 @@
   <p:clrMapOvr>
     <a:masterClrMapping/>
   </p:clrMapOvr>
+  <p:timing>
+    <p:tnLst>
+      <p:par>
+        <p:cTn id="1" dur="indefinite" restart="never" nodeType="tmRoot"/>
+      </p:par>
+    </p:tnLst>
+  </p:timing>
 </p:sld>
 </file>
 
@@ -8912,429 +10436,6 @@
           </a:p>
         </p:txBody>
       </p:sp>
-      <p:pic>
-        <p:nvPicPr>
-          <p:cNvPr id="4" name="Grafik 3"/>
-          <p:cNvPicPr>
-            <a:picLocks noChangeAspect="1"/>
-          </p:cNvPicPr>
-          <p:nvPr/>
-        </p:nvPicPr>
-        <p:blipFill>
-          <a:blip r:embed="rId3"/>
-          <a:stretch>
-            <a:fillRect/>
-          </a:stretch>
-        </p:blipFill>
-        <p:spPr>
-          <a:xfrm>
-            <a:off x="7157357" y="1044870"/>
-            <a:ext cx="4267200" cy="3028950"/>
-          </a:xfrm>
-          <a:prstGeom prst="rect">
-            <a:avLst/>
-          </a:prstGeom>
-        </p:spPr>
-      </p:pic>
-      <p:sp>
-        <p:nvSpPr>
-          <p:cNvPr id="5" name="Textfeld 4"/>
-          <p:cNvSpPr txBox="1"/>
-          <p:nvPr/>
-        </p:nvSpPr>
-        <p:spPr>
-          <a:xfrm>
-            <a:off x="6882493" y="4073820"/>
-            <a:ext cx="4816928" cy="1815882"/>
-          </a:xfrm>
-          <a:prstGeom prst="rect">
-            <a:avLst/>
-          </a:prstGeom>
-          <a:noFill/>
-        </p:spPr>
-        <p:txBody>
-          <a:bodyPr wrap="square" rtlCol="0">
-            <a:spAutoFit/>
-          </a:bodyPr>
-          <a:lstStyle/>
-          <a:p>
-            <a:r>
-              <a:rPr lang="en-US" sz="1600" dirty="0">
-                <a:solidFill>
-                  <a:srgbClr val="000000"/>
-                </a:solidFill>
-                <a:latin typeface="Consolas" panose="020B0609020204030204" pitchFamily="49" charset="0"/>
-              </a:rPr>
-              <a:t> </a:t>
-            </a:r>
-            <a:r>
-              <a:rPr lang="en-US" sz="1600" dirty="0">
-                <a:solidFill>
-                  <a:srgbClr val="0000FF"/>
-                </a:solidFill>
-                <a:latin typeface="Consolas" panose="020B0609020204030204" pitchFamily="49" charset="0"/>
-              </a:rPr>
-              <a:t>public</a:t>
-            </a:r>
-            <a:r>
-              <a:rPr lang="en-US" sz="1600" dirty="0">
-                <a:solidFill>
-                  <a:srgbClr val="000000"/>
-                </a:solidFill>
-                <a:latin typeface="Consolas" panose="020B0609020204030204" pitchFamily="49" charset="0"/>
-              </a:rPr>
-              <a:t> </a:t>
-            </a:r>
-            <a:r>
-              <a:rPr lang="en-US" sz="1600" dirty="0">
-                <a:solidFill>
-                  <a:srgbClr val="0000FF"/>
-                </a:solidFill>
-                <a:latin typeface="Consolas" panose="020B0609020204030204" pitchFamily="49" charset="0"/>
-              </a:rPr>
-              <a:t>static</a:t>
-            </a:r>
-            <a:r>
-              <a:rPr lang="en-US" sz="1600" dirty="0">
-                <a:solidFill>
-                  <a:srgbClr val="000000"/>
-                </a:solidFill>
-                <a:latin typeface="Consolas" panose="020B0609020204030204" pitchFamily="49" charset="0"/>
-              </a:rPr>
-              <a:t> </a:t>
-            </a:r>
-            <a:r>
-              <a:rPr lang="en-US" sz="1600" dirty="0" err="1" smtClean="0">
-                <a:solidFill>
-                  <a:srgbClr val="2B91AF"/>
-                </a:solidFill>
-                <a:latin typeface="Consolas" panose="020B0609020204030204" pitchFamily="49" charset="0"/>
-              </a:rPr>
-              <a:t>UserDto</a:t>
-            </a:r>
-            <a:r>
-              <a:rPr lang="en-US" sz="1600" dirty="0" smtClean="0">
-                <a:solidFill>
-                  <a:srgbClr val="000000"/>
-                </a:solidFill>
-                <a:latin typeface="Consolas" panose="020B0609020204030204" pitchFamily="49" charset="0"/>
-              </a:rPr>
-              <a:t> Map(User user) </a:t>
-            </a:r>
-            <a:r>
-              <a:rPr lang="de-DE" sz="1600" dirty="0" smtClean="0">
-                <a:solidFill>
-                  <a:srgbClr val="000000"/>
-                </a:solidFill>
-                <a:latin typeface="Consolas" panose="020B0609020204030204" pitchFamily="49" charset="0"/>
-              </a:rPr>
-              <a:t>{</a:t>
-            </a:r>
-            <a:endParaRPr lang="de-DE" sz="1600" dirty="0">
-              <a:solidFill>
-                <a:srgbClr val="000000"/>
-              </a:solidFill>
-              <a:latin typeface="Consolas" panose="020B0609020204030204" pitchFamily="49" charset="0"/>
-            </a:endParaRPr>
-          </a:p>
-          <a:p>
-            <a:r>
-              <a:rPr lang="de-DE" sz="1600" dirty="0">
-                <a:solidFill>
-                  <a:srgbClr val="000000"/>
-                </a:solidFill>
-                <a:latin typeface="Consolas" panose="020B0609020204030204" pitchFamily="49" charset="0"/>
-              </a:rPr>
-              <a:t>            </a:t>
-            </a:r>
-            <a:r>
-              <a:rPr lang="de-DE" sz="1600" dirty="0" err="1">
-                <a:solidFill>
-                  <a:srgbClr val="0000FF"/>
-                </a:solidFill>
-                <a:latin typeface="Consolas" panose="020B0609020204030204" pitchFamily="49" charset="0"/>
-              </a:rPr>
-              <a:t>return</a:t>
-            </a:r>
-            <a:r>
-              <a:rPr lang="de-DE" sz="1600" dirty="0">
-                <a:solidFill>
-                  <a:srgbClr val="000000"/>
-                </a:solidFill>
-                <a:latin typeface="Consolas" panose="020B0609020204030204" pitchFamily="49" charset="0"/>
-              </a:rPr>
-              <a:t> </a:t>
-            </a:r>
-            <a:r>
-              <a:rPr lang="de-DE" sz="1600" dirty="0" err="1">
-                <a:solidFill>
-                  <a:srgbClr val="0000FF"/>
-                </a:solidFill>
-                <a:latin typeface="Consolas" panose="020B0609020204030204" pitchFamily="49" charset="0"/>
-              </a:rPr>
-              <a:t>new</a:t>
-            </a:r>
-            <a:r>
-              <a:rPr lang="de-DE" sz="1600" dirty="0">
-                <a:solidFill>
-                  <a:srgbClr val="000000"/>
-                </a:solidFill>
-                <a:latin typeface="Consolas" panose="020B0609020204030204" pitchFamily="49" charset="0"/>
-              </a:rPr>
-              <a:t> </a:t>
-            </a:r>
-            <a:r>
-              <a:rPr lang="de-DE" sz="1600" dirty="0" err="1" smtClean="0">
-                <a:solidFill>
-                  <a:srgbClr val="2B91AF"/>
-                </a:solidFill>
-                <a:latin typeface="Consolas" panose="020B0609020204030204" pitchFamily="49" charset="0"/>
-              </a:rPr>
-              <a:t>UserDto</a:t>
-            </a:r>
-            <a:r>
-              <a:rPr lang="de-DE" sz="1600" dirty="0" smtClean="0">
-                <a:solidFill>
-                  <a:srgbClr val="000000"/>
-                </a:solidFill>
-                <a:latin typeface="Consolas" panose="020B0609020204030204" pitchFamily="49" charset="0"/>
-              </a:rPr>
-              <a:t> {</a:t>
-            </a:r>
-            <a:endParaRPr lang="de-DE" sz="1600" dirty="0">
-              <a:solidFill>
-                <a:srgbClr val="000000"/>
-              </a:solidFill>
-              <a:latin typeface="Consolas" panose="020B0609020204030204" pitchFamily="49" charset="0"/>
-            </a:endParaRPr>
-          </a:p>
-          <a:p>
-            <a:r>
-              <a:rPr lang="de-DE" sz="1600" dirty="0">
-                <a:solidFill>
-                  <a:srgbClr val="000000"/>
-                </a:solidFill>
-                <a:latin typeface="Consolas" panose="020B0609020204030204" pitchFamily="49" charset="0"/>
-              </a:rPr>
-              <a:t>            </a:t>
-            </a:r>
-            <a:r>
-              <a:rPr lang="de-DE" sz="1600" dirty="0" smtClean="0">
-                <a:solidFill>
-                  <a:srgbClr val="000000"/>
-                </a:solidFill>
-                <a:latin typeface="Consolas" panose="020B0609020204030204" pitchFamily="49" charset="0"/>
-              </a:rPr>
-              <a:t>	</a:t>
-            </a:r>
-            <a:r>
-              <a:rPr lang="de-DE" sz="1600" dirty="0" err="1" smtClean="0">
-                <a:solidFill>
-                  <a:srgbClr val="000000"/>
-                </a:solidFill>
-                <a:latin typeface="Consolas" panose="020B0609020204030204" pitchFamily="49" charset="0"/>
-              </a:rPr>
-              <a:t>Id</a:t>
-            </a:r>
-            <a:r>
-              <a:rPr lang="de-DE" sz="1600" dirty="0" smtClean="0">
-                <a:solidFill>
-                  <a:srgbClr val="000000"/>
-                </a:solidFill>
-                <a:latin typeface="Consolas" panose="020B0609020204030204" pitchFamily="49" charset="0"/>
-              </a:rPr>
-              <a:t> </a:t>
-            </a:r>
-            <a:r>
-              <a:rPr lang="de-DE" sz="1600" dirty="0">
-                <a:solidFill>
-                  <a:srgbClr val="000000"/>
-                </a:solidFill>
-                <a:latin typeface="Consolas" panose="020B0609020204030204" pitchFamily="49" charset="0"/>
-              </a:rPr>
-              <a:t>= </a:t>
-            </a:r>
-            <a:r>
-              <a:rPr lang="de-DE" sz="1600" dirty="0" err="1" smtClean="0">
-                <a:solidFill>
-                  <a:srgbClr val="000000"/>
-                </a:solidFill>
-                <a:latin typeface="Consolas" panose="020B0609020204030204" pitchFamily="49" charset="0"/>
-              </a:rPr>
-              <a:t>user.Id</a:t>
-            </a:r>
-            <a:r>
-              <a:rPr lang="de-DE" sz="1600" dirty="0" smtClean="0">
-                <a:solidFill>
-                  <a:srgbClr val="000000"/>
-                </a:solidFill>
-                <a:latin typeface="Consolas" panose="020B0609020204030204" pitchFamily="49" charset="0"/>
-              </a:rPr>
-              <a:t>,</a:t>
-            </a:r>
-            <a:r>
-              <a:rPr lang="de-DE" sz="1600" dirty="0">
-                <a:solidFill>
-                  <a:srgbClr val="000000"/>
-                </a:solidFill>
-                <a:latin typeface="Consolas" panose="020B0609020204030204" pitchFamily="49" charset="0"/>
-              </a:rPr>
-              <a:t> </a:t>
-            </a:r>
-            <a:endParaRPr lang="de-DE" sz="1600" dirty="0" smtClean="0">
-              <a:solidFill>
-                <a:srgbClr val="000000"/>
-              </a:solidFill>
-              <a:latin typeface="Consolas" panose="020B0609020204030204" pitchFamily="49" charset="0"/>
-            </a:endParaRPr>
-          </a:p>
-          <a:p>
-            <a:r>
-              <a:rPr lang="de-DE" sz="1600" dirty="0">
-                <a:solidFill>
-                  <a:srgbClr val="000000"/>
-                </a:solidFill>
-                <a:latin typeface="Consolas" panose="020B0609020204030204" pitchFamily="49" charset="0"/>
-              </a:rPr>
-              <a:t>	</a:t>
-            </a:r>
-            <a:r>
-              <a:rPr lang="de-DE" sz="1600" dirty="0" smtClean="0">
-                <a:solidFill>
-                  <a:srgbClr val="000000"/>
-                </a:solidFill>
-                <a:latin typeface="Consolas" panose="020B0609020204030204" pitchFamily="49" charset="0"/>
-              </a:rPr>
-              <a:t>	Status </a:t>
-            </a:r>
-            <a:r>
-              <a:rPr lang="de-DE" sz="1600" dirty="0">
-                <a:solidFill>
-                  <a:srgbClr val="000000"/>
-                </a:solidFill>
-                <a:latin typeface="Consolas" panose="020B0609020204030204" pitchFamily="49" charset="0"/>
-              </a:rPr>
-              <a:t>= </a:t>
-            </a:r>
-            <a:r>
-              <a:rPr lang="de-DE" sz="1600" dirty="0" err="1" smtClean="0">
-                <a:solidFill>
-                  <a:srgbClr val="000000"/>
-                </a:solidFill>
-                <a:latin typeface="Consolas" panose="020B0609020204030204" pitchFamily="49" charset="0"/>
-              </a:rPr>
-              <a:t>user.Status</a:t>
-            </a:r>
-            <a:endParaRPr lang="de-DE" sz="1600" dirty="0" smtClean="0">
-              <a:solidFill>
-                <a:srgbClr val="000000"/>
-              </a:solidFill>
-              <a:latin typeface="Consolas" panose="020B0609020204030204" pitchFamily="49" charset="0"/>
-            </a:endParaRPr>
-          </a:p>
-          <a:p>
-            <a:r>
-              <a:rPr lang="de-DE" sz="1600" dirty="0" smtClean="0">
-                <a:solidFill>
-                  <a:srgbClr val="000000"/>
-                </a:solidFill>
-                <a:latin typeface="Consolas" panose="020B0609020204030204" pitchFamily="49" charset="0"/>
-              </a:rPr>
-              <a:t> </a:t>
-            </a:r>
-            <a:r>
-              <a:rPr lang="de-DE" sz="1600" dirty="0">
-                <a:solidFill>
-                  <a:srgbClr val="000000"/>
-                </a:solidFill>
-                <a:latin typeface="Consolas" panose="020B0609020204030204" pitchFamily="49" charset="0"/>
-              </a:rPr>
-              <a:t>	</a:t>
-            </a:r>
-            <a:r>
-              <a:rPr lang="de-DE" sz="1600" dirty="0" smtClean="0">
-                <a:solidFill>
-                  <a:srgbClr val="000000"/>
-                </a:solidFill>
-                <a:latin typeface="Consolas" panose="020B0609020204030204" pitchFamily="49" charset="0"/>
-              </a:rPr>
-              <a:t>	Name </a:t>
-            </a:r>
-            <a:r>
-              <a:rPr lang="de-DE" sz="1600" dirty="0">
-                <a:solidFill>
-                  <a:srgbClr val="000000"/>
-                </a:solidFill>
-                <a:latin typeface="Consolas" panose="020B0609020204030204" pitchFamily="49" charset="0"/>
-              </a:rPr>
-              <a:t>= </a:t>
-            </a:r>
-            <a:r>
-              <a:rPr lang="de-DE" sz="1600" dirty="0" err="1" smtClean="0">
-                <a:solidFill>
-                  <a:srgbClr val="000000"/>
-                </a:solidFill>
-                <a:latin typeface="Consolas" panose="020B0609020204030204" pitchFamily="49" charset="0"/>
-              </a:rPr>
-              <a:t>user.Name</a:t>
-            </a:r>
-            <a:r>
-              <a:rPr lang="de-DE" sz="1600" dirty="0">
-                <a:solidFill>
-                  <a:srgbClr val="000000"/>
-                </a:solidFill>
-                <a:latin typeface="Consolas" panose="020B0609020204030204" pitchFamily="49" charset="0"/>
-              </a:rPr>
-              <a:t>,</a:t>
-            </a:r>
-          </a:p>
-          <a:p>
-            <a:r>
-              <a:rPr lang="de-DE" sz="1600" dirty="0">
-                <a:solidFill>
-                  <a:srgbClr val="000000"/>
-                </a:solidFill>
-                <a:latin typeface="Consolas" panose="020B0609020204030204" pitchFamily="49" charset="0"/>
-              </a:rPr>
-              <a:t>             </a:t>
-            </a:r>
-            <a:r>
-              <a:rPr lang="de-DE" sz="1600" dirty="0" smtClean="0">
-                <a:solidFill>
-                  <a:srgbClr val="000000"/>
-                </a:solidFill>
-                <a:latin typeface="Consolas" panose="020B0609020204030204" pitchFamily="49" charset="0"/>
-              </a:rPr>
-              <a:t>	};</a:t>
-            </a:r>
-          </a:p>
-          <a:p>
-            <a:r>
-              <a:rPr lang="de-DE" sz="1600" dirty="0">
-                <a:solidFill>
-                  <a:srgbClr val="000000"/>
-                </a:solidFill>
-                <a:latin typeface="Consolas" panose="020B0609020204030204" pitchFamily="49" charset="0"/>
-              </a:rPr>
-              <a:t> </a:t>
-            </a:r>
-            <a:r>
-              <a:rPr lang="de-DE" sz="1600" dirty="0" smtClean="0">
-                <a:solidFill>
-                  <a:srgbClr val="000000"/>
-                </a:solidFill>
-                <a:latin typeface="Consolas" panose="020B0609020204030204" pitchFamily="49" charset="0"/>
-              </a:rPr>
-              <a:t>}</a:t>
-            </a:r>
-            <a:endParaRPr lang="de-DE" sz="1200" dirty="0" smtClean="0">
-              <a:solidFill>
-                <a:schemeClr val="accent3"/>
-              </a:solidFill>
-            </a:endParaRPr>
-          </a:p>
-        </p:txBody>
-      </p:sp>
     </p:spTree>
     <p:extLst>
       <p:ext uri="{BB962C8B-B14F-4D97-AF65-F5344CB8AC3E}">
@@ -9345,6 +10446,13 @@
   <p:clrMapOvr>
     <a:masterClrMapping/>
   </p:clrMapOvr>
+  <p:timing>
+    <p:tnLst>
+      <p:par>
+        <p:cTn id="1" dur="indefinite" restart="never" nodeType="tmRoot"/>
+      </p:par>
+    </p:tnLst>
+  </p:timing>
 </p:sld>
 </file>
 
@@ -9382,239 +10490,73 @@
           <a:p>
             <a:r>
               <a:rPr lang="en-US" dirty="0" smtClean="0"/>
-              <a:t>2.1 ASP.NET Web </a:t>
-            </a:r>
-            <a:r>
-              <a:rPr lang="en-US" dirty="0" err="1" smtClean="0"/>
-              <a:t>Api</a:t>
+              <a:t>1.4 DTO (Data-Transfer-Object</a:t>
             </a:r>
             <a:r>
               <a:rPr lang="en-US" dirty="0" smtClean="0"/>
-              <a:t>: Controller und Routing</a:t>
+              <a:t>) Code Snippet</a:t>
             </a:r>
             <a:endParaRPr lang="en-US" dirty="0"/>
           </a:p>
         </p:txBody>
       </p:sp>
-      <p:sp>
-        <p:nvSpPr>
-          <p:cNvPr id="3" name="Content Placeholder 2"/>
-          <p:cNvSpPr>
-            <a:spLocks noGrp="1"/>
-          </p:cNvSpPr>
-          <p:nvPr>
-            <p:ph sz="quarter" idx="10"/>
-          </p:nvPr>
-        </p:nvSpPr>
+      <p:pic>
+        <p:nvPicPr>
+          <p:cNvPr id="4" name="Grafik 3"/>
+          <p:cNvPicPr>
+            <a:picLocks noChangeAspect="1"/>
+          </p:cNvPicPr>
+          <p:nvPr/>
+        </p:nvPicPr>
+        <p:blipFill>
+          <a:blip r:embed="rId3"/>
+          <a:stretch>
+            <a:fillRect/>
+          </a:stretch>
+        </p:blipFill>
         <p:spPr>
           <a:xfrm>
-            <a:off x="379364" y="1388547"/>
-            <a:ext cx="6383588" cy="5291613"/>
-          </a:xfrm>
-        </p:spPr>
-        <p:txBody>
-          <a:bodyPr/>
-          <a:lstStyle/>
-          <a:p>
-            <a:r>
-              <a:rPr lang="en-US" dirty="0" smtClean="0"/>
-              <a:t>Framework </a:t>
-            </a:r>
-            <a:r>
-              <a:rPr lang="en-US" dirty="0" err="1" smtClean="0"/>
-              <a:t>zum</a:t>
-            </a:r>
-            <a:r>
-              <a:rPr lang="en-US" dirty="0" smtClean="0"/>
-              <a:t> </a:t>
-            </a:r>
-            <a:r>
-              <a:rPr lang="en-US" dirty="0" err="1" smtClean="0"/>
-              <a:t>Entwickeln</a:t>
-            </a:r>
-            <a:r>
-              <a:rPr lang="en-US" dirty="0" smtClean="0"/>
-              <a:t> von REST APIs</a:t>
-            </a:r>
-          </a:p>
-          <a:p>
-            <a:r>
-              <a:rPr lang="en-US" dirty="0" err="1" smtClean="0"/>
-              <a:t>ApiController</a:t>
-            </a:r>
-            <a:r>
-              <a:rPr lang="en-US" dirty="0" smtClean="0"/>
-              <a:t> </a:t>
-            </a:r>
-            <a:r>
-              <a:rPr lang="en-US" dirty="0" err="1" smtClean="0"/>
-              <a:t>verarbeiten</a:t>
-            </a:r>
-            <a:r>
-              <a:rPr lang="en-US" dirty="0" smtClean="0"/>
-              <a:t> REST Requests </a:t>
-            </a:r>
-            <a:br>
-              <a:rPr lang="en-US" dirty="0" smtClean="0"/>
-            </a:br>
-            <a:r>
-              <a:rPr lang="en-US" sz="1600" dirty="0" smtClean="0"/>
-              <a:t>(</a:t>
-            </a:r>
-            <a:r>
-              <a:rPr lang="en-US" sz="1600" dirty="0" err="1" smtClean="0"/>
-              <a:t>ähnlich</a:t>
-            </a:r>
-            <a:r>
-              <a:rPr lang="en-US" sz="1600" dirty="0" smtClean="0"/>
-              <a:t> </a:t>
-            </a:r>
-            <a:r>
-              <a:rPr lang="en-US" sz="1600" dirty="0" err="1" smtClean="0"/>
-              <a:t>zu</a:t>
-            </a:r>
-            <a:r>
-              <a:rPr lang="en-US" sz="1600" dirty="0" smtClean="0"/>
-              <a:t> MVC </a:t>
-            </a:r>
-            <a:r>
-              <a:rPr lang="en-US" sz="1600" dirty="0" err="1" smtClean="0"/>
-              <a:t>Controllern</a:t>
-            </a:r>
-            <a:r>
-              <a:rPr lang="en-US" sz="1600" dirty="0" smtClean="0"/>
-              <a:t>)</a:t>
-            </a:r>
-            <a:endParaRPr lang="en-US" dirty="0" smtClean="0"/>
-          </a:p>
-          <a:p>
-            <a:r>
-              <a:rPr lang="en-US" dirty="0" err="1" smtClean="0"/>
-              <a:t>Für</a:t>
-            </a:r>
-            <a:r>
-              <a:rPr lang="en-US" dirty="0" smtClean="0"/>
-              <a:t> die </a:t>
-            </a:r>
-            <a:r>
-              <a:rPr lang="en-US" dirty="0" err="1" smtClean="0"/>
-              <a:t>Ansteuerung</a:t>
-            </a:r>
-            <a:r>
-              <a:rPr lang="en-US" dirty="0" smtClean="0"/>
-              <a:t> der </a:t>
-            </a:r>
-            <a:r>
-              <a:rPr lang="en-US" dirty="0" err="1" smtClean="0"/>
-              <a:t>Methoden</a:t>
-            </a:r>
-            <a:r>
-              <a:rPr lang="en-US" dirty="0" smtClean="0"/>
-              <a:t> </a:t>
-            </a:r>
-            <a:r>
-              <a:rPr lang="en-US" dirty="0" err="1" smtClean="0"/>
-              <a:t>werden</a:t>
-            </a:r>
-            <a:r>
-              <a:rPr lang="en-US" dirty="0" smtClean="0"/>
-              <a:t> </a:t>
-            </a:r>
-            <a:r>
-              <a:rPr lang="en-US" dirty="0" err="1" smtClean="0"/>
-              <a:t>Routen</a:t>
-            </a:r>
-            <a:r>
-              <a:rPr lang="en-US" dirty="0" smtClean="0"/>
-              <a:t> </a:t>
-            </a:r>
-            <a:r>
-              <a:rPr lang="en-US" dirty="0" err="1" smtClean="0"/>
-              <a:t>benötigt</a:t>
-            </a:r>
-            <a:endParaRPr lang="en-US" dirty="0" smtClean="0"/>
-          </a:p>
-          <a:p>
-            <a:pPr lvl="1"/>
-            <a:r>
-              <a:rPr lang="en-US" dirty="0" smtClean="0">
-                <a:solidFill>
-                  <a:schemeClr val="accent3"/>
-                </a:solidFill>
-              </a:rPr>
-              <a:t>Convention based </a:t>
-            </a:r>
-            <a:r>
-              <a:rPr lang="en-US" dirty="0" smtClean="0">
-                <a:solidFill>
-                  <a:schemeClr val="accent3"/>
-                </a:solidFill>
-              </a:rPr>
-              <a:t>Routing / </a:t>
-            </a:r>
-            <a:r>
-              <a:rPr lang="en-US" dirty="0" err="1" smtClean="0">
-                <a:solidFill>
-                  <a:schemeClr val="accent3"/>
-                </a:solidFill>
-              </a:rPr>
-              <a:t>WebApiConfig</a:t>
-            </a:r>
-            <a:endParaRPr lang="en-US" dirty="0" smtClean="0">
-              <a:solidFill>
-                <a:schemeClr val="accent3"/>
-              </a:solidFill>
-            </a:endParaRPr>
-          </a:p>
-          <a:p>
-            <a:pPr lvl="1"/>
-            <a:r>
-              <a:rPr lang="en-US" dirty="0" smtClean="0">
-                <a:solidFill>
-                  <a:schemeClr val="accent3"/>
-                </a:solidFill>
-              </a:rPr>
-              <a:t>Attribute based </a:t>
-            </a:r>
-            <a:r>
-              <a:rPr lang="en-US" dirty="0" smtClean="0">
-                <a:solidFill>
-                  <a:schemeClr val="accent3"/>
-                </a:solidFill>
-              </a:rPr>
-              <a:t>Routing</a:t>
-            </a:r>
-            <a:endParaRPr lang="en-US" dirty="0">
-              <a:solidFill>
-                <a:schemeClr val="accent3"/>
-              </a:solidFill>
-            </a:endParaRPr>
-          </a:p>
-        </p:txBody>
-      </p:sp>
-      <p:sp>
-        <p:nvSpPr>
-          <p:cNvPr id="5" name="Rechteck 4"/>
-          <p:cNvSpPr/>
-          <p:nvPr/>
-        </p:nvSpPr>
-        <p:spPr>
-          <a:xfrm>
-            <a:off x="7010400" y="1700557"/>
-            <a:ext cx="5180013" cy="1569660"/>
+            <a:off x="587297" y="1545612"/>
+            <a:ext cx="5410731" cy="3840653"/>
           </a:xfrm>
           <a:prstGeom prst="rect">
             <a:avLst/>
           </a:prstGeom>
         </p:spPr>
-        <p:txBody>
-          <a:bodyPr wrap="square">
+      </p:pic>
+      <p:sp>
+        <p:nvSpPr>
+          <p:cNvPr id="5" name="Textfeld 4"/>
+          <p:cNvSpPr txBox="1"/>
+          <p:nvPr/>
+        </p:nvSpPr>
+        <p:spPr>
+          <a:xfrm>
+            <a:off x="3589564" y="4291534"/>
+            <a:ext cx="4816928" cy="1600438"/>
+          </a:xfrm>
+          <a:prstGeom prst="rect">
+            <a:avLst/>
+          </a:prstGeom>
+          <a:noFill/>
+        </p:spPr>
+        <p:txBody>
+          <a:bodyPr wrap="square" rtlCol="0">
             <a:spAutoFit/>
           </a:bodyPr>
           <a:lstStyle/>
           <a:p>
             <a:r>
-              <a:rPr lang="de-DE" sz="1200" dirty="0" err="1">
+              <a:rPr lang="en-US" sz="1400" dirty="0">
+                <a:solidFill>
+                  <a:srgbClr val="000000"/>
+                </a:solidFill>
+                <a:latin typeface="Consolas" panose="020B0609020204030204" pitchFamily="49" charset="0"/>
+              </a:rPr>
+              <a:t> </a:t>
+            </a:r>
+            <a:r>
+              <a:rPr lang="en-US" sz="1400" dirty="0">
                 <a:solidFill>
                   <a:srgbClr val="0000FF"/>
                 </a:solidFill>
@@ -9623,7 +10565,7 @@
               <a:t>public</a:t>
             </a:r>
             <a:r>
-              <a:rPr lang="de-DE" sz="1200" dirty="0">
+              <a:rPr lang="en-US" sz="1400" dirty="0">
                 <a:solidFill>
                   <a:srgbClr val="000000"/>
                 </a:solidFill>
@@ -9632,16 +10574,16 @@
               <a:t> </a:t>
             </a:r>
             <a:r>
-              <a:rPr lang="de-DE" sz="1200" dirty="0" err="1">
+              <a:rPr lang="en-US" sz="1400" dirty="0">
                 <a:solidFill>
                   <a:srgbClr val="0000FF"/>
                 </a:solidFill>
                 <a:latin typeface="Consolas" panose="020B0609020204030204" pitchFamily="49" charset="0"/>
               </a:rPr>
-              <a:t>class</a:t>
-            </a:r>
-            <a:r>
-              <a:rPr lang="de-DE" sz="1200" dirty="0">
+              <a:t>static</a:t>
+            </a:r>
+            <a:r>
+              <a:rPr lang="en-US" sz="1400" dirty="0">
                 <a:solidFill>
                   <a:srgbClr val="000000"/>
                 </a:solidFill>
@@ -9650,33 +10592,33 @@
               <a:t> </a:t>
             </a:r>
             <a:r>
-              <a:rPr lang="de-DE" sz="1200" dirty="0" err="1">
+              <a:rPr lang="en-US" sz="1400" dirty="0" err="1" smtClean="0">
                 <a:solidFill>
                   <a:srgbClr val="2B91AF"/>
                 </a:solidFill>
                 <a:latin typeface="Consolas" panose="020B0609020204030204" pitchFamily="49" charset="0"/>
               </a:rPr>
-              <a:t>PostsController</a:t>
-            </a:r>
-            <a:r>
-              <a:rPr lang="de-DE" sz="1200" dirty="0">
+              <a:t>UserDto</a:t>
+            </a:r>
+            <a:r>
+              <a:rPr lang="en-US" sz="1400" dirty="0" smtClean="0">
                 <a:solidFill>
                   <a:srgbClr val="000000"/>
                 </a:solidFill>
                 <a:latin typeface="Consolas" panose="020B0609020204030204" pitchFamily="49" charset="0"/>
               </a:rPr>
-              <a:t> : </a:t>
-            </a:r>
-            <a:r>
-              <a:rPr lang="de-DE" sz="1200" dirty="0" err="1" smtClean="0">
+              <a:t> Map(User user) </a:t>
+            </a:r>
+            <a:r>
+              <a:rPr lang="de-DE" sz="1400" dirty="0" smtClean="0">
                 <a:solidFill>
                   <a:srgbClr val="000000"/>
                 </a:solidFill>
                 <a:latin typeface="Consolas" panose="020B0609020204030204" pitchFamily="49" charset="0"/>
               </a:rPr>
-              <a:t>ApiController</a:t>
-            </a:r>
-            <a:endParaRPr lang="de-DE" sz="1200" dirty="0">
+              <a:t>{</a:t>
+            </a:r>
+            <a:endParaRPr lang="de-DE" sz="1400" dirty="0">
               <a:solidFill>
                 <a:srgbClr val="000000"/>
               </a:solidFill>
@@ -9685,34 +10627,25 @@
           </a:p>
           <a:p>
             <a:r>
-              <a:rPr lang="de-DE" sz="1200" dirty="0" smtClean="0">
+              <a:rPr lang="de-DE" sz="1400" dirty="0">
                 <a:solidFill>
                   <a:srgbClr val="000000"/>
                 </a:solidFill>
                 <a:latin typeface="Consolas" panose="020B0609020204030204" pitchFamily="49" charset="0"/>
               </a:rPr>
-              <a:t>{</a:t>
-            </a:r>
-            <a:endParaRPr lang="de-DE" sz="1200" dirty="0" smtClean="0">
-              <a:solidFill>
-                <a:srgbClr val="0000FF"/>
-              </a:solidFill>
-              <a:latin typeface="Consolas" panose="020B0609020204030204" pitchFamily="49" charset="0"/>
-            </a:endParaRPr>
-          </a:p>
-          <a:p>
-            <a:pPr lvl="1"/>
-            <a:r>
-              <a:rPr lang="de-DE" sz="1200" dirty="0" err="1" smtClean="0">
+              <a:t>            </a:t>
+            </a:r>
+            <a:r>
+              <a:rPr lang="de-DE" sz="1400" dirty="0" err="1">
                 <a:solidFill>
                   <a:srgbClr val="0000FF"/>
                 </a:solidFill>
                 <a:latin typeface="Consolas" panose="020B0609020204030204" pitchFamily="49" charset="0"/>
               </a:rPr>
-              <a:t>public</a:t>
-            </a:r>
-            <a:r>
-              <a:rPr lang="de-DE" sz="1200" dirty="0" smtClean="0">
+              <a:t>return</a:t>
+            </a:r>
+            <a:r>
+              <a:rPr lang="de-DE" sz="1400" dirty="0">
                 <a:solidFill>
                   <a:srgbClr val="000000"/>
                 </a:solidFill>
@@ -9721,120 +10654,42 @@
               <a:t> </a:t>
             </a:r>
             <a:r>
-              <a:rPr lang="de-DE" sz="1200" dirty="0" err="1">
+              <a:rPr lang="de-DE" sz="1400" dirty="0" err="1">
+                <a:solidFill>
+                  <a:srgbClr val="0000FF"/>
+                </a:solidFill>
+                <a:latin typeface="Consolas" panose="020B0609020204030204" pitchFamily="49" charset="0"/>
+              </a:rPr>
+              <a:t>new</a:t>
+            </a:r>
+            <a:r>
+              <a:rPr lang="de-DE" sz="1400" dirty="0">
+                <a:solidFill>
+                  <a:srgbClr val="000000"/>
+                </a:solidFill>
+                <a:latin typeface="Consolas" panose="020B0609020204030204" pitchFamily="49" charset="0"/>
+              </a:rPr>
+              <a:t> </a:t>
+            </a:r>
+            <a:r>
+              <a:rPr lang="de-DE" sz="1400" dirty="0" err="1" smtClean="0">
                 <a:solidFill>
                   <a:srgbClr val="2B91AF"/>
                 </a:solidFill>
                 <a:latin typeface="Consolas" panose="020B0609020204030204" pitchFamily="49" charset="0"/>
               </a:rPr>
-              <a:t>IEnumerable</a:t>
-            </a:r>
-            <a:r>
-              <a:rPr lang="de-DE" sz="1200" dirty="0">
+              <a:t>UserDto</a:t>
+            </a:r>
+            <a:r>
+              <a:rPr lang="de-DE" sz="1400" dirty="0" smtClean="0">
                 <a:solidFill>
                   <a:srgbClr val="000000"/>
                 </a:solidFill>
                 <a:latin typeface="Consolas" panose="020B0609020204030204" pitchFamily="49" charset="0"/>
               </a:rPr>
-              <a:t>&lt;</a:t>
-            </a:r>
-            <a:r>
-              <a:rPr lang="de-DE" sz="1200" dirty="0" err="1">
-                <a:solidFill>
-                  <a:srgbClr val="2B91AF"/>
-                </a:solidFill>
-                <a:latin typeface="Consolas" panose="020B0609020204030204" pitchFamily="49" charset="0"/>
-              </a:rPr>
-              <a:t>PostDto</a:t>
-            </a:r>
-            <a:r>
-              <a:rPr lang="de-DE" sz="1200" dirty="0">
-                <a:solidFill>
-                  <a:srgbClr val="000000"/>
-                </a:solidFill>
-                <a:latin typeface="Consolas" panose="020B0609020204030204" pitchFamily="49" charset="0"/>
-              </a:rPr>
-              <a:t>&gt; </a:t>
-            </a:r>
-            <a:r>
-              <a:rPr lang="de-DE" sz="1200" dirty="0" err="1">
-                <a:solidFill>
-                  <a:srgbClr val="000000"/>
-                </a:solidFill>
-                <a:latin typeface="Consolas" panose="020B0609020204030204" pitchFamily="49" charset="0"/>
-              </a:rPr>
-              <a:t>Get</a:t>
-            </a:r>
-            <a:r>
-              <a:rPr lang="de-DE" sz="1200" dirty="0">
-                <a:solidFill>
-                  <a:srgbClr val="000000"/>
-                </a:solidFill>
-                <a:latin typeface="Consolas" panose="020B0609020204030204" pitchFamily="49" charset="0"/>
-              </a:rPr>
-              <a:t>()</a:t>
-            </a:r>
-          </a:p>
-          <a:p>
-            <a:pPr lvl="1"/>
-            <a:r>
-              <a:rPr lang="de-DE" sz="1200" dirty="0">
-                <a:solidFill>
-                  <a:srgbClr val="000000"/>
-                </a:solidFill>
-                <a:latin typeface="Consolas" panose="020B0609020204030204" pitchFamily="49" charset="0"/>
-              </a:rPr>
-              <a:t>{</a:t>
-            </a:r>
-          </a:p>
-          <a:p>
-            <a:pPr lvl="1"/>
-            <a:r>
-              <a:rPr lang="de-DE" sz="1200" dirty="0">
-                <a:solidFill>
-                  <a:srgbClr val="000000"/>
-                </a:solidFill>
-                <a:latin typeface="Consolas" panose="020B0609020204030204" pitchFamily="49" charset="0"/>
-              </a:rPr>
-              <a:t>    </a:t>
-            </a:r>
-            <a:r>
-              <a:rPr lang="de-DE" sz="1200" dirty="0" err="1">
-                <a:solidFill>
-                  <a:srgbClr val="0000FF"/>
-                </a:solidFill>
-                <a:latin typeface="Consolas" panose="020B0609020204030204" pitchFamily="49" charset="0"/>
-              </a:rPr>
-              <a:t>return</a:t>
-            </a:r>
-            <a:r>
-              <a:rPr lang="de-DE" sz="1200" dirty="0">
-                <a:solidFill>
-                  <a:srgbClr val="000000"/>
-                </a:solidFill>
-                <a:latin typeface="Consolas" panose="020B0609020204030204" pitchFamily="49" charset="0"/>
-              </a:rPr>
-              <a:t> </a:t>
-            </a:r>
-            <a:r>
-              <a:rPr lang="de-DE" sz="1200" dirty="0" err="1" smtClean="0">
-                <a:solidFill>
-                  <a:srgbClr val="0000FF"/>
-                </a:solidFill>
-                <a:latin typeface="Consolas" panose="020B0609020204030204" pitchFamily="49" charset="0"/>
-              </a:rPr>
-              <a:t>this</a:t>
-            </a:r>
-            <a:r>
-              <a:rPr lang="de-DE" sz="1200" dirty="0" err="1" smtClean="0">
-                <a:solidFill>
-                  <a:srgbClr val="000000"/>
-                </a:solidFill>
-                <a:latin typeface="Consolas" panose="020B0609020204030204" pitchFamily="49" charset="0"/>
-              </a:rPr>
-              <a:t>.db.Posts</a:t>
-            </a:r>
-            <a:endParaRPr lang="de-DE" sz="1200" dirty="0" smtClean="0">
+              <a:t> {</a:t>
+            </a:r>
+            <a:endParaRPr lang="de-DE" sz="1400" dirty="0">
               <a:solidFill>
                 <a:srgbClr val="000000"/>
               </a:solidFill>
@@ -9842,48 +10697,71 @@
             </a:endParaRPr>
           </a:p>
           <a:p>
-            <a:pPr lvl="1"/>
-            <a:r>
-              <a:rPr lang="de-DE" sz="1200" dirty="0">
+            <a:r>
+              <a:rPr lang="de-DE" sz="1400" dirty="0">
                 <a:solidFill>
                   <a:srgbClr val="000000"/>
                 </a:solidFill>
                 <a:latin typeface="Consolas" panose="020B0609020204030204" pitchFamily="49" charset="0"/>
               </a:rPr>
+              <a:t>            </a:t>
+            </a:r>
+            <a:r>
+              <a:rPr lang="de-DE" sz="1400" dirty="0" smtClean="0">
+                <a:solidFill>
+                  <a:srgbClr val="000000"/>
+                </a:solidFill>
+                <a:latin typeface="Consolas" panose="020B0609020204030204" pitchFamily="49" charset="0"/>
+              </a:rPr>
+              <a:t>	</a:t>
+            </a:r>
+            <a:r>
+              <a:rPr lang="de-DE" sz="1400" dirty="0" err="1" smtClean="0">
+                <a:solidFill>
+                  <a:srgbClr val="000000"/>
+                </a:solidFill>
+                <a:latin typeface="Consolas" panose="020B0609020204030204" pitchFamily="49" charset="0"/>
+              </a:rPr>
+              <a:t>Id</a:t>
+            </a:r>
+            <a:r>
+              <a:rPr lang="de-DE" sz="1400" dirty="0" smtClean="0">
+                <a:solidFill>
+                  <a:srgbClr val="000000"/>
+                </a:solidFill>
+                <a:latin typeface="Consolas" panose="020B0609020204030204" pitchFamily="49" charset="0"/>
+              </a:rPr>
               <a:t> </a:t>
             </a:r>
             <a:r>
-              <a:rPr lang="de-DE" sz="1200" dirty="0" smtClean="0">
+              <a:rPr lang="de-DE" sz="1400" dirty="0">
                 <a:solidFill>
                   <a:srgbClr val="000000"/>
                 </a:solidFill>
                 <a:latin typeface="Consolas" panose="020B0609020204030204" pitchFamily="49" charset="0"/>
               </a:rPr>
-              <a:t>                 .</a:t>
-            </a:r>
-            <a:r>
-              <a:rPr lang="de-DE" sz="1200" dirty="0" err="1">
+              <a:t>= </a:t>
+            </a:r>
+            <a:r>
+              <a:rPr lang="de-DE" sz="1400" dirty="0" err="1" smtClean="0">
                 <a:solidFill>
                   <a:srgbClr val="000000"/>
                 </a:solidFill>
                 <a:latin typeface="Consolas" panose="020B0609020204030204" pitchFamily="49" charset="0"/>
               </a:rPr>
-              <a:t>ToList</a:t>
-            </a:r>
-            <a:r>
-              <a:rPr lang="de-DE" sz="1200" dirty="0" smtClean="0">
+              <a:t>user.Id</a:t>
+            </a:r>
+            <a:r>
+              <a:rPr lang="de-DE" sz="1400" dirty="0" smtClean="0">
                 <a:solidFill>
                   <a:srgbClr val="000000"/>
                 </a:solidFill>
                 <a:latin typeface="Consolas" panose="020B0609020204030204" pitchFamily="49" charset="0"/>
               </a:rPr>
-              <a:t>()</a:t>
-            </a:r>
-          </a:p>
-          <a:p>
-            <a:pPr lvl="1"/>
-            <a:r>
-              <a:rPr lang="de-DE" sz="1200" dirty="0">
+              <a:t>,</a:t>
+            </a:r>
+            <a:r>
+              <a:rPr lang="de-DE" sz="1400" dirty="0">
                 <a:solidFill>
                   <a:srgbClr val="000000"/>
                 </a:solidFill>
@@ -9891,324 +10769,7 @@
               </a:rPr>
               <a:t> </a:t>
             </a:r>
-            <a:r>
-              <a:rPr lang="de-DE" sz="1200" dirty="0" smtClean="0">
-                <a:solidFill>
-                  <a:srgbClr val="000000"/>
-                </a:solidFill>
-                <a:latin typeface="Consolas" panose="020B0609020204030204" pitchFamily="49" charset="0"/>
-              </a:rPr>
-              <a:t>                 .</a:t>
-            </a:r>
-            <a:r>
-              <a:rPr lang="de-DE" sz="1200" dirty="0">
-                <a:solidFill>
-                  <a:srgbClr val="000000"/>
-                </a:solidFill>
-                <a:latin typeface="Consolas" panose="020B0609020204030204" pitchFamily="49" charset="0"/>
-              </a:rPr>
-              <a:t>Select(p =&gt; </a:t>
-            </a:r>
-            <a:r>
-              <a:rPr lang="de-DE" sz="1200" dirty="0" err="1">
-                <a:solidFill>
-                  <a:srgbClr val="2B91AF"/>
-                </a:solidFill>
-                <a:latin typeface="Consolas" panose="020B0609020204030204" pitchFamily="49" charset="0"/>
-              </a:rPr>
-              <a:t>PostDto</a:t>
-            </a:r>
-            <a:r>
-              <a:rPr lang="de-DE" sz="1200" dirty="0" err="1">
-                <a:solidFill>
-                  <a:srgbClr val="000000"/>
-                </a:solidFill>
-                <a:latin typeface="Consolas" panose="020B0609020204030204" pitchFamily="49" charset="0"/>
-              </a:rPr>
-              <a:t>.Map</a:t>
-            </a:r>
-            <a:r>
-              <a:rPr lang="de-DE" sz="1200" dirty="0">
-                <a:solidFill>
-                  <a:srgbClr val="000000"/>
-                </a:solidFill>
-                <a:latin typeface="Consolas" panose="020B0609020204030204" pitchFamily="49" charset="0"/>
-              </a:rPr>
-              <a:t>(p));</a:t>
-            </a:r>
-          </a:p>
-          <a:p>
-            <a:pPr lvl="1"/>
-            <a:r>
-              <a:rPr lang="de-DE" sz="1200" dirty="0">
-                <a:solidFill>
-                  <a:srgbClr val="000000"/>
-                </a:solidFill>
-                <a:latin typeface="Consolas" panose="020B0609020204030204" pitchFamily="49" charset="0"/>
-              </a:rPr>
-              <a:t>}</a:t>
-            </a:r>
-            <a:endParaRPr lang="de-DE" sz="1200" dirty="0"/>
-          </a:p>
-        </p:txBody>
-      </p:sp>
-      <p:sp>
-        <p:nvSpPr>
-          <p:cNvPr id="9" name="Rechteck 8"/>
-          <p:cNvSpPr/>
-          <p:nvPr/>
-        </p:nvSpPr>
-        <p:spPr>
-          <a:xfrm>
-            <a:off x="7010400" y="3249523"/>
-            <a:ext cx="6477675" cy="1754326"/>
-          </a:xfrm>
-          <a:prstGeom prst="rect">
-            <a:avLst/>
-          </a:prstGeom>
-        </p:spPr>
-        <p:txBody>
-          <a:bodyPr wrap="square">
-            <a:spAutoFit/>
-          </a:bodyPr>
-          <a:lstStyle/>
-          <a:p>
-            <a:pPr lvl="1"/>
-            <a:r>
-              <a:rPr lang="de-DE" sz="1200" dirty="0">
-                <a:solidFill>
-                  <a:srgbClr val="000000"/>
-                </a:solidFill>
-                <a:latin typeface="Consolas" panose="020B0609020204030204" pitchFamily="49" charset="0"/>
-              </a:rPr>
-              <a:t>[</a:t>
-            </a:r>
-            <a:r>
-              <a:rPr lang="de-DE" sz="1200" dirty="0">
-                <a:solidFill>
-                  <a:srgbClr val="2B91AF"/>
-                </a:solidFill>
-                <a:latin typeface="Consolas" panose="020B0609020204030204" pitchFamily="49" charset="0"/>
-              </a:rPr>
-              <a:t>Route</a:t>
-            </a:r>
-            <a:r>
-              <a:rPr lang="de-DE" sz="1200" dirty="0">
-                <a:solidFill>
-                  <a:srgbClr val="000000"/>
-                </a:solidFill>
-                <a:latin typeface="Consolas" panose="020B0609020204030204" pitchFamily="49" charset="0"/>
-              </a:rPr>
-              <a:t>(</a:t>
-            </a:r>
-            <a:r>
-              <a:rPr lang="de-DE" sz="1200" dirty="0">
-                <a:solidFill>
-                  <a:srgbClr val="A31515"/>
-                </a:solidFill>
-                <a:latin typeface="Consolas" panose="020B0609020204030204" pitchFamily="49" charset="0"/>
-              </a:rPr>
-              <a:t>"</a:t>
-            </a:r>
-            <a:r>
-              <a:rPr lang="de-DE" sz="1200" dirty="0" err="1">
-                <a:solidFill>
-                  <a:srgbClr val="A31515"/>
-                </a:solidFill>
-                <a:latin typeface="Consolas" panose="020B0609020204030204" pitchFamily="49" charset="0"/>
-              </a:rPr>
-              <a:t>api</a:t>
-            </a:r>
-            <a:r>
-              <a:rPr lang="de-DE" sz="1200" dirty="0">
-                <a:solidFill>
-                  <a:srgbClr val="A31515"/>
-                </a:solidFill>
-                <a:latin typeface="Consolas" panose="020B0609020204030204" pitchFamily="49" charset="0"/>
-              </a:rPr>
-              <a:t>/</a:t>
-            </a:r>
-            <a:r>
-              <a:rPr lang="de-DE" sz="1200" dirty="0" err="1">
-                <a:solidFill>
-                  <a:srgbClr val="A31515"/>
-                </a:solidFill>
-                <a:latin typeface="Consolas" panose="020B0609020204030204" pitchFamily="49" charset="0"/>
-              </a:rPr>
-              <a:t>posts</a:t>
-            </a:r>
-            <a:r>
-              <a:rPr lang="de-DE" sz="1200" dirty="0">
-                <a:solidFill>
-                  <a:srgbClr val="A31515"/>
-                </a:solidFill>
-                <a:latin typeface="Consolas" panose="020B0609020204030204" pitchFamily="49" charset="0"/>
-              </a:rPr>
-              <a:t>/</a:t>
-            </a:r>
-            <a:r>
-              <a:rPr lang="de-DE" sz="1200" dirty="0" err="1">
-                <a:solidFill>
-                  <a:srgbClr val="A31515"/>
-                </a:solidFill>
-                <a:latin typeface="Consolas" panose="020B0609020204030204" pitchFamily="49" charset="0"/>
-              </a:rPr>
-              <a:t>latest</a:t>
-            </a:r>
-            <a:r>
-              <a:rPr lang="de-DE" sz="1200" dirty="0">
-                <a:solidFill>
-                  <a:srgbClr val="A31515"/>
-                </a:solidFill>
-                <a:latin typeface="Consolas" panose="020B0609020204030204" pitchFamily="49" charset="0"/>
-              </a:rPr>
-              <a:t>"</a:t>
-            </a:r>
-            <a:r>
-              <a:rPr lang="de-DE" sz="1200" dirty="0">
-                <a:solidFill>
-                  <a:srgbClr val="000000"/>
-                </a:solidFill>
-                <a:latin typeface="Consolas" panose="020B0609020204030204" pitchFamily="49" charset="0"/>
-              </a:rPr>
-              <a:t>)]</a:t>
-            </a:r>
-          </a:p>
-          <a:p>
-            <a:pPr lvl="1"/>
-            <a:r>
-              <a:rPr lang="de-DE" sz="1200" dirty="0" err="1">
-                <a:solidFill>
-                  <a:srgbClr val="0000FF"/>
-                </a:solidFill>
-                <a:latin typeface="Consolas" panose="020B0609020204030204" pitchFamily="49" charset="0"/>
-              </a:rPr>
-              <a:t>public</a:t>
-            </a:r>
-            <a:r>
-              <a:rPr lang="de-DE" sz="1200" dirty="0">
-                <a:solidFill>
-                  <a:srgbClr val="000000"/>
-                </a:solidFill>
-                <a:latin typeface="Consolas" panose="020B0609020204030204" pitchFamily="49" charset="0"/>
-              </a:rPr>
-              <a:t> </a:t>
-            </a:r>
-            <a:r>
-              <a:rPr lang="de-DE" sz="1200" dirty="0" err="1">
-                <a:solidFill>
-                  <a:srgbClr val="2B91AF"/>
-                </a:solidFill>
-                <a:latin typeface="Consolas" panose="020B0609020204030204" pitchFamily="49" charset="0"/>
-              </a:rPr>
-              <a:t>IEnumerable</a:t>
-            </a:r>
-            <a:r>
-              <a:rPr lang="de-DE" sz="1200" dirty="0">
-                <a:solidFill>
-                  <a:srgbClr val="000000"/>
-                </a:solidFill>
-                <a:latin typeface="Consolas" panose="020B0609020204030204" pitchFamily="49" charset="0"/>
-              </a:rPr>
-              <a:t>&lt;</a:t>
-            </a:r>
-            <a:r>
-              <a:rPr lang="de-DE" sz="1200" dirty="0" err="1">
-                <a:solidFill>
-                  <a:srgbClr val="2B91AF"/>
-                </a:solidFill>
-                <a:latin typeface="Consolas" panose="020B0609020204030204" pitchFamily="49" charset="0"/>
-              </a:rPr>
-              <a:t>PostDto</a:t>
-            </a:r>
-            <a:r>
-              <a:rPr lang="de-DE" sz="1200" dirty="0">
-                <a:solidFill>
-                  <a:srgbClr val="000000"/>
-                </a:solidFill>
-                <a:latin typeface="Consolas" panose="020B0609020204030204" pitchFamily="49" charset="0"/>
-              </a:rPr>
-              <a:t>&gt; </a:t>
-            </a:r>
-            <a:r>
-              <a:rPr lang="de-DE" sz="1200" dirty="0" err="1">
-                <a:solidFill>
-                  <a:srgbClr val="000000"/>
-                </a:solidFill>
-                <a:latin typeface="Consolas" panose="020B0609020204030204" pitchFamily="49" charset="0"/>
-              </a:rPr>
-              <a:t>GetLatest</a:t>
-            </a:r>
-            <a:r>
-              <a:rPr lang="de-DE" sz="1200" dirty="0">
-                <a:solidFill>
-                  <a:srgbClr val="000000"/>
-                </a:solidFill>
-                <a:latin typeface="Consolas" panose="020B0609020204030204" pitchFamily="49" charset="0"/>
-              </a:rPr>
-              <a:t>()</a:t>
-            </a:r>
-          </a:p>
-          <a:p>
-            <a:pPr lvl="1"/>
-            <a:r>
-              <a:rPr lang="de-DE" sz="1200" dirty="0">
-                <a:solidFill>
-                  <a:srgbClr val="000000"/>
-                </a:solidFill>
-                <a:latin typeface="Consolas" panose="020B0609020204030204" pitchFamily="49" charset="0"/>
-              </a:rPr>
-              <a:t>{</a:t>
-            </a:r>
-          </a:p>
-          <a:p>
-            <a:pPr lvl="1"/>
-            <a:r>
-              <a:rPr lang="de-DE" sz="1200" dirty="0">
-                <a:solidFill>
-                  <a:srgbClr val="000000"/>
-                </a:solidFill>
-                <a:latin typeface="Consolas" panose="020B0609020204030204" pitchFamily="49" charset="0"/>
-              </a:rPr>
-              <a:t>    </a:t>
-            </a:r>
-            <a:r>
-              <a:rPr lang="de-DE" sz="1200" dirty="0" err="1">
-                <a:solidFill>
-                  <a:srgbClr val="0000FF"/>
-                </a:solidFill>
-                <a:latin typeface="Consolas" panose="020B0609020204030204" pitchFamily="49" charset="0"/>
-              </a:rPr>
-              <a:t>return</a:t>
-            </a:r>
-            <a:r>
-              <a:rPr lang="de-DE" sz="1200" dirty="0">
-                <a:solidFill>
-                  <a:srgbClr val="000000"/>
-                </a:solidFill>
-                <a:latin typeface="Consolas" panose="020B0609020204030204" pitchFamily="49" charset="0"/>
-              </a:rPr>
-              <a:t> </a:t>
-            </a:r>
-            <a:r>
-              <a:rPr lang="de-DE" sz="1200" dirty="0" err="1" smtClean="0">
-                <a:solidFill>
-                  <a:srgbClr val="0000FF"/>
-                </a:solidFill>
-                <a:latin typeface="Consolas" panose="020B0609020204030204" pitchFamily="49" charset="0"/>
-              </a:rPr>
-              <a:t>this</a:t>
-            </a:r>
-            <a:r>
-              <a:rPr lang="de-DE" sz="1200" dirty="0" err="1" smtClean="0">
-                <a:solidFill>
-                  <a:srgbClr val="000000"/>
-                </a:solidFill>
-                <a:latin typeface="Consolas" panose="020B0609020204030204" pitchFamily="49" charset="0"/>
-              </a:rPr>
-              <a:t>.db.Posts</a:t>
-            </a:r>
-            <a:endParaRPr lang="de-DE" sz="1200" dirty="0" smtClean="0">
+            <a:endParaRPr lang="de-DE" sz="1400" dirty="0" smtClean="0">
               <a:solidFill>
                 <a:srgbClr val="000000"/>
               </a:solidFill>
@@ -10216,193 +10777,169 @@
             </a:endParaRPr>
           </a:p>
           <a:p>
-            <a:pPr lvl="1"/>
-            <a:r>
-              <a:rPr lang="de-DE" sz="1200" dirty="0">
+            <a:r>
+              <a:rPr lang="de-DE" sz="1400" dirty="0">
                 <a:solidFill>
                   <a:srgbClr val="000000"/>
                 </a:solidFill>
                 <a:latin typeface="Consolas" panose="020B0609020204030204" pitchFamily="49" charset="0"/>
               </a:rPr>
+              <a:t>	</a:t>
+            </a:r>
+            <a:r>
+              <a:rPr lang="de-DE" sz="1400" dirty="0" smtClean="0">
+                <a:solidFill>
+                  <a:srgbClr val="000000"/>
+                </a:solidFill>
+                <a:latin typeface="Consolas" panose="020B0609020204030204" pitchFamily="49" charset="0"/>
+              </a:rPr>
+              <a:t>	Status </a:t>
+            </a:r>
+            <a:r>
+              <a:rPr lang="de-DE" sz="1400" dirty="0">
+                <a:solidFill>
+                  <a:srgbClr val="000000"/>
+                </a:solidFill>
+                <a:latin typeface="Consolas" panose="020B0609020204030204" pitchFamily="49" charset="0"/>
+              </a:rPr>
+              <a:t>= </a:t>
+            </a:r>
+            <a:r>
+              <a:rPr lang="de-DE" sz="1400" dirty="0" err="1" smtClean="0">
+                <a:solidFill>
+                  <a:srgbClr val="000000"/>
+                </a:solidFill>
+                <a:latin typeface="Consolas" panose="020B0609020204030204" pitchFamily="49" charset="0"/>
+              </a:rPr>
+              <a:t>user.Status</a:t>
+            </a:r>
+            <a:endParaRPr lang="de-DE" sz="1400" dirty="0" smtClean="0">
+              <a:solidFill>
+                <a:srgbClr val="000000"/>
+              </a:solidFill>
+              <a:latin typeface="Consolas" panose="020B0609020204030204" pitchFamily="49" charset="0"/>
+            </a:endParaRPr>
+          </a:p>
+          <a:p>
+            <a:r>
+              <a:rPr lang="de-DE" sz="1400" dirty="0" smtClean="0">
+                <a:solidFill>
+                  <a:srgbClr val="000000"/>
+                </a:solidFill>
+                <a:latin typeface="Consolas" panose="020B0609020204030204" pitchFamily="49" charset="0"/>
+              </a:rPr>
               <a:t> </a:t>
             </a:r>
             <a:r>
-              <a:rPr lang="de-DE" sz="1200" dirty="0" smtClean="0">
+              <a:rPr lang="de-DE" sz="1400" dirty="0">
                 <a:solidFill>
                   <a:srgbClr val="000000"/>
                 </a:solidFill>
                 <a:latin typeface="Consolas" panose="020B0609020204030204" pitchFamily="49" charset="0"/>
               </a:rPr>
-              <a:t>                 .</a:t>
-            </a:r>
-            <a:r>
-              <a:rPr lang="de-DE" sz="1200" dirty="0" err="1" smtClean="0">
+              <a:t>	</a:t>
+            </a:r>
+            <a:r>
+              <a:rPr lang="de-DE" sz="1400" dirty="0" smtClean="0">
                 <a:solidFill>
                   <a:srgbClr val="000000"/>
                 </a:solidFill>
                 <a:latin typeface="Consolas" panose="020B0609020204030204" pitchFamily="49" charset="0"/>
               </a:rPr>
-              <a:t>OrderByDescending</a:t>
-            </a:r>
-            <a:r>
-              <a:rPr lang="de-DE" sz="1200" dirty="0" smtClean="0">
+              <a:t>	Name </a:t>
+            </a:r>
+            <a:r>
+              <a:rPr lang="de-DE" sz="1400" dirty="0">
                 <a:solidFill>
                   <a:srgbClr val="000000"/>
                 </a:solidFill>
                 <a:latin typeface="Consolas" panose="020B0609020204030204" pitchFamily="49" charset="0"/>
               </a:rPr>
-              <a:t>(o </a:t>
-            </a:r>
-            <a:r>
-              <a:rPr lang="de-DE" sz="1200" dirty="0">
+              <a:t>= </a:t>
+            </a:r>
+            <a:r>
+              <a:rPr lang="de-DE" sz="1400" dirty="0" err="1" smtClean="0">
                 <a:solidFill>
                   <a:srgbClr val="000000"/>
                 </a:solidFill>
                 <a:latin typeface="Consolas" panose="020B0609020204030204" pitchFamily="49" charset="0"/>
               </a:rPr>
-              <a:t>=&gt; </a:t>
-            </a:r>
-            <a:r>
-              <a:rPr lang="de-DE" sz="1200" dirty="0" err="1">
+              <a:t>user.Name</a:t>
+            </a:r>
+            <a:r>
+              <a:rPr lang="de-DE" sz="1400" dirty="0">
                 <a:solidFill>
                   <a:srgbClr val="000000"/>
                 </a:solidFill>
                 <a:latin typeface="Consolas" panose="020B0609020204030204" pitchFamily="49" charset="0"/>
               </a:rPr>
-              <a:t>o.Created</a:t>
-            </a:r>
-            <a:r>
-              <a:rPr lang="de-DE" sz="1200" dirty="0" smtClean="0">
+              <a:t>,</a:t>
+            </a:r>
+          </a:p>
+          <a:p>
+            <a:r>
+              <a:rPr lang="de-DE" sz="1400" dirty="0">
                 <a:solidFill>
                   <a:srgbClr val="000000"/>
                 </a:solidFill>
                 <a:latin typeface="Consolas" panose="020B0609020204030204" pitchFamily="49" charset="0"/>
               </a:rPr>
-              <a:t>)</a:t>
-            </a:r>
-          </a:p>
-          <a:p>
-            <a:pPr lvl="1"/>
-            <a:r>
-              <a:rPr lang="de-DE" sz="1200" dirty="0" smtClean="0">
+              <a:t>             </a:t>
+            </a:r>
+            <a:r>
+              <a:rPr lang="de-DE" sz="1400" dirty="0" smtClean="0">
                 <a:solidFill>
                   <a:srgbClr val="000000"/>
                 </a:solidFill>
                 <a:latin typeface="Consolas" panose="020B0609020204030204" pitchFamily="49" charset="0"/>
               </a:rPr>
-              <a:t>                  .</a:t>
-            </a:r>
-            <a:r>
-              <a:rPr lang="de-DE" sz="1200" dirty="0" err="1">
+              <a:t>	};</a:t>
+            </a:r>
+          </a:p>
+          <a:p>
+            <a:r>
+              <a:rPr lang="de-DE" sz="1400" dirty="0">
                 <a:solidFill>
                   <a:srgbClr val="000000"/>
                 </a:solidFill>
                 <a:latin typeface="Consolas" panose="020B0609020204030204" pitchFamily="49" charset="0"/>
               </a:rPr>
-              <a:t>ToList</a:t>
-            </a:r>
-            <a:r>
-              <a:rPr lang="de-DE" sz="1200" dirty="0" smtClean="0">
+              <a:t> </a:t>
+            </a:r>
+            <a:r>
+              <a:rPr lang="de-DE" sz="1400" dirty="0" smtClean="0">
                 <a:solidFill>
                   <a:srgbClr val="000000"/>
                 </a:solidFill>
                 <a:latin typeface="Consolas" panose="020B0609020204030204" pitchFamily="49" charset="0"/>
               </a:rPr>
-              <a:t>()</a:t>
-            </a:r>
-          </a:p>
-          <a:p>
-            <a:pPr lvl="1"/>
-            <a:r>
-              <a:rPr lang="de-DE" sz="1200" dirty="0">
-                <a:solidFill>
-                  <a:srgbClr val="000000"/>
-                </a:solidFill>
-                <a:latin typeface="Consolas" panose="020B0609020204030204" pitchFamily="49" charset="0"/>
-              </a:rPr>
-              <a:t> </a:t>
-            </a:r>
-            <a:r>
-              <a:rPr lang="de-DE" sz="1200" dirty="0" smtClean="0">
-                <a:solidFill>
-                  <a:srgbClr val="000000"/>
-                </a:solidFill>
-                <a:latin typeface="Consolas" panose="020B0609020204030204" pitchFamily="49" charset="0"/>
-              </a:rPr>
-              <a:t>                 .</a:t>
-            </a:r>
-            <a:r>
-              <a:rPr lang="de-DE" sz="1200" dirty="0">
-                <a:solidFill>
-                  <a:srgbClr val="000000"/>
-                </a:solidFill>
-                <a:latin typeface="Consolas" panose="020B0609020204030204" pitchFamily="49" charset="0"/>
-              </a:rPr>
-              <a:t>Select(p =&gt; </a:t>
-            </a:r>
-            <a:r>
-              <a:rPr lang="de-DE" sz="1200" dirty="0" err="1">
-                <a:solidFill>
-                  <a:srgbClr val="2B91AF"/>
-                </a:solidFill>
-                <a:latin typeface="Consolas" panose="020B0609020204030204" pitchFamily="49" charset="0"/>
-              </a:rPr>
-              <a:t>PostDto</a:t>
-            </a:r>
-            <a:r>
-              <a:rPr lang="de-DE" sz="1200" dirty="0" err="1">
-                <a:solidFill>
-                  <a:srgbClr val="000000"/>
-                </a:solidFill>
-                <a:latin typeface="Consolas" panose="020B0609020204030204" pitchFamily="49" charset="0"/>
-              </a:rPr>
-              <a:t>.Map</a:t>
-            </a:r>
-            <a:r>
-              <a:rPr lang="de-DE" sz="1200" dirty="0">
-                <a:solidFill>
-                  <a:srgbClr val="000000"/>
-                </a:solidFill>
-                <a:latin typeface="Consolas" panose="020B0609020204030204" pitchFamily="49" charset="0"/>
-              </a:rPr>
-              <a:t>(p));</a:t>
-            </a:r>
-          </a:p>
-          <a:p>
-            <a:pPr lvl="1"/>
-            <a:r>
-              <a:rPr lang="de-DE" sz="1200" dirty="0" smtClean="0">
-                <a:solidFill>
-                  <a:srgbClr val="000000"/>
-                </a:solidFill>
-                <a:latin typeface="Consolas" panose="020B0609020204030204" pitchFamily="49" charset="0"/>
-              </a:rPr>
               <a:t>}</a:t>
             </a:r>
-          </a:p>
-          <a:p>
-            <a:r>
-              <a:rPr lang="de-DE" sz="1200" dirty="0" smtClean="0">
-                <a:solidFill>
-                  <a:srgbClr val="000000"/>
-                </a:solidFill>
-                <a:latin typeface="Consolas" panose="020B0609020204030204" pitchFamily="49" charset="0"/>
-              </a:rPr>
-              <a:t>}	</a:t>
-            </a:r>
+            <a:endParaRPr lang="de-DE" sz="1400" dirty="0" smtClean="0">
+              <a:solidFill>
+                <a:schemeClr val="accent3"/>
+              </a:solidFill>
+            </a:endParaRPr>
           </a:p>
         </p:txBody>
       </p:sp>
     </p:spTree>
     <p:extLst>
       <p:ext uri="{BB962C8B-B14F-4D97-AF65-F5344CB8AC3E}">
-        <p14:creationId xmlns:p14="http://schemas.microsoft.com/office/powerpoint/2010/main" val="200086261"/>
+        <p14:creationId xmlns:p14="http://schemas.microsoft.com/office/powerpoint/2010/main" val="3825199068"/>
       </p:ext>
     </p:extLst>
   </p:cSld>
   <p:clrMapOvr>
     <a:masterClrMapping/>
   </p:clrMapOvr>
+  <p:timing>
+    <p:tnLst>
+      <p:par>
+        <p:cTn id="1" dur="indefinite" restart="never" nodeType="tmRoot"/>
+      </p:par>
+    </p:tnLst>
+  </p:timing>
 </p:sld>
 </file>
 

</xml_diff>